<commit_message>
add slide for partner determination and js inherit
</commit_message>
<xml_diff>
--- a/Jerry.pptx
+++ b/Jerry.pptx
@@ -5,12 +5,13 @@
     <p:sldMasterId id="2147483648" r:id="rId1"/>
   </p:sldMasterIdLst>
   <p:notesMasterIdLst>
-    <p:notesMasterId r:id="rId5"/>
+    <p:notesMasterId r:id="rId6"/>
   </p:notesMasterIdLst>
   <p:sldIdLst>
     <p:sldId id="257" r:id="rId2"/>
     <p:sldId id="260" r:id="rId3"/>
     <p:sldId id="261" r:id="rId4"/>
+    <p:sldId id="263" r:id="rId5"/>
   </p:sldIdLst>
   <p:sldSz cx="12192000" cy="6858000"/>
   <p:notesSz cx="6858000" cy="9144000"/>
@@ -199,7 +200,7 @@
           <a:p>
             <a:fld id="{C1FFF932-AE32-4CB2-A004-ABC55BBBB993}" type="datetimeFigureOut">
               <a:rPr lang="en-US" smtClean="0"/>
-              <a:t>6/5/2015</a:t>
+              <a:t>6/8/2015</a:t>
             </a:fld>
             <a:endParaRPr lang="en-US"/>
           </a:p>
@@ -1433,6 +1434,94 @@
 </p:notes>
 </file>
 
+<file path=ppt/notesSlides/notesSlide2.xml><?xml version="1.0" encoding="utf-8"?>
+<p:notes xmlns:a="http://schemas.openxmlformats.org/drawingml/2006/main" xmlns:r="http://schemas.openxmlformats.org/officeDocument/2006/relationships" xmlns:p="http://schemas.openxmlformats.org/presentationml/2006/main">
+  <p:cSld>
+    <p:spTree>
+      <p:nvGrpSpPr>
+        <p:cNvPr id="1" name=""/>
+        <p:cNvGrpSpPr/>
+        <p:nvPr/>
+      </p:nvGrpSpPr>
+      <p:grpSpPr>
+        <a:xfrm>
+          <a:off x="0" y="0"/>
+          <a:ext cx="0" cy="0"/>
+          <a:chOff x="0" y="0"/>
+          <a:chExt cx="0" cy="0"/>
+        </a:xfrm>
+      </p:grpSpPr>
+      <p:sp>
+        <p:nvSpPr>
+          <p:cNvPr id="2" name="Slide Image Placeholder 1"/>
+          <p:cNvSpPr>
+            <a:spLocks noGrp="1" noRot="1" noChangeAspect="1"/>
+          </p:cNvSpPr>
+          <p:nvPr>
+            <p:ph type="sldImg"/>
+          </p:nvPr>
+        </p:nvSpPr>
+        <p:spPr/>
+      </p:sp>
+      <p:sp>
+        <p:nvSpPr>
+          <p:cNvPr id="3" name="Notes Placeholder 2"/>
+          <p:cNvSpPr>
+            <a:spLocks noGrp="1"/>
+          </p:cNvSpPr>
+          <p:nvPr>
+            <p:ph type="body" idx="1"/>
+          </p:nvPr>
+        </p:nvSpPr>
+        <p:spPr/>
+        <p:txBody>
+          <a:bodyPr/>
+          <a:lstStyle/>
+          <a:p>
+            <a:r>
+              <a:rPr lang="en-US" dirty="0" smtClean="0"/>
+              <a:t>Partner determination</a:t>
+            </a:r>
+            <a:endParaRPr lang="en-US" dirty="0"/>
+          </a:p>
+        </p:txBody>
+      </p:sp>
+      <p:sp>
+        <p:nvSpPr>
+          <p:cNvPr id="4" name="Slide Number Placeholder 3"/>
+          <p:cNvSpPr>
+            <a:spLocks noGrp="1"/>
+          </p:cNvSpPr>
+          <p:nvPr>
+            <p:ph type="sldNum" sz="quarter" idx="10"/>
+          </p:nvPr>
+        </p:nvSpPr>
+        <p:spPr/>
+        <p:txBody>
+          <a:bodyPr/>
+          <a:lstStyle/>
+          <a:p>
+            <a:fld id="{25B1E16C-EC52-46D5-9BB3-59AA4A442EA6}" type="slidenum">
+              <a:rPr lang="en-US" smtClean="0"/>
+              <a:t>4</a:t>
+            </a:fld>
+            <a:endParaRPr lang="en-US"/>
+          </a:p>
+        </p:txBody>
+      </p:sp>
+    </p:spTree>
+    <p:extLst>
+      <p:ext uri="{BB962C8B-B14F-4D97-AF65-F5344CB8AC3E}">
+        <p14:creationId xmlns:p14="http://schemas.microsoft.com/office/powerpoint/2010/main" val="3213621579"/>
+      </p:ext>
+    </p:extLst>
+  </p:cSld>
+  <p:clrMapOvr>
+    <a:masterClrMapping/>
+  </p:clrMapOvr>
+</p:notes>
+</file>
+
 <file path=ppt/slideLayouts/slideLayout1.xml><?xml version="1.0" encoding="utf-8"?>
 <p:sldLayout xmlns:a="http://schemas.openxmlformats.org/drawingml/2006/main" xmlns:r="http://schemas.openxmlformats.org/officeDocument/2006/relationships" xmlns:p="http://schemas.openxmlformats.org/presentationml/2006/main" type="title" preserve="1">
   <p:cSld name="Title Slide">
@@ -1564,7 +1653,7 @@
           <a:p>
             <a:fld id="{32885C6E-53D4-4DF2-B9C6-C242624B2A8A}" type="datetimeFigureOut">
               <a:rPr lang="en-US" smtClean="0"/>
-              <a:t>6/5/2015</a:t>
+              <a:t>6/8/2015</a:t>
             </a:fld>
             <a:endParaRPr lang="en-US"/>
           </a:p>
@@ -1734,7 +1823,7 @@
           <a:p>
             <a:fld id="{32885C6E-53D4-4DF2-B9C6-C242624B2A8A}" type="datetimeFigureOut">
               <a:rPr lang="en-US" smtClean="0"/>
-              <a:t>6/5/2015</a:t>
+              <a:t>6/8/2015</a:t>
             </a:fld>
             <a:endParaRPr lang="en-US"/>
           </a:p>
@@ -1914,7 +2003,7 @@
           <a:p>
             <a:fld id="{32885C6E-53D4-4DF2-B9C6-C242624B2A8A}" type="datetimeFigureOut">
               <a:rPr lang="en-US" smtClean="0"/>
-              <a:t>6/5/2015</a:t>
+              <a:t>6/8/2015</a:t>
             </a:fld>
             <a:endParaRPr lang="en-US"/>
           </a:p>
@@ -2084,7 +2173,7 @@
           <a:p>
             <a:fld id="{32885C6E-53D4-4DF2-B9C6-C242624B2A8A}" type="datetimeFigureOut">
               <a:rPr lang="en-US" smtClean="0"/>
-              <a:t>6/5/2015</a:t>
+              <a:t>6/8/2015</a:t>
             </a:fld>
             <a:endParaRPr lang="en-US"/>
           </a:p>
@@ -2330,7 +2419,7 @@
           <a:p>
             <a:fld id="{32885C6E-53D4-4DF2-B9C6-C242624B2A8A}" type="datetimeFigureOut">
               <a:rPr lang="en-US" smtClean="0"/>
-              <a:t>6/5/2015</a:t>
+              <a:t>6/8/2015</a:t>
             </a:fld>
             <a:endParaRPr lang="en-US"/>
           </a:p>
@@ -2562,7 +2651,7 @@
           <a:p>
             <a:fld id="{32885C6E-53D4-4DF2-B9C6-C242624B2A8A}" type="datetimeFigureOut">
               <a:rPr lang="en-US" smtClean="0"/>
-              <a:t>6/5/2015</a:t>
+              <a:t>6/8/2015</a:t>
             </a:fld>
             <a:endParaRPr lang="en-US"/>
           </a:p>
@@ -2929,7 +3018,7 @@
           <a:p>
             <a:fld id="{32885C6E-53D4-4DF2-B9C6-C242624B2A8A}" type="datetimeFigureOut">
               <a:rPr lang="en-US" smtClean="0"/>
-              <a:t>6/5/2015</a:t>
+              <a:t>6/8/2015</a:t>
             </a:fld>
             <a:endParaRPr lang="en-US"/>
           </a:p>
@@ -3047,7 +3136,7 @@
           <a:p>
             <a:fld id="{32885C6E-53D4-4DF2-B9C6-C242624B2A8A}" type="datetimeFigureOut">
               <a:rPr lang="en-US" smtClean="0"/>
-              <a:t>6/5/2015</a:t>
+              <a:t>6/8/2015</a:t>
             </a:fld>
             <a:endParaRPr lang="en-US"/>
           </a:p>
@@ -3142,7 +3231,7 @@
           <a:p>
             <a:fld id="{32885C6E-53D4-4DF2-B9C6-C242624B2A8A}" type="datetimeFigureOut">
               <a:rPr lang="en-US" smtClean="0"/>
-              <a:t>6/5/2015</a:t>
+              <a:t>6/8/2015</a:t>
             </a:fld>
             <a:endParaRPr lang="en-US"/>
           </a:p>
@@ -3419,7 +3508,7 @@
           <a:p>
             <a:fld id="{32885C6E-53D4-4DF2-B9C6-C242624B2A8A}" type="datetimeFigureOut">
               <a:rPr lang="en-US" smtClean="0"/>
-              <a:t>6/5/2015</a:t>
+              <a:t>6/8/2015</a:t>
             </a:fld>
             <a:endParaRPr lang="en-US"/>
           </a:p>
@@ -3672,7 +3761,7 @@
           <a:p>
             <a:fld id="{32885C6E-53D4-4DF2-B9C6-C242624B2A8A}" type="datetimeFigureOut">
               <a:rPr lang="en-US" smtClean="0"/>
-              <a:t>6/5/2015</a:t>
+              <a:t>6/8/2015</a:t>
             </a:fld>
             <a:endParaRPr lang="en-US"/>
           </a:p>
@@ -3885,7 +3974,7 @@
           <a:p>
             <a:fld id="{32885C6E-53D4-4DF2-B9C6-C242624B2A8A}" type="datetimeFigureOut">
               <a:rPr lang="en-US" smtClean="0"/>
-              <a:t>6/5/2015</a:t>
+              <a:t>6/8/2015</a:t>
             </a:fld>
             <a:endParaRPr lang="en-US"/>
           </a:p>
@@ -6432,6 +6521,410 @@
     <p:extLst>
       <p:ext uri="{BB962C8B-B14F-4D97-AF65-F5344CB8AC3E}">
         <p14:creationId xmlns:p14="http://schemas.microsoft.com/office/powerpoint/2010/main" val="1661992976"/>
+      </p:ext>
+    </p:extLst>
+  </p:cSld>
+  <p:clrMapOvr>
+    <a:masterClrMapping/>
+  </p:clrMapOvr>
+  <p:timing>
+    <p:tnLst>
+      <p:par>
+        <p:cTn id="1" dur="indefinite" restart="never" nodeType="tmRoot"/>
+      </p:par>
+    </p:tnLst>
+  </p:timing>
+</p:sld>
+</file>
+
+<file path=ppt/slides/slide4.xml><?xml version="1.0" encoding="utf-8"?>
+<p:sld xmlns:a="http://schemas.openxmlformats.org/drawingml/2006/main" xmlns:r="http://schemas.openxmlformats.org/officeDocument/2006/relationships" xmlns:p="http://schemas.openxmlformats.org/presentationml/2006/main">
+  <p:cSld>
+    <p:spTree>
+      <p:nvGrpSpPr>
+        <p:cNvPr id="1" name=""/>
+        <p:cNvGrpSpPr/>
+        <p:nvPr/>
+      </p:nvGrpSpPr>
+      <p:grpSpPr>
+        <a:xfrm>
+          <a:off x="0" y="0"/>
+          <a:ext cx="0" cy="0"/>
+          <a:chOff x="0" y="0"/>
+          <a:chExt cx="0" cy="0"/>
+        </a:xfrm>
+      </p:grpSpPr>
+      <p:sp>
+        <p:nvSpPr>
+          <p:cNvPr id="3" name="Rectangle 2"/>
+          <p:cNvSpPr/>
+          <p:nvPr/>
+        </p:nvSpPr>
+        <p:spPr>
+          <a:xfrm>
+            <a:off x="1889760" y="5248132"/>
+            <a:ext cx="5230368" cy="682752"/>
+          </a:xfrm>
+          <a:prstGeom prst="rect">
+            <a:avLst/>
+          </a:prstGeom>
+        </p:spPr>
+        <p:style>
+          <a:lnRef idx="2">
+            <a:schemeClr val="accent1">
+              <a:shade val="50000"/>
+            </a:schemeClr>
+          </a:lnRef>
+          <a:fillRef idx="1">
+            <a:schemeClr val="accent1"/>
+          </a:fillRef>
+          <a:effectRef idx="0">
+            <a:schemeClr val="accent1"/>
+          </a:effectRef>
+          <a:fontRef idx="minor">
+            <a:schemeClr val="lt1"/>
+          </a:fontRef>
+        </p:style>
+        <p:txBody>
+          <a:bodyPr rtlCol="0" anchor="ctr"/>
+          <a:lstStyle/>
+          <a:p>
+            <a:pPr algn="ctr"/>
+            <a:endParaRPr lang="en-US"/>
+          </a:p>
+        </p:txBody>
+      </p:sp>
+      <p:sp>
+        <p:nvSpPr>
+          <p:cNvPr id="4" name="TextBox 3"/>
+          <p:cNvSpPr txBox="1"/>
+          <p:nvPr/>
+        </p:nvSpPr>
+        <p:spPr>
+          <a:xfrm>
+            <a:off x="2097024" y="5404842"/>
+            <a:ext cx="4815840" cy="369332"/>
+          </a:xfrm>
+          <a:prstGeom prst="rect">
+            <a:avLst/>
+          </a:prstGeom>
+          <a:noFill/>
+        </p:spPr>
+        <p:txBody>
+          <a:bodyPr wrap="square" rtlCol="0">
+            <a:spAutoFit/>
+          </a:bodyPr>
+          <a:lstStyle/>
+          <a:p>
+            <a:r>
+              <a:rPr lang="en-US" dirty="0" smtClean="0"/>
+              <a:t>CRM_PARTNER_DETERM_INITIAL_EC </a:t>
+            </a:r>
+            <a:r>
+              <a:rPr lang="en-US" altLang="zh-CN" dirty="0" smtClean="0"/>
+              <a:t>is called </a:t>
+            </a:r>
+            <a:endParaRPr lang="en-US" dirty="0"/>
+          </a:p>
+        </p:txBody>
+      </p:sp>
+      <p:sp>
+        <p:nvSpPr>
+          <p:cNvPr id="6" name="Rectangle 5"/>
+          <p:cNvSpPr/>
+          <p:nvPr/>
+        </p:nvSpPr>
+        <p:spPr>
+          <a:xfrm>
+            <a:off x="1889760" y="3615559"/>
+            <a:ext cx="5230368" cy="682752"/>
+          </a:xfrm>
+          <a:prstGeom prst="rect">
+            <a:avLst/>
+          </a:prstGeom>
+        </p:spPr>
+        <p:style>
+          <a:lnRef idx="2">
+            <a:schemeClr val="accent1">
+              <a:shade val="50000"/>
+            </a:schemeClr>
+          </a:lnRef>
+          <a:fillRef idx="1">
+            <a:schemeClr val="accent1"/>
+          </a:fillRef>
+          <a:effectRef idx="0">
+            <a:schemeClr val="accent1"/>
+          </a:effectRef>
+          <a:fontRef idx="minor">
+            <a:schemeClr val="lt1"/>
+          </a:fontRef>
+        </p:style>
+        <p:txBody>
+          <a:bodyPr rtlCol="0" anchor="ctr"/>
+          <a:lstStyle/>
+          <a:p>
+            <a:pPr algn="ctr"/>
+            <a:endParaRPr lang="en-US"/>
+          </a:p>
+        </p:txBody>
+      </p:sp>
+      <p:sp>
+        <p:nvSpPr>
+          <p:cNvPr id="7" name="TextBox 6"/>
+          <p:cNvSpPr txBox="1"/>
+          <p:nvPr/>
+        </p:nvSpPr>
+        <p:spPr>
+          <a:xfrm>
+            <a:off x="2304288" y="3587603"/>
+            <a:ext cx="4815840" cy="369332"/>
+          </a:xfrm>
+          <a:prstGeom prst="rect">
+            <a:avLst/>
+          </a:prstGeom>
+          <a:noFill/>
+        </p:spPr>
+        <p:txBody>
+          <a:bodyPr wrap="square" rtlCol="0">
+            <a:spAutoFit/>
+          </a:bodyPr>
+          <a:lstStyle/>
+          <a:p>
+            <a:r>
+              <a:rPr lang="en-US" altLang="zh-CN" dirty="0" err="1" smtClean="0"/>
+              <a:t>Lv_proceed_partner</a:t>
+            </a:r>
+            <a:r>
+              <a:rPr lang="en-US" altLang="zh-CN" dirty="0" smtClean="0"/>
+              <a:t> = </a:t>
+            </a:r>
+            <a:r>
+              <a:rPr lang="en-US" altLang="zh-CN" dirty="0" err="1" smtClean="0"/>
+              <a:t>abap_true</a:t>
+            </a:r>
+            <a:endParaRPr lang="en-US" dirty="0"/>
+          </a:p>
+        </p:txBody>
+      </p:sp>
+      <p:sp>
+        <p:nvSpPr>
+          <p:cNvPr id="8" name="Rectangle 7"/>
+          <p:cNvSpPr/>
+          <p:nvPr/>
+        </p:nvSpPr>
+        <p:spPr>
+          <a:xfrm>
+            <a:off x="1889760" y="1886712"/>
+            <a:ext cx="5230368" cy="682752"/>
+          </a:xfrm>
+          <a:prstGeom prst="rect">
+            <a:avLst/>
+          </a:prstGeom>
+        </p:spPr>
+        <p:style>
+          <a:lnRef idx="2">
+            <a:schemeClr val="accent1">
+              <a:shade val="50000"/>
+            </a:schemeClr>
+          </a:lnRef>
+          <a:fillRef idx="1">
+            <a:schemeClr val="accent1"/>
+          </a:fillRef>
+          <a:effectRef idx="0">
+            <a:schemeClr val="accent1"/>
+          </a:effectRef>
+          <a:fontRef idx="minor">
+            <a:schemeClr val="lt1"/>
+          </a:fontRef>
+        </p:style>
+        <p:txBody>
+          <a:bodyPr rtlCol="0" anchor="ctr"/>
+          <a:lstStyle/>
+          <a:p>
+            <a:pPr algn="ctr"/>
+            <a:r>
+              <a:rPr lang="en-US" dirty="0" err="1" smtClean="0"/>
+              <a:t>It_partner</a:t>
+            </a:r>
+            <a:r>
+              <a:rPr lang="en-US" dirty="0" smtClean="0"/>
+              <a:t> is not initial when CRM_ORDER_MAINTAIN is called</a:t>
+            </a:r>
+            <a:endParaRPr lang="en-US" dirty="0"/>
+          </a:p>
+        </p:txBody>
+      </p:sp>
+      <p:sp>
+        <p:nvSpPr>
+          <p:cNvPr id="10" name="Rectangle 9"/>
+          <p:cNvSpPr/>
+          <p:nvPr/>
+        </p:nvSpPr>
+        <p:spPr>
+          <a:xfrm>
+            <a:off x="1889760" y="329184"/>
+            <a:ext cx="5230368" cy="682752"/>
+          </a:xfrm>
+          <a:prstGeom prst="rect">
+            <a:avLst/>
+          </a:prstGeom>
+        </p:spPr>
+        <p:style>
+          <a:lnRef idx="2">
+            <a:schemeClr val="accent1">
+              <a:shade val="50000"/>
+            </a:schemeClr>
+          </a:lnRef>
+          <a:fillRef idx="1">
+            <a:schemeClr val="accent1"/>
+          </a:fillRef>
+          <a:effectRef idx="0">
+            <a:schemeClr val="accent1"/>
+          </a:effectRef>
+          <a:fontRef idx="minor">
+            <a:schemeClr val="lt1"/>
+          </a:fontRef>
+        </p:style>
+        <p:txBody>
+          <a:bodyPr rtlCol="0" anchor="ctr"/>
+          <a:lstStyle/>
+          <a:p>
+            <a:pPr algn="ctr"/>
+            <a:r>
+              <a:rPr lang="en-US" dirty="0" smtClean="0"/>
+              <a:t>Fields belongs to context node which is bound to </a:t>
+            </a:r>
+            <a:r>
+              <a:rPr lang="en-US" dirty="0" err="1" smtClean="0"/>
+              <a:t>BTPartner</a:t>
+            </a:r>
+            <a:r>
+              <a:rPr lang="en-US" dirty="0" smtClean="0"/>
+              <a:t> are changed in UI</a:t>
+            </a:r>
+            <a:endParaRPr lang="en-US" dirty="0"/>
+          </a:p>
+        </p:txBody>
+      </p:sp>
+      <p:cxnSp>
+        <p:nvCxnSpPr>
+          <p:cNvPr id="12" name="Straight Arrow Connector 11"/>
+          <p:cNvCxnSpPr>
+            <a:stCxn id="10" idx="2"/>
+            <a:endCxn id="8" idx="0"/>
+          </p:cNvCxnSpPr>
+          <p:nvPr/>
+        </p:nvCxnSpPr>
+        <p:spPr>
+          <a:xfrm>
+            <a:off x="4504944" y="1011936"/>
+            <a:ext cx="0" cy="874776"/>
+          </a:xfrm>
+          <a:prstGeom prst="straightConnector1">
+            <a:avLst/>
+          </a:prstGeom>
+          <a:ln w="25400">
+            <a:solidFill>
+              <a:srgbClr val="FF0000"/>
+            </a:solidFill>
+            <a:tailEnd type="triangle"/>
+          </a:ln>
+        </p:spPr>
+        <p:style>
+          <a:lnRef idx="1">
+            <a:schemeClr val="accent1"/>
+          </a:lnRef>
+          <a:fillRef idx="0">
+            <a:schemeClr val="accent1"/>
+          </a:fillRef>
+          <a:effectRef idx="0">
+            <a:schemeClr val="accent1"/>
+          </a:effectRef>
+          <a:fontRef idx="minor">
+            <a:schemeClr val="tx1"/>
+          </a:fontRef>
+        </p:style>
+      </p:cxnSp>
+      <p:cxnSp>
+        <p:nvCxnSpPr>
+          <p:cNvPr id="14" name="Straight Arrow Connector 13"/>
+          <p:cNvCxnSpPr>
+            <a:stCxn id="8" idx="2"/>
+          </p:cNvCxnSpPr>
+          <p:nvPr/>
+        </p:nvCxnSpPr>
+        <p:spPr>
+          <a:xfrm>
+            <a:off x="4504944" y="2569464"/>
+            <a:ext cx="0" cy="1046095"/>
+          </a:xfrm>
+          <a:prstGeom prst="straightConnector1">
+            <a:avLst/>
+          </a:prstGeom>
+          <a:ln w="25400">
+            <a:solidFill>
+              <a:srgbClr val="FF0000"/>
+            </a:solidFill>
+            <a:tailEnd type="triangle"/>
+          </a:ln>
+        </p:spPr>
+        <p:style>
+          <a:lnRef idx="1">
+            <a:schemeClr val="accent1"/>
+          </a:lnRef>
+          <a:fillRef idx="0">
+            <a:schemeClr val="accent1"/>
+          </a:fillRef>
+          <a:effectRef idx="0">
+            <a:schemeClr val="accent1"/>
+          </a:effectRef>
+          <a:fontRef idx="minor">
+            <a:schemeClr val="tx1"/>
+          </a:fontRef>
+        </p:style>
+      </p:cxnSp>
+      <p:cxnSp>
+        <p:nvCxnSpPr>
+          <p:cNvPr id="16" name="Straight Arrow Connector 15"/>
+          <p:cNvCxnSpPr>
+            <a:endCxn id="3" idx="0"/>
+          </p:cNvCxnSpPr>
+          <p:nvPr/>
+        </p:nvCxnSpPr>
+        <p:spPr>
+          <a:xfrm>
+            <a:off x="4504944" y="4298311"/>
+            <a:ext cx="0" cy="949821"/>
+          </a:xfrm>
+          <a:prstGeom prst="straightConnector1">
+            <a:avLst/>
+          </a:prstGeom>
+          <a:ln w="25400">
+            <a:solidFill>
+              <a:srgbClr val="FF0000"/>
+            </a:solidFill>
+            <a:tailEnd type="triangle"/>
+          </a:ln>
+        </p:spPr>
+        <p:style>
+          <a:lnRef idx="1">
+            <a:schemeClr val="accent1"/>
+          </a:lnRef>
+          <a:fillRef idx="0">
+            <a:schemeClr val="accent1"/>
+          </a:fillRef>
+          <a:effectRef idx="0">
+            <a:schemeClr val="accent1"/>
+          </a:effectRef>
+          <a:fontRef idx="minor">
+            <a:schemeClr val="tx1"/>
+          </a:fontRef>
+        </p:style>
+      </p:cxnSp>
+    </p:spTree>
+    <p:extLst>
+      <p:ext uri="{BB962C8B-B14F-4D97-AF65-F5344CB8AC3E}">
+        <p14:creationId xmlns:p14="http://schemas.microsoft.com/office/powerpoint/2010/main" val="1848839220"/>
       </p:ext>
     </p:extLst>
   </p:cSld>

</xml_diff>

<commit_message>
add sleep simulation and graph for cyclomatic complexity
</commit_message>
<xml_diff>
--- a/Jerry.pptx
+++ b/Jerry.pptx
@@ -5,13 +5,14 @@
     <p:sldMasterId id="2147483648" r:id="rId1"/>
   </p:sldMasterIdLst>
   <p:notesMasterIdLst>
-    <p:notesMasterId r:id="rId6"/>
+    <p:notesMasterId r:id="rId7"/>
   </p:notesMasterIdLst>
   <p:sldIdLst>
     <p:sldId id="257" r:id="rId2"/>
     <p:sldId id="260" r:id="rId3"/>
     <p:sldId id="261" r:id="rId4"/>
     <p:sldId id="263" r:id="rId5"/>
+    <p:sldId id="264" r:id="rId6"/>
   </p:sldIdLst>
   <p:sldSz cx="12192000" cy="6858000"/>
   <p:notesSz cx="6858000" cy="9144000"/>
@@ -200,7 +201,7 @@
           <a:p>
             <a:fld id="{C1FFF932-AE32-4CB2-A004-ABC55BBBB993}" type="datetimeFigureOut">
               <a:rPr lang="en-US" smtClean="0"/>
-              <a:t>6/8/2015</a:t>
+              <a:t>6/15/2015</a:t>
             </a:fld>
             <a:endParaRPr lang="en-US"/>
           </a:p>
@@ -1522,6 +1523,90 @@
 </p:notes>
 </file>
 
+<file path=ppt/notesSlides/notesSlide3.xml><?xml version="1.0" encoding="utf-8"?>
+<p:notes xmlns:a="http://schemas.openxmlformats.org/drawingml/2006/main" xmlns:r="http://schemas.openxmlformats.org/officeDocument/2006/relationships" xmlns:p="http://schemas.openxmlformats.org/presentationml/2006/main">
+  <p:cSld>
+    <p:spTree>
+      <p:nvGrpSpPr>
+        <p:cNvPr id="1" name=""/>
+        <p:cNvGrpSpPr/>
+        <p:nvPr/>
+      </p:nvGrpSpPr>
+      <p:grpSpPr>
+        <a:xfrm>
+          <a:off x="0" y="0"/>
+          <a:ext cx="0" cy="0"/>
+          <a:chOff x="0" y="0"/>
+          <a:chExt cx="0" cy="0"/>
+        </a:xfrm>
+      </p:grpSpPr>
+      <p:sp>
+        <p:nvSpPr>
+          <p:cNvPr id="2" name="Slide Image Placeholder 1"/>
+          <p:cNvSpPr>
+            <a:spLocks noGrp="1" noRot="1" noChangeAspect="1"/>
+          </p:cNvSpPr>
+          <p:nvPr>
+            <p:ph type="sldImg"/>
+          </p:nvPr>
+        </p:nvSpPr>
+        <p:spPr/>
+      </p:sp>
+      <p:sp>
+        <p:nvSpPr>
+          <p:cNvPr id="3" name="Notes Placeholder 2"/>
+          <p:cNvSpPr>
+            <a:spLocks noGrp="1"/>
+          </p:cNvSpPr>
+          <p:nvPr>
+            <p:ph type="body" idx="1"/>
+          </p:nvPr>
+        </p:nvSpPr>
+        <p:spPr/>
+        <p:txBody>
+          <a:bodyPr/>
+          <a:lstStyle/>
+          <a:p>
+            <a:endParaRPr lang="en-US" dirty="0"/>
+          </a:p>
+        </p:txBody>
+      </p:sp>
+      <p:sp>
+        <p:nvSpPr>
+          <p:cNvPr id="4" name="Slide Number Placeholder 3"/>
+          <p:cNvSpPr>
+            <a:spLocks noGrp="1"/>
+          </p:cNvSpPr>
+          <p:nvPr>
+            <p:ph type="sldNum" sz="quarter" idx="10"/>
+          </p:nvPr>
+        </p:nvSpPr>
+        <p:spPr/>
+        <p:txBody>
+          <a:bodyPr/>
+          <a:lstStyle/>
+          <a:p>
+            <a:fld id="{25B1E16C-EC52-46D5-9BB3-59AA4A442EA6}" type="slidenum">
+              <a:rPr lang="en-US" smtClean="0"/>
+              <a:t>5</a:t>
+            </a:fld>
+            <a:endParaRPr lang="en-US"/>
+          </a:p>
+        </p:txBody>
+      </p:sp>
+    </p:spTree>
+    <p:extLst>
+      <p:ext uri="{BB962C8B-B14F-4D97-AF65-F5344CB8AC3E}">
+        <p14:creationId xmlns:p14="http://schemas.microsoft.com/office/powerpoint/2010/main" val="46433159"/>
+      </p:ext>
+    </p:extLst>
+  </p:cSld>
+  <p:clrMapOvr>
+    <a:masterClrMapping/>
+  </p:clrMapOvr>
+</p:notes>
+</file>
+
 <file path=ppt/slideLayouts/slideLayout1.xml><?xml version="1.0" encoding="utf-8"?>
 <p:sldLayout xmlns:a="http://schemas.openxmlformats.org/drawingml/2006/main" xmlns:r="http://schemas.openxmlformats.org/officeDocument/2006/relationships" xmlns:p="http://schemas.openxmlformats.org/presentationml/2006/main" type="title" preserve="1">
   <p:cSld name="Title Slide">
@@ -1653,7 +1738,7 @@
           <a:p>
             <a:fld id="{32885C6E-53D4-4DF2-B9C6-C242624B2A8A}" type="datetimeFigureOut">
               <a:rPr lang="en-US" smtClean="0"/>
-              <a:t>6/8/2015</a:t>
+              <a:t>6/15/2015</a:t>
             </a:fld>
             <a:endParaRPr lang="en-US"/>
           </a:p>
@@ -1823,7 +1908,7 @@
           <a:p>
             <a:fld id="{32885C6E-53D4-4DF2-B9C6-C242624B2A8A}" type="datetimeFigureOut">
               <a:rPr lang="en-US" smtClean="0"/>
-              <a:t>6/8/2015</a:t>
+              <a:t>6/15/2015</a:t>
             </a:fld>
             <a:endParaRPr lang="en-US"/>
           </a:p>
@@ -2003,7 +2088,7 @@
           <a:p>
             <a:fld id="{32885C6E-53D4-4DF2-B9C6-C242624B2A8A}" type="datetimeFigureOut">
               <a:rPr lang="en-US" smtClean="0"/>
-              <a:t>6/8/2015</a:t>
+              <a:t>6/15/2015</a:t>
             </a:fld>
             <a:endParaRPr lang="en-US"/>
           </a:p>
@@ -2173,7 +2258,7 @@
           <a:p>
             <a:fld id="{32885C6E-53D4-4DF2-B9C6-C242624B2A8A}" type="datetimeFigureOut">
               <a:rPr lang="en-US" smtClean="0"/>
-              <a:t>6/8/2015</a:t>
+              <a:t>6/15/2015</a:t>
             </a:fld>
             <a:endParaRPr lang="en-US"/>
           </a:p>
@@ -2419,7 +2504,7 @@
           <a:p>
             <a:fld id="{32885C6E-53D4-4DF2-B9C6-C242624B2A8A}" type="datetimeFigureOut">
               <a:rPr lang="en-US" smtClean="0"/>
-              <a:t>6/8/2015</a:t>
+              <a:t>6/15/2015</a:t>
             </a:fld>
             <a:endParaRPr lang="en-US"/>
           </a:p>
@@ -2651,7 +2736,7 @@
           <a:p>
             <a:fld id="{32885C6E-53D4-4DF2-B9C6-C242624B2A8A}" type="datetimeFigureOut">
               <a:rPr lang="en-US" smtClean="0"/>
-              <a:t>6/8/2015</a:t>
+              <a:t>6/15/2015</a:t>
             </a:fld>
             <a:endParaRPr lang="en-US"/>
           </a:p>
@@ -3018,7 +3103,7 @@
           <a:p>
             <a:fld id="{32885C6E-53D4-4DF2-B9C6-C242624B2A8A}" type="datetimeFigureOut">
               <a:rPr lang="en-US" smtClean="0"/>
-              <a:t>6/8/2015</a:t>
+              <a:t>6/15/2015</a:t>
             </a:fld>
             <a:endParaRPr lang="en-US"/>
           </a:p>
@@ -3136,7 +3221,7 @@
           <a:p>
             <a:fld id="{32885C6E-53D4-4DF2-B9C6-C242624B2A8A}" type="datetimeFigureOut">
               <a:rPr lang="en-US" smtClean="0"/>
-              <a:t>6/8/2015</a:t>
+              <a:t>6/15/2015</a:t>
             </a:fld>
             <a:endParaRPr lang="en-US"/>
           </a:p>
@@ -3231,7 +3316,7 @@
           <a:p>
             <a:fld id="{32885C6E-53D4-4DF2-B9C6-C242624B2A8A}" type="datetimeFigureOut">
               <a:rPr lang="en-US" smtClean="0"/>
-              <a:t>6/8/2015</a:t>
+              <a:t>6/15/2015</a:t>
             </a:fld>
             <a:endParaRPr lang="en-US"/>
           </a:p>
@@ -3508,7 +3593,7 @@
           <a:p>
             <a:fld id="{32885C6E-53D4-4DF2-B9C6-C242624B2A8A}" type="datetimeFigureOut">
               <a:rPr lang="en-US" smtClean="0"/>
-              <a:t>6/8/2015</a:t>
+              <a:t>6/15/2015</a:t>
             </a:fld>
             <a:endParaRPr lang="en-US"/>
           </a:p>
@@ -3761,7 +3846,7 @@
           <a:p>
             <a:fld id="{32885C6E-53D4-4DF2-B9C6-C242624B2A8A}" type="datetimeFigureOut">
               <a:rPr lang="en-US" smtClean="0"/>
-              <a:t>6/8/2015</a:t>
+              <a:t>6/15/2015</a:t>
             </a:fld>
             <a:endParaRPr lang="en-US"/>
           </a:p>
@@ -3974,7 +4059,7 @@
           <a:p>
             <a:fld id="{32885C6E-53D4-4DF2-B9C6-C242624B2A8A}" type="datetimeFigureOut">
               <a:rPr lang="en-US" smtClean="0"/>
-              <a:t>6/8/2015</a:t>
+              <a:t>6/15/2015</a:t>
             </a:fld>
             <a:endParaRPr lang="en-US"/>
           </a:p>
@@ -6938,6 +7023,408 @@
       </p:par>
     </p:tnLst>
   </p:timing>
+</p:sld>
+</file>
+
+<file path=ppt/slides/slide5.xml><?xml version="1.0" encoding="utf-8"?>
+<p:sld xmlns:a="http://schemas.openxmlformats.org/drawingml/2006/main" xmlns:r="http://schemas.openxmlformats.org/officeDocument/2006/relationships" xmlns:p="http://schemas.openxmlformats.org/presentationml/2006/main">
+  <p:cSld>
+    <p:spTree>
+      <p:nvGrpSpPr>
+        <p:cNvPr id="1" name=""/>
+        <p:cNvGrpSpPr/>
+        <p:nvPr/>
+      </p:nvGrpSpPr>
+      <p:grpSpPr>
+        <a:xfrm>
+          <a:off x="0" y="0"/>
+          <a:ext cx="0" cy="0"/>
+          <a:chOff x="0" y="0"/>
+          <a:chExt cx="0" cy="0"/>
+        </a:xfrm>
+      </p:grpSpPr>
+      <p:sp>
+        <p:nvSpPr>
+          <p:cNvPr id="3" name="Flowchart: Decision 2"/>
+          <p:cNvSpPr/>
+          <p:nvPr/>
+        </p:nvSpPr>
+        <p:spPr>
+          <a:xfrm>
+            <a:off x="987552" y="1109472"/>
+            <a:ext cx="2426208" cy="1121664"/>
+          </a:xfrm>
+          <a:prstGeom prst="flowChartDecision">
+            <a:avLst/>
+          </a:prstGeom>
+        </p:spPr>
+        <p:style>
+          <a:lnRef idx="2">
+            <a:schemeClr val="accent1">
+              <a:shade val="50000"/>
+            </a:schemeClr>
+          </a:lnRef>
+          <a:fillRef idx="1">
+            <a:schemeClr val="accent1"/>
+          </a:fillRef>
+          <a:effectRef idx="0">
+            <a:schemeClr val="accent1"/>
+          </a:effectRef>
+          <a:fontRef idx="minor">
+            <a:schemeClr val="lt1"/>
+          </a:fontRef>
+        </p:style>
+        <p:txBody>
+          <a:bodyPr rtlCol="0" anchor="ctr"/>
+          <a:lstStyle/>
+          <a:p>
+            <a:pPr algn="ctr"/>
+            <a:r>
+              <a:rPr lang="en-US" dirty="0" smtClean="0"/>
+              <a:t>Is </a:t>
+            </a:r>
+            <a:r>
+              <a:rPr lang="en-US" dirty="0" err="1" smtClean="0"/>
+              <a:t>lv_value</a:t>
+            </a:r>
+            <a:r>
+              <a:rPr lang="en-US" dirty="0" smtClean="0"/>
+              <a:t> = 1?</a:t>
+            </a:r>
+            <a:endParaRPr lang="en-US" dirty="0"/>
+          </a:p>
+        </p:txBody>
+      </p:sp>
+      <p:sp>
+        <p:nvSpPr>
+          <p:cNvPr id="6" name="TextBox 5"/>
+          <p:cNvSpPr txBox="1"/>
+          <p:nvPr/>
+        </p:nvSpPr>
+        <p:spPr>
+          <a:xfrm>
+            <a:off x="1609344" y="2808470"/>
+            <a:ext cx="859536" cy="369332"/>
+          </a:xfrm>
+          <a:prstGeom prst="rect">
+            <a:avLst/>
+          </a:prstGeom>
+          <a:noFill/>
+        </p:spPr>
+        <p:txBody>
+          <a:bodyPr wrap="square" rtlCol="0">
+            <a:spAutoFit/>
+          </a:bodyPr>
+          <a:lstStyle/>
+          <a:p>
+            <a:r>
+              <a:rPr lang="en-US" dirty="0" smtClean="0"/>
+              <a:t>Yes</a:t>
+            </a:r>
+            <a:endParaRPr lang="en-US" dirty="0"/>
+          </a:p>
+        </p:txBody>
+      </p:sp>
+      <p:sp>
+        <p:nvSpPr>
+          <p:cNvPr id="7" name="Flowchart: Decision 6"/>
+          <p:cNvSpPr/>
+          <p:nvPr/>
+        </p:nvSpPr>
+        <p:spPr>
+          <a:xfrm>
+            <a:off x="3931920" y="2149364"/>
+            <a:ext cx="2426208" cy="1121664"/>
+          </a:xfrm>
+          <a:prstGeom prst="flowChartDecision">
+            <a:avLst/>
+          </a:prstGeom>
+        </p:spPr>
+        <p:style>
+          <a:lnRef idx="2">
+            <a:schemeClr val="accent1">
+              <a:shade val="50000"/>
+            </a:schemeClr>
+          </a:lnRef>
+          <a:fillRef idx="1">
+            <a:schemeClr val="accent1"/>
+          </a:fillRef>
+          <a:effectRef idx="0">
+            <a:schemeClr val="accent1"/>
+          </a:effectRef>
+          <a:fontRef idx="minor">
+            <a:schemeClr val="lt1"/>
+          </a:fontRef>
+        </p:style>
+        <p:txBody>
+          <a:bodyPr rtlCol="0" anchor="ctr"/>
+          <a:lstStyle/>
+          <a:p>
+            <a:pPr algn="ctr"/>
+            <a:r>
+              <a:rPr lang="en-US" dirty="0" smtClean="0"/>
+              <a:t>Is </a:t>
+            </a:r>
+            <a:r>
+              <a:rPr lang="en-US" dirty="0" err="1" smtClean="0"/>
+              <a:t>lv_value</a:t>
+            </a:r>
+            <a:r>
+              <a:rPr lang="en-US" dirty="0" smtClean="0"/>
+              <a:t> = 2?</a:t>
+            </a:r>
+            <a:endParaRPr lang="en-US" dirty="0"/>
+          </a:p>
+        </p:txBody>
+      </p:sp>
+      <p:cxnSp>
+        <p:nvCxnSpPr>
+          <p:cNvPr id="9" name="Elbow Connector 8"/>
+          <p:cNvCxnSpPr>
+            <a:stCxn id="3" idx="3"/>
+            <a:endCxn id="7" idx="0"/>
+          </p:cNvCxnSpPr>
+          <p:nvPr/>
+        </p:nvCxnSpPr>
+        <p:spPr>
+          <a:xfrm>
+            <a:off x="3413760" y="1670304"/>
+            <a:ext cx="1731264" cy="479060"/>
+          </a:xfrm>
+          <a:prstGeom prst="bentConnector2">
+            <a:avLst/>
+          </a:prstGeom>
+          <a:ln>
+            <a:tailEnd type="triangle"/>
+          </a:ln>
+        </p:spPr>
+        <p:style>
+          <a:lnRef idx="1">
+            <a:schemeClr val="accent1"/>
+          </a:lnRef>
+          <a:fillRef idx="0">
+            <a:schemeClr val="accent1"/>
+          </a:fillRef>
+          <a:effectRef idx="0">
+            <a:schemeClr val="accent1"/>
+          </a:effectRef>
+          <a:fontRef idx="minor">
+            <a:schemeClr val="tx1"/>
+          </a:fontRef>
+        </p:style>
+      </p:cxnSp>
+      <p:sp>
+        <p:nvSpPr>
+          <p:cNvPr id="11" name="TextBox 10"/>
+          <p:cNvSpPr txBox="1"/>
+          <p:nvPr/>
+        </p:nvSpPr>
+        <p:spPr>
+          <a:xfrm>
+            <a:off x="4398264" y="1300972"/>
+            <a:ext cx="902208" cy="369332"/>
+          </a:xfrm>
+          <a:prstGeom prst="rect">
+            <a:avLst/>
+          </a:prstGeom>
+          <a:noFill/>
+        </p:spPr>
+        <p:txBody>
+          <a:bodyPr wrap="square" rtlCol="0">
+            <a:spAutoFit/>
+          </a:bodyPr>
+          <a:lstStyle/>
+          <a:p>
+            <a:r>
+              <a:rPr lang="en-US" dirty="0" smtClean="0"/>
+              <a:t>No</a:t>
+            </a:r>
+            <a:endParaRPr lang="en-US" dirty="0"/>
+          </a:p>
+        </p:txBody>
+      </p:sp>
+      <p:cxnSp>
+        <p:nvCxnSpPr>
+          <p:cNvPr id="14" name="Straight Arrow Connector 13"/>
+          <p:cNvCxnSpPr/>
+          <p:nvPr/>
+        </p:nvCxnSpPr>
+        <p:spPr>
+          <a:xfrm flipH="1">
+            <a:off x="5145024" y="3291102"/>
+            <a:ext cx="12192" cy="1785080"/>
+          </a:xfrm>
+          <a:prstGeom prst="straightConnector1">
+            <a:avLst/>
+          </a:prstGeom>
+          <a:ln w="76200">
+            <a:solidFill>
+              <a:srgbClr val="FF0000"/>
+            </a:solidFill>
+            <a:tailEnd type="triangle"/>
+          </a:ln>
+        </p:spPr>
+        <p:style>
+          <a:lnRef idx="1">
+            <a:schemeClr val="accent1"/>
+          </a:lnRef>
+          <a:fillRef idx="0">
+            <a:schemeClr val="accent1"/>
+          </a:fillRef>
+          <a:effectRef idx="0">
+            <a:schemeClr val="accent1"/>
+          </a:effectRef>
+          <a:fontRef idx="minor">
+            <a:schemeClr val="tx1"/>
+          </a:fontRef>
+        </p:style>
+      </p:cxnSp>
+      <p:sp>
+        <p:nvSpPr>
+          <p:cNvPr id="16" name="TextBox 15"/>
+          <p:cNvSpPr txBox="1"/>
+          <p:nvPr/>
+        </p:nvSpPr>
+        <p:spPr>
+          <a:xfrm>
+            <a:off x="5145024" y="3310497"/>
+            <a:ext cx="768096" cy="369332"/>
+          </a:xfrm>
+          <a:prstGeom prst="rect">
+            <a:avLst/>
+          </a:prstGeom>
+          <a:noFill/>
+        </p:spPr>
+        <p:txBody>
+          <a:bodyPr wrap="square" rtlCol="0">
+            <a:spAutoFit/>
+          </a:bodyPr>
+          <a:lstStyle/>
+          <a:p>
+            <a:r>
+              <a:rPr lang="en-US" dirty="0" smtClean="0"/>
+              <a:t>Yes</a:t>
+            </a:r>
+            <a:endParaRPr lang="en-US" dirty="0"/>
+          </a:p>
+        </p:txBody>
+      </p:sp>
+      <p:cxnSp>
+        <p:nvCxnSpPr>
+          <p:cNvPr id="18" name="Elbow Connector 17"/>
+          <p:cNvCxnSpPr>
+            <a:stCxn id="7" idx="3"/>
+          </p:cNvCxnSpPr>
+          <p:nvPr/>
+        </p:nvCxnSpPr>
+        <p:spPr>
+          <a:xfrm flipH="1">
+            <a:off x="5215128" y="2710196"/>
+            <a:ext cx="1143000" cy="2264140"/>
+          </a:xfrm>
+          <a:prstGeom prst="bentConnector4">
+            <a:avLst>
+              <a:gd name="adj1" fmla="val -20000"/>
+              <a:gd name="adj2" fmla="val 62385"/>
+            </a:avLst>
+          </a:prstGeom>
+          <a:ln w="76200">
+            <a:solidFill>
+              <a:srgbClr val="00B050"/>
+            </a:solidFill>
+            <a:tailEnd type="triangle"/>
+          </a:ln>
+        </p:spPr>
+        <p:style>
+          <a:lnRef idx="1">
+            <a:schemeClr val="accent1"/>
+          </a:lnRef>
+          <a:fillRef idx="0">
+            <a:schemeClr val="accent1"/>
+          </a:fillRef>
+          <a:effectRef idx="0">
+            <a:schemeClr val="accent1"/>
+          </a:effectRef>
+          <a:fontRef idx="minor">
+            <a:schemeClr val="tx1"/>
+          </a:fontRef>
+        </p:style>
+      </p:cxnSp>
+      <p:sp>
+        <p:nvSpPr>
+          <p:cNvPr id="20" name="TextBox 19"/>
+          <p:cNvSpPr txBox="1"/>
+          <p:nvPr/>
+        </p:nvSpPr>
+        <p:spPr>
+          <a:xfrm>
+            <a:off x="6571488" y="3430262"/>
+            <a:ext cx="731520" cy="369332"/>
+          </a:xfrm>
+          <a:prstGeom prst="rect">
+            <a:avLst/>
+          </a:prstGeom>
+          <a:noFill/>
+        </p:spPr>
+        <p:txBody>
+          <a:bodyPr wrap="square" rtlCol="0">
+            <a:spAutoFit/>
+          </a:bodyPr>
+          <a:lstStyle/>
+          <a:p>
+            <a:r>
+              <a:rPr lang="en-US" dirty="0" smtClean="0"/>
+              <a:t>No</a:t>
+            </a:r>
+            <a:endParaRPr lang="en-US" dirty="0"/>
+          </a:p>
+        </p:txBody>
+      </p:sp>
+      <p:cxnSp>
+        <p:nvCxnSpPr>
+          <p:cNvPr id="23" name="Elbow Connector 22"/>
+          <p:cNvCxnSpPr>
+            <a:stCxn id="3" idx="2"/>
+          </p:cNvCxnSpPr>
+          <p:nvPr/>
+        </p:nvCxnSpPr>
+        <p:spPr>
+          <a:xfrm rot="16200000" flipH="1">
+            <a:off x="2307336" y="2124456"/>
+            <a:ext cx="2743200" cy="2956560"/>
+          </a:xfrm>
+          <a:prstGeom prst="bentConnector2">
+            <a:avLst/>
+          </a:prstGeom>
+          <a:ln w="76200">
+            <a:tailEnd type="triangle"/>
+          </a:ln>
+        </p:spPr>
+        <p:style>
+          <a:lnRef idx="1">
+            <a:schemeClr val="dk1"/>
+          </a:lnRef>
+          <a:fillRef idx="0">
+            <a:schemeClr val="dk1"/>
+          </a:fillRef>
+          <a:effectRef idx="0">
+            <a:schemeClr val="dk1"/>
+          </a:effectRef>
+          <a:fontRef idx="minor">
+            <a:schemeClr val="tx1"/>
+          </a:fontRef>
+        </p:style>
+      </p:cxnSp>
+    </p:spTree>
+    <p:extLst>
+      <p:ext uri="{BB962C8B-B14F-4D97-AF65-F5344CB8AC3E}">
+        <p14:creationId xmlns:p14="http://schemas.microsoft.com/office/powerpoint/2010/main" val="265481716"/>
+      </p:ext>
+    </p:extLst>
+  </p:cSld>
+  <p:clrMapOvr>
+    <a:masterClrMapping/>
+  </p:clrMapOvr>
 </p:sld>
 </file>
 

</xml_diff>

<commit_message>
add diagram for ERCO participant filtering
</commit_message>
<xml_diff>
--- a/Jerry.pptx
+++ b/Jerry.pptx
@@ -5,7 +5,7 @@
     <p:sldMasterId id="2147483648" r:id="rId1"/>
   </p:sldMasterIdLst>
   <p:notesMasterIdLst>
-    <p:notesMasterId r:id="rId7"/>
+    <p:notesMasterId r:id="rId8"/>
   </p:notesMasterIdLst>
   <p:sldIdLst>
     <p:sldId id="257" r:id="rId2"/>
@@ -13,6 +13,7 @@
     <p:sldId id="261" r:id="rId4"/>
     <p:sldId id="263" r:id="rId5"/>
     <p:sldId id="264" r:id="rId6"/>
+    <p:sldId id="265" r:id="rId7"/>
   </p:sldIdLst>
   <p:sldSz cx="12192000" cy="6858000"/>
   <p:notesSz cx="6858000" cy="9144000"/>
@@ -201,7 +202,7 @@
           <a:p>
             <a:fld id="{C1FFF932-AE32-4CB2-A004-ABC55BBBB993}" type="datetimeFigureOut">
               <a:rPr lang="en-US" smtClean="0"/>
-              <a:t>6/15/2015</a:t>
+              <a:t>7/9/2015</a:t>
             </a:fld>
             <a:endParaRPr lang="en-US"/>
           </a:p>
@@ -1738,7 +1739,7 @@
           <a:p>
             <a:fld id="{32885C6E-53D4-4DF2-B9C6-C242624B2A8A}" type="datetimeFigureOut">
               <a:rPr lang="en-US" smtClean="0"/>
-              <a:t>6/15/2015</a:t>
+              <a:t>7/9/2015</a:t>
             </a:fld>
             <a:endParaRPr lang="en-US"/>
           </a:p>
@@ -1908,7 +1909,7 @@
           <a:p>
             <a:fld id="{32885C6E-53D4-4DF2-B9C6-C242624B2A8A}" type="datetimeFigureOut">
               <a:rPr lang="en-US" smtClean="0"/>
-              <a:t>6/15/2015</a:t>
+              <a:t>7/9/2015</a:t>
             </a:fld>
             <a:endParaRPr lang="en-US"/>
           </a:p>
@@ -2088,7 +2089,7 @@
           <a:p>
             <a:fld id="{32885C6E-53D4-4DF2-B9C6-C242624B2A8A}" type="datetimeFigureOut">
               <a:rPr lang="en-US" smtClean="0"/>
-              <a:t>6/15/2015</a:t>
+              <a:t>7/9/2015</a:t>
             </a:fld>
             <a:endParaRPr lang="en-US"/>
           </a:p>
@@ -2258,7 +2259,7 @@
           <a:p>
             <a:fld id="{32885C6E-53D4-4DF2-B9C6-C242624B2A8A}" type="datetimeFigureOut">
               <a:rPr lang="en-US" smtClean="0"/>
-              <a:t>6/15/2015</a:t>
+              <a:t>7/9/2015</a:t>
             </a:fld>
             <a:endParaRPr lang="en-US"/>
           </a:p>
@@ -2504,7 +2505,7 @@
           <a:p>
             <a:fld id="{32885C6E-53D4-4DF2-B9C6-C242624B2A8A}" type="datetimeFigureOut">
               <a:rPr lang="en-US" smtClean="0"/>
-              <a:t>6/15/2015</a:t>
+              <a:t>7/9/2015</a:t>
             </a:fld>
             <a:endParaRPr lang="en-US"/>
           </a:p>
@@ -2736,7 +2737,7 @@
           <a:p>
             <a:fld id="{32885C6E-53D4-4DF2-B9C6-C242624B2A8A}" type="datetimeFigureOut">
               <a:rPr lang="en-US" smtClean="0"/>
-              <a:t>6/15/2015</a:t>
+              <a:t>7/9/2015</a:t>
             </a:fld>
             <a:endParaRPr lang="en-US"/>
           </a:p>
@@ -3103,7 +3104,7 @@
           <a:p>
             <a:fld id="{32885C6E-53D4-4DF2-B9C6-C242624B2A8A}" type="datetimeFigureOut">
               <a:rPr lang="en-US" smtClean="0"/>
-              <a:t>6/15/2015</a:t>
+              <a:t>7/9/2015</a:t>
             </a:fld>
             <a:endParaRPr lang="en-US"/>
           </a:p>
@@ -3221,7 +3222,7 @@
           <a:p>
             <a:fld id="{32885C6E-53D4-4DF2-B9C6-C242624B2A8A}" type="datetimeFigureOut">
               <a:rPr lang="en-US" smtClean="0"/>
-              <a:t>6/15/2015</a:t>
+              <a:t>7/9/2015</a:t>
             </a:fld>
             <a:endParaRPr lang="en-US"/>
           </a:p>
@@ -3316,7 +3317,7 @@
           <a:p>
             <a:fld id="{32885C6E-53D4-4DF2-B9C6-C242624B2A8A}" type="datetimeFigureOut">
               <a:rPr lang="en-US" smtClean="0"/>
-              <a:t>6/15/2015</a:t>
+              <a:t>7/9/2015</a:t>
             </a:fld>
             <a:endParaRPr lang="en-US"/>
           </a:p>
@@ -3593,7 +3594,7 @@
           <a:p>
             <a:fld id="{32885C6E-53D4-4DF2-B9C6-C242624B2A8A}" type="datetimeFigureOut">
               <a:rPr lang="en-US" smtClean="0"/>
-              <a:t>6/15/2015</a:t>
+              <a:t>7/9/2015</a:t>
             </a:fld>
             <a:endParaRPr lang="en-US"/>
           </a:p>
@@ -3846,7 +3847,7 @@
           <a:p>
             <a:fld id="{32885C6E-53D4-4DF2-B9C6-C242624B2A8A}" type="datetimeFigureOut">
               <a:rPr lang="en-US" smtClean="0"/>
-              <a:t>6/15/2015</a:t>
+              <a:t>7/9/2015</a:t>
             </a:fld>
             <a:endParaRPr lang="en-US"/>
           </a:p>
@@ -4059,7 +4060,7 @@
           <a:p>
             <a:fld id="{32885C6E-53D4-4DF2-B9C6-C242624B2A8A}" type="datetimeFigureOut">
               <a:rPr lang="en-US" smtClean="0"/>
-              <a:t>6/15/2015</a:t>
+              <a:t>7/9/2015</a:t>
             </a:fld>
             <a:endParaRPr lang="en-US"/>
           </a:p>
@@ -7419,6 +7420,36 @@
     <p:extLst>
       <p:ext uri="{BB962C8B-B14F-4D97-AF65-F5344CB8AC3E}">
         <p14:creationId xmlns:p14="http://schemas.microsoft.com/office/powerpoint/2010/main" val="265481716"/>
+      </p:ext>
+    </p:extLst>
+  </p:cSld>
+  <p:clrMapOvr>
+    <a:masterClrMapping/>
+  </p:clrMapOvr>
+</p:sld>
+</file>
+
+<file path=ppt/slides/slide6.xml><?xml version="1.0" encoding="utf-8"?>
+<p:sld xmlns:a="http://schemas.openxmlformats.org/drawingml/2006/main" xmlns:r="http://schemas.openxmlformats.org/officeDocument/2006/relationships" xmlns:p="http://schemas.openxmlformats.org/presentationml/2006/main">
+  <p:cSld>
+    <p:spTree>
+      <p:nvGrpSpPr>
+        <p:cNvPr id="1" name=""/>
+        <p:cNvGrpSpPr/>
+        <p:nvPr/>
+      </p:nvGrpSpPr>
+      <p:grpSpPr>
+        <a:xfrm>
+          <a:off x="0" y="0"/>
+          <a:ext cx="0" cy="0"/>
+          <a:chOff x="0" y="0"/>
+          <a:chExt cx="0" cy="0"/>
+        </a:xfrm>
+      </p:grpSpPr>
+    </p:spTree>
+    <p:extLst>
+      <p:ext uri="{BB962C8B-B14F-4D97-AF65-F5344CB8AC3E}">
+        <p14:creationId xmlns:p14="http://schemas.microsoft.com/office/powerpoint/2010/main" val="4146448213"/>
       </p:ext>
     </p:extLst>
   </p:cSld>

</xml_diff>

<commit_message>
add some D3 example
</commit_message>
<xml_diff>
--- a/Jerry.pptx
+++ b/Jerry.pptx
@@ -202,7 +202,7 @@
           <a:p>
             <a:fld id="{C1FFF932-AE32-4CB2-A004-ABC55BBBB993}" type="datetimeFigureOut">
               <a:rPr lang="en-US" smtClean="0"/>
-              <a:t>7/9/2015</a:t>
+              <a:t>9/24/2015</a:t>
             </a:fld>
             <a:endParaRPr lang="en-US"/>
           </a:p>
@@ -1739,7 +1739,7 @@
           <a:p>
             <a:fld id="{32885C6E-53D4-4DF2-B9C6-C242624B2A8A}" type="datetimeFigureOut">
               <a:rPr lang="en-US" smtClean="0"/>
-              <a:t>7/9/2015</a:t>
+              <a:t>9/24/2015</a:t>
             </a:fld>
             <a:endParaRPr lang="en-US"/>
           </a:p>
@@ -1909,7 +1909,7 @@
           <a:p>
             <a:fld id="{32885C6E-53D4-4DF2-B9C6-C242624B2A8A}" type="datetimeFigureOut">
               <a:rPr lang="en-US" smtClean="0"/>
-              <a:t>7/9/2015</a:t>
+              <a:t>9/24/2015</a:t>
             </a:fld>
             <a:endParaRPr lang="en-US"/>
           </a:p>
@@ -2089,7 +2089,7 @@
           <a:p>
             <a:fld id="{32885C6E-53D4-4DF2-B9C6-C242624B2A8A}" type="datetimeFigureOut">
               <a:rPr lang="en-US" smtClean="0"/>
-              <a:t>7/9/2015</a:t>
+              <a:t>9/24/2015</a:t>
             </a:fld>
             <a:endParaRPr lang="en-US"/>
           </a:p>
@@ -2259,7 +2259,7 @@
           <a:p>
             <a:fld id="{32885C6E-53D4-4DF2-B9C6-C242624B2A8A}" type="datetimeFigureOut">
               <a:rPr lang="en-US" smtClean="0"/>
-              <a:t>7/9/2015</a:t>
+              <a:t>9/24/2015</a:t>
             </a:fld>
             <a:endParaRPr lang="en-US"/>
           </a:p>
@@ -2505,7 +2505,7 @@
           <a:p>
             <a:fld id="{32885C6E-53D4-4DF2-B9C6-C242624B2A8A}" type="datetimeFigureOut">
               <a:rPr lang="en-US" smtClean="0"/>
-              <a:t>7/9/2015</a:t>
+              <a:t>9/24/2015</a:t>
             </a:fld>
             <a:endParaRPr lang="en-US"/>
           </a:p>
@@ -2737,7 +2737,7 @@
           <a:p>
             <a:fld id="{32885C6E-53D4-4DF2-B9C6-C242624B2A8A}" type="datetimeFigureOut">
               <a:rPr lang="en-US" smtClean="0"/>
-              <a:t>7/9/2015</a:t>
+              <a:t>9/24/2015</a:t>
             </a:fld>
             <a:endParaRPr lang="en-US"/>
           </a:p>
@@ -3104,7 +3104,7 @@
           <a:p>
             <a:fld id="{32885C6E-53D4-4DF2-B9C6-C242624B2A8A}" type="datetimeFigureOut">
               <a:rPr lang="en-US" smtClean="0"/>
-              <a:t>7/9/2015</a:t>
+              <a:t>9/24/2015</a:t>
             </a:fld>
             <a:endParaRPr lang="en-US"/>
           </a:p>
@@ -3222,7 +3222,7 @@
           <a:p>
             <a:fld id="{32885C6E-53D4-4DF2-B9C6-C242624B2A8A}" type="datetimeFigureOut">
               <a:rPr lang="en-US" smtClean="0"/>
-              <a:t>7/9/2015</a:t>
+              <a:t>9/24/2015</a:t>
             </a:fld>
             <a:endParaRPr lang="en-US"/>
           </a:p>
@@ -3317,7 +3317,7 @@
           <a:p>
             <a:fld id="{32885C6E-53D4-4DF2-B9C6-C242624B2A8A}" type="datetimeFigureOut">
               <a:rPr lang="en-US" smtClean="0"/>
-              <a:t>7/9/2015</a:t>
+              <a:t>9/24/2015</a:t>
             </a:fld>
             <a:endParaRPr lang="en-US"/>
           </a:p>
@@ -3594,7 +3594,7 @@
           <a:p>
             <a:fld id="{32885C6E-53D4-4DF2-B9C6-C242624B2A8A}" type="datetimeFigureOut">
               <a:rPr lang="en-US" smtClean="0"/>
-              <a:t>7/9/2015</a:t>
+              <a:t>9/24/2015</a:t>
             </a:fld>
             <a:endParaRPr lang="en-US"/>
           </a:p>
@@ -3847,7 +3847,7 @@
           <a:p>
             <a:fld id="{32885C6E-53D4-4DF2-B9C6-C242624B2A8A}" type="datetimeFigureOut">
               <a:rPr lang="en-US" smtClean="0"/>
-              <a:t>7/9/2015</a:t>
+              <a:t>9/24/2015</a:t>
             </a:fld>
             <a:endParaRPr lang="en-US"/>
           </a:p>
@@ -4060,7 +4060,7 @@
           <a:p>
             <a:fld id="{32885C6E-53D4-4DF2-B9C6-C242624B2A8A}" type="datetimeFigureOut">
               <a:rPr lang="en-US" smtClean="0"/>
-              <a:t>7/9/2015</a:t>
+              <a:t>9/24/2015</a:t>
             </a:fld>
             <a:endParaRPr lang="en-US"/>
           </a:p>
@@ -7446,6 +7446,188 @@
           <a:chExt cx="0" cy="0"/>
         </a:xfrm>
       </p:grpSpPr>
+      <p:pic>
+        <p:nvPicPr>
+          <p:cNvPr id="2" name="Picture 1"/>
+          <p:cNvPicPr>
+            <a:picLocks noChangeAspect="1"/>
+          </p:cNvPicPr>
+          <p:nvPr/>
+        </p:nvPicPr>
+        <p:blipFill>
+          <a:blip r:embed="rId2"/>
+          <a:stretch>
+            <a:fillRect/>
+          </a:stretch>
+        </p:blipFill>
+        <p:spPr>
+          <a:xfrm>
+            <a:off x="348161" y="1439357"/>
+            <a:ext cx="2919295" cy="2439411"/>
+          </a:xfrm>
+          <a:prstGeom prst="rect">
+            <a:avLst/>
+          </a:prstGeom>
+        </p:spPr>
+      </p:pic>
+      <p:pic>
+        <p:nvPicPr>
+          <p:cNvPr id="3" name="Picture 2"/>
+          <p:cNvPicPr>
+            <a:picLocks noChangeAspect="1"/>
+          </p:cNvPicPr>
+          <p:nvPr/>
+        </p:nvPicPr>
+        <p:blipFill>
+          <a:blip r:embed="rId3"/>
+          <a:stretch>
+            <a:fillRect/>
+          </a:stretch>
+        </p:blipFill>
+        <p:spPr>
+          <a:xfrm>
+            <a:off x="4139049" y="1328186"/>
+            <a:ext cx="4160900" cy="2661752"/>
+          </a:xfrm>
+          <a:prstGeom prst="rect">
+            <a:avLst/>
+          </a:prstGeom>
+        </p:spPr>
+      </p:pic>
+      <p:cxnSp>
+        <p:nvCxnSpPr>
+          <p:cNvPr id="5" name="Straight Arrow Connector 4"/>
+          <p:cNvCxnSpPr/>
+          <p:nvPr/>
+        </p:nvCxnSpPr>
+        <p:spPr>
+          <a:xfrm flipV="1">
+            <a:off x="3011424" y="1439357"/>
+            <a:ext cx="987552" cy="1011235"/>
+          </a:xfrm>
+          <a:prstGeom prst="straightConnector1">
+            <a:avLst/>
+          </a:prstGeom>
+          <a:ln>
+            <a:tailEnd type="triangle"/>
+          </a:ln>
+        </p:spPr>
+        <p:style>
+          <a:lnRef idx="1">
+            <a:schemeClr val="accent1"/>
+          </a:lnRef>
+          <a:fillRef idx="0">
+            <a:schemeClr val="accent1"/>
+          </a:fillRef>
+          <a:effectRef idx="0">
+            <a:schemeClr val="accent1"/>
+          </a:effectRef>
+          <a:fontRef idx="minor">
+            <a:schemeClr val="tx1"/>
+          </a:fontRef>
+        </p:style>
+      </p:cxnSp>
+      <p:cxnSp>
+        <p:nvCxnSpPr>
+          <p:cNvPr id="6" name="Straight Arrow Connector 5"/>
+          <p:cNvCxnSpPr>
+            <a:endCxn id="3" idx="1"/>
+          </p:cNvCxnSpPr>
+          <p:nvPr/>
+        </p:nvCxnSpPr>
+        <p:spPr>
+          <a:xfrm flipV="1">
+            <a:off x="3169785" y="2659062"/>
+            <a:ext cx="969264" cy="280416"/>
+          </a:xfrm>
+          <a:prstGeom prst="straightConnector1">
+            <a:avLst/>
+          </a:prstGeom>
+          <a:ln>
+            <a:tailEnd type="triangle"/>
+          </a:ln>
+        </p:spPr>
+        <p:style>
+          <a:lnRef idx="1">
+            <a:schemeClr val="accent1"/>
+          </a:lnRef>
+          <a:fillRef idx="0">
+            <a:schemeClr val="accent1"/>
+          </a:fillRef>
+          <a:effectRef idx="0">
+            <a:schemeClr val="accent1"/>
+          </a:effectRef>
+          <a:fontRef idx="minor">
+            <a:schemeClr val="tx1"/>
+          </a:fontRef>
+        </p:style>
+      </p:cxnSp>
+      <p:cxnSp>
+        <p:nvCxnSpPr>
+          <p:cNvPr id="8" name="Straight Arrow Connector 7"/>
+          <p:cNvCxnSpPr/>
+          <p:nvPr/>
+        </p:nvCxnSpPr>
+        <p:spPr>
+          <a:xfrm flipV="1">
+            <a:off x="3011424" y="2121408"/>
+            <a:ext cx="1127625" cy="1220056"/>
+          </a:xfrm>
+          <a:prstGeom prst="straightConnector1">
+            <a:avLst/>
+          </a:prstGeom>
+          <a:ln>
+            <a:tailEnd type="triangle"/>
+          </a:ln>
+        </p:spPr>
+        <p:style>
+          <a:lnRef idx="1">
+            <a:schemeClr val="accent1"/>
+          </a:lnRef>
+          <a:fillRef idx="0">
+            <a:schemeClr val="accent1"/>
+          </a:fillRef>
+          <a:effectRef idx="0">
+            <a:schemeClr val="accent1"/>
+          </a:effectRef>
+          <a:fontRef idx="minor">
+            <a:schemeClr val="tx1"/>
+          </a:fontRef>
+        </p:style>
+      </p:cxnSp>
+      <p:cxnSp>
+        <p:nvCxnSpPr>
+          <p:cNvPr id="13" name="Straight Arrow Connector 12"/>
+          <p:cNvCxnSpPr/>
+          <p:nvPr/>
+        </p:nvCxnSpPr>
+        <p:spPr>
+          <a:xfrm>
+            <a:off x="2852928" y="3706368"/>
+            <a:ext cx="1216084" cy="196609"/>
+          </a:xfrm>
+          <a:prstGeom prst="straightConnector1">
+            <a:avLst/>
+          </a:prstGeom>
+          <a:ln>
+            <a:tailEnd type="triangle"/>
+          </a:ln>
+        </p:spPr>
+        <p:style>
+          <a:lnRef idx="1">
+            <a:schemeClr val="accent1"/>
+          </a:lnRef>
+          <a:fillRef idx="0">
+            <a:schemeClr val="accent1"/>
+          </a:fillRef>
+          <a:effectRef idx="0">
+            <a:schemeClr val="accent1"/>
+          </a:effectRef>
+          <a:fontRef idx="minor">
+            <a:schemeClr val="tx1"/>
+          </a:fontRef>
+        </p:style>
+      </p:cxnSp>
     </p:spTree>
     <p:extLst>
       <p:ext uri="{BB962C8B-B14F-4D97-AF65-F5344CB8AC3E}">

</xml_diff>

<commit_message>
add regular expression to parse QueryString
</commit_message>
<xml_diff>
--- a/Jerry.pptx
+++ b/Jerry.pptx
@@ -5,7 +5,7 @@
     <p:sldMasterId id="2147483648" r:id="rId1"/>
   </p:sldMasterIdLst>
   <p:notesMasterIdLst>
-    <p:notesMasterId r:id="rId8"/>
+    <p:notesMasterId r:id="rId13"/>
   </p:notesMasterIdLst>
   <p:sldIdLst>
     <p:sldId id="257" r:id="rId2"/>
@@ -14,6 +14,11 @@
     <p:sldId id="263" r:id="rId5"/>
     <p:sldId id="264" r:id="rId6"/>
     <p:sldId id="265" r:id="rId7"/>
+    <p:sldId id="266" r:id="rId8"/>
+    <p:sldId id="267" r:id="rId9"/>
+    <p:sldId id="268" r:id="rId10"/>
+    <p:sldId id="269" r:id="rId11"/>
+    <p:sldId id="270" r:id="rId12"/>
   </p:sldIdLst>
   <p:sldSz cx="12192000" cy="6858000"/>
   <p:notesSz cx="6858000" cy="9144000"/>
@@ -202,7 +207,7 @@
           <a:p>
             <a:fld id="{C1FFF932-AE32-4CB2-A004-ABC55BBBB993}" type="datetimeFigureOut">
               <a:rPr lang="en-US" smtClean="0"/>
-              <a:t>9/24/2015</a:t>
+              <a:t>2015-11-03</a:t>
             </a:fld>
             <a:endParaRPr lang="en-US"/>
           </a:p>
@@ -1739,7 +1744,7 @@
           <a:p>
             <a:fld id="{32885C6E-53D4-4DF2-B9C6-C242624B2A8A}" type="datetimeFigureOut">
               <a:rPr lang="en-US" smtClean="0"/>
-              <a:t>9/24/2015</a:t>
+              <a:t>2015-11-03</a:t>
             </a:fld>
             <a:endParaRPr lang="en-US"/>
           </a:p>
@@ -1909,7 +1914,7 @@
           <a:p>
             <a:fld id="{32885C6E-53D4-4DF2-B9C6-C242624B2A8A}" type="datetimeFigureOut">
               <a:rPr lang="en-US" smtClean="0"/>
-              <a:t>9/24/2015</a:t>
+              <a:t>2015-11-03</a:t>
             </a:fld>
             <a:endParaRPr lang="en-US"/>
           </a:p>
@@ -2089,7 +2094,7 @@
           <a:p>
             <a:fld id="{32885C6E-53D4-4DF2-B9C6-C242624B2A8A}" type="datetimeFigureOut">
               <a:rPr lang="en-US" smtClean="0"/>
-              <a:t>9/24/2015</a:t>
+              <a:t>2015-11-03</a:t>
             </a:fld>
             <a:endParaRPr lang="en-US"/>
           </a:p>
@@ -2259,7 +2264,7 @@
           <a:p>
             <a:fld id="{32885C6E-53D4-4DF2-B9C6-C242624B2A8A}" type="datetimeFigureOut">
               <a:rPr lang="en-US" smtClean="0"/>
-              <a:t>9/24/2015</a:t>
+              <a:t>2015-11-03</a:t>
             </a:fld>
             <a:endParaRPr lang="en-US"/>
           </a:p>
@@ -2505,7 +2510,7 @@
           <a:p>
             <a:fld id="{32885C6E-53D4-4DF2-B9C6-C242624B2A8A}" type="datetimeFigureOut">
               <a:rPr lang="en-US" smtClean="0"/>
-              <a:t>9/24/2015</a:t>
+              <a:t>2015-11-03</a:t>
             </a:fld>
             <a:endParaRPr lang="en-US"/>
           </a:p>
@@ -2737,7 +2742,7 @@
           <a:p>
             <a:fld id="{32885C6E-53D4-4DF2-B9C6-C242624B2A8A}" type="datetimeFigureOut">
               <a:rPr lang="en-US" smtClean="0"/>
-              <a:t>9/24/2015</a:t>
+              <a:t>2015-11-03</a:t>
             </a:fld>
             <a:endParaRPr lang="en-US"/>
           </a:p>
@@ -3104,7 +3109,7 @@
           <a:p>
             <a:fld id="{32885C6E-53D4-4DF2-B9C6-C242624B2A8A}" type="datetimeFigureOut">
               <a:rPr lang="en-US" smtClean="0"/>
-              <a:t>9/24/2015</a:t>
+              <a:t>2015-11-03</a:t>
             </a:fld>
             <a:endParaRPr lang="en-US"/>
           </a:p>
@@ -3222,7 +3227,7 @@
           <a:p>
             <a:fld id="{32885C6E-53D4-4DF2-B9C6-C242624B2A8A}" type="datetimeFigureOut">
               <a:rPr lang="en-US" smtClean="0"/>
-              <a:t>9/24/2015</a:t>
+              <a:t>2015-11-03</a:t>
             </a:fld>
             <a:endParaRPr lang="en-US"/>
           </a:p>
@@ -3317,7 +3322,7 @@
           <a:p>
             <a:fld id="{32885C6E-53D4-4DF2-B9C6-C242624B2A8A}" type="datetimeFigureOut">
               <a:rPr lang="en-US" smtClean="0"/>
-              <a:t>9/24/2015</a:t>
+              <a:t>2015-11-03</a:t>
             </a:fld>
             <a:endParaRPr lang="en-US"/>
           </a:p>
@@ -3594,7 +3599,7 @@
           <a:p>
             <a:fld id="{32885C6E-53D4-4DF2-B9C6-C242624B2A8A}" type="datetimeFigureOut">
               <a:rPr lang="en-US" smtClean="0"/>
-              <a:t>9/24/2015</a:t>
+              <a:t>2015-11-03</a:t>
             </a:fld>
             <a:endParaRPr lang="en-US"/>
           </a:p>
@@ -3847,7 +3852,7 @@
           <a:p>
             <a:fld id="{32885C6E-53D4-4DF2-B9C6-C242624B2A8A}" type="datetimeFigureOut">
               <a:rPr lang="en-US" smtClean="0"/>
-              <a:t>9/24/2015</a:t>
+              <a:t>2015-11-03</a:t>
             </a:fld>
             <a:endParaRPr lang="en-US"/>
           </a:p>
@@ -4060,7 +4065,7 @@
           <a:p>
             <a:fld id="{32885C6E-53D4-4DF2-B9C6-C242624B2A8A}" type="datetimeFigureOut">
               <a:rPr lang="en-US" smtClean="0"/>
-              <a:t>9/24/2015</a:t>
+              <a:t>2015-11-03</a:t>
             </a:fld>
             <a:endParaRPr lang="en-US"/>
           </a:p>
@@ -4614,6 +4619,367 @@
 </p:sld>
 </file>
 
+<file path=ppt/slides/slide10.xml><?xml version="1.0" encoding="utf-8"?>
+<p:sld xmlns:a="http://schemas.openxmlformats.org/drawingml/2006/main" xmlns:r="http://schemas.openxmlformats.org/officeDocument/2006/relationships" xmlns:p="http://schemas.openxmlformats.org/presentationml/2006/main">
+  <p:cSld>
+    <p:spTree>
+      <p:nvGrpSpPr>
+        <p:cNvPr id="1" name=""/>
+        <p:cNvGrpSpPr/>
+        <p:nvPr/>
+      </p:nvGrpSpPr>
+      <p:grpSpPr>
+        <a:xfrm>
+          <a:off x="0" y="0"/>
+          <a:ext cx="0" cy="0"/>
+          <a:chOff x="0" y="0"/>
+          <a:chExt cx="0" cy="0"/>
+        </a:xfrm>
+      </p:grpSpPr>
+      <p:pic>
+        <p:nvPicPr>
+          <p:cNvPr id="4" name="Picture 3"/>
+          <p:cNvPicPr>
+            <a:picLocks noChangeAspect="1"/>
+          </p:cNvPicPr>
+          <p:nvPr/>
+        </p:nvPicPr>
+        <p:blipFill>
+          <a:blip r:embed="rId2"/>
+          <a:stretch>
+            <a:fillRect/>
+          </a:stretch>
+        </p:blipFill>
+        <p:spPr>
+          <a:xfrm>
+            <a:off x="681399" y="1466088"/>
+            <a:ext cx="10889924" cy="3254022"/>
+          </a:xfrm>
+          <a:prstGeom prst="rect">
+            <a:avLst/>
+          </a:prstGeom>
+        </p:spPr>
+      </p:pic>
+      <p:pic>
+        <p:nvPicPr>
+          <p:cNvPr id="3" name="Picture 2"/>
+          <p:cNvPicPr>
+            <a:picLocks noChangeAspect="1"/>
+          </p:cNvPicPr>
+          <p:nvPr/>
+        </p:nvPicPr>
+        <p:blipFill>
+          <a:blip r:embed="rId3"/>
+          <a:stretch>
+            <a:fillRect/>
+          </a:stretch>
+        </p:blipFill>
+        <p:spPr>
+          <a:xfrm>
+            <a:off x="6553081" y="2052879"/>
+            <a:ext cx="2743438" cy="2080440"/>
+          </a:xfrm>
+          <a:prstGeom prst="rect">
+            <a:avLst/>
+          </a:prstGeom>
+        </p:spPr>
+      </p:pic>
+    </p:spTree>
+    <p:extLst>
+      <p:ext uri="{BB962C8B-B14F-4D97-AF65-F5344CB8AC3E}">
+        <p14:creationId xmlns:p14="http://schemas.microsoft.com/office/powerpoint/2010/main" val="3158139565"/>
+      </p:ext>
+    </p:extLst>
+  </p:cSld>
+  <p:clrMapOvr>
+    <a:masterClrMapping/>
+  </p:clrMapOvr>
+  <p:timing>
+    <p:tnLst>
+      <p:par>
+        <p:cTn id="1" dur="indefinite" restart="never" nodeType="tmRoot"/>
+      </p:par>
+    </p:tnLst>
+  </p:timing>
+</p:sld>
+</file>
+
+<file path=ppt/slides/slide11.xml><?xml version="1.0" encoding="utf-8"?>
+<p:sld xmlns:a="http://schemas.openxmlformats.org/drawingml/2006/main" xmlns:r="http://schemas.openxmlformats.org/officeDocument/2006/relationships" xmlns:p="http://schemas.openxmlformats.org/presentationml/2006/main">
+  <p:cSld>
+    <p:spTree>
+      <p:nvGrpSpPr>
+        <p:cNvPr id="1" name=""/>
+        <p:cNvGrpSpPr/>
+        <p:nvPr/>
+      </p:nvGrpSpPr>
+      <p:grpSpPr>
+        <a:xfrm>
+          <a:off x="0" y="0"/>
+          <a:ext cx="0" cy="0"/>
+          <a:chOff x="0" y="0"/>
+          <a:chExt cx="0" cy="0"/>
+        </a:xfrm>
+      </p:grpSpPr>
+      <p:sp>
+        <p:nvSpPr>
+          <p:cNvPr id="2" name="Title 1"/>
+          <p:cNvSpPr>
+            <a:spLocks noGrp="1"/>
+          </p:cNvSpPr>
+          <p:nvPr>
+            <p:ph type="title"/>
+          </p:nvPr>
+        </p:nvSpPr>
+        <p:spPr/>
+        <p:txBody>
+          <a:bodyPr/>
+          <a:lstStyle/>
+          <a:p>
+            <a:r>
+              <a:rPr lang="en-US" dirty="0"/>
+              <a:t>/(</a:t>
+            </a:r>
+            <a:r>
+              <a:rPr lang="en-US" dirty="0">
+                <a:solidFill>
+                  <a:srgbClr val="FF0000"/>
+                </a:solidFill>
+              </a:rPr>
+              <a:t>?:</a:t>
+            </a:r>
+            <a:r>
+              <a:rPr lang="en-US" dirty="0"/>
+              <a:t>^\?|</a:t>
+            </a:r>
+            <a:r>
+              <a:rPr lang="en-US" dirty="0">
+                <a:solidFill>
+                  <a:srgbClr val="FF0000"/>
+                </a:solidFill>
+              </a:rPr>
+              <a:t>&amp;</a:t>
+            </a:r>
+            <a:r>
+              <a:rPr lang="en-US" dirty="0"/>
+              <a:t>)(.*?)=(.*?)(?=</a:t>
+            </a:r>
+            <a:r>
+              <a:rPr lang="en-US" dirty="0">
+                <a:solidFill>
+                  <a:srgbClr val="FF0000"/>
+                </a:solidFill>
+              </a:rPr>
+              <a:t>&amp;</a:t>
+            </a:r>
+            <a:r>
+              <a:rPr lang="en-US" dirty="0"/>
+              <a:t>|$)/g</a:t>
+            </a:r>
+          </a:p>
+        </p:txBody>
+      </p:sp>
+      <p:sp>
+        <p:nvSpPr>
+          <p:cNvPr id="3" name="TextBox 2"/>
+          <p:cNvSpPr txBox="1"/>
+          <p:nvPr/>
+        </p:nvSpPr>
+        <p:spPr>
+          <a:xfrm>
+            <a:off x="658368" y="1402080"/>
+            <a:ext cx="11094720" cy="1754326"/>
+          </a:xfrm>
+          <a:prstGeom prst="rect">
+            <a:avLst/>
+          </a:prstGeom>
+          <a:noFill/>
+        </p:spPr>
+        <p:txBody>
+          <a:bodyPr wrap="square" rtlCol="0">
+            <a:spAutoFit/>
+          </a:bodyPr>
+          <a:lstStyle/>
+          <a:p>
+            <a:r>
+              <a:rPr lang="en-US" altLang="zh-CN" dirty="0"/>
+              <a:t>(?:</a:t>
+            </a:r>
+            <a:r>
+              <a:rPr lang="en-US" altLang="zh-CN" dirty="0" err="1"/>
+              <a:t>exp</a:t>
+            </a:r>
+            <a:r>
+              <a:rPr lang="en-US" altLang="zh-CN" dirty="0"/>
+              <a:t>)</a:t>
+            </a:r>
+            <a:r>
+              <a:rPr lang="zh-CN" altLang="en-US" dirty="0"/>
+              <a:t>不会改变正则表达式的处理方式，只是这样的组匹配的内容不会像前两种那样被捕获到某个组里面，也不会拥有组</a:t>
+            </a:r>
+            <a:r>
+              <a:rPr lang="zh-CN" altLang="en-US" dirty="0" smtClean="0"/>
+              <a:t>号</a:t>
+            </a:r>
+            <a:endParaRPr lang="en-US" altLang="zh-CN" dirty="0" smtClean="0"/>
+          </a:p>
+          <a:p>
+            <a:r>
+              <a:rPr lang="en-US" dirty="0"/>
+              <a:t>(?=</a:t>
+            </a:r>
+            <a:r>
+              <a:rPr lang="en-US" dirty="0" err="1"/>
+              <a:t>exp</a:t>
+            </a:r>
+            <a:r>
+              <a:rPr lang="en-US" dirty="0"/>
+              <a:t>)</a:t>
+            </a:r>
+            <a:r>
+              <a:rPr lang="zh-CN" altLang="en-US" dirty="0"/>
+              <a:t>也叫</a:t>
+            </a:r>
+            <a:r>
+              <a:rPr lang="zh-CN" altLang="en-US" b="1" dirty="0"/>
+              <a:t>零宽度正预测先行断言</a:t>
+            </a:r>
+            <a:r>
+              <a:rPr lang="zh-CN" altLang="en-US" dirty="0"/>
+              <a:t>，它断言自身出现的位置的后面能匹配表达式</a:t>
+            </a:r>
+            <a:r>
+              <a:rPr lang="en-US" dirty="0" err="1"/>
+              <a:t>exp</a:t>
+            </a:r>
+            <a:r>
+              <a:rPr lang="en-US" dirty="0"/>
+              <a:t>。</a:t>
+            </a:r>
+            <a:r>
+              <a:rPr lang="zh-CN" altLang="en-US" dirty="0"/>
+              <a:t>比如</a:t>
+            </a:r>
+            <a:r>
+              <a:rPr lang="en-US" altLang="zh-CN" dirty="0"/>
+              <a:t>\</a:t>
+            </a:r>
+            <a:r>
+              <a:rPr lang="en-US" dirty="0"/>
+              <a:t>b\w+(?=</a:t>
+            </a:r>
+            <a:r>
+              <a:rPr lang="en-US" dirty="0" err="1"/>
+              <a:t>ing</a:t>
+            </a:r>
+            <a:r>
+              <a:rPr lang="en-US" dirty="0"/>
+              <a:t>\b)，</a:t>
+            </a:r>
+            <a:r>
+              <a:rPr lang="zh-CN" altLang="en-US" dirty="0"/>
+              <a:t>匹配以</a:t>
+            </a:r>
+            <a:r>
+              <a:rPr lang="en-US" dirty="0" err="1"/>
+              <a:t>ing</a:t>
+            </a:r>
+            <a:r>
+              <a:rPr lang="zh-CN" altLang="en-US" dirty="0"/>
+              <a:t>结尾的单词的前面部分</a:t>
+            </a:r>
+            <a:r>
+              <a:rPr lang="en-US" altLang="zh-CN" dirty="0"/>
+              <a:t>(</a:t>
+            </a:r>
+            <a:r>
+              <a:rPr lang="zh-CN" altLang="en-US" dirty="0"/>
+              <a:t>除了</a:t>
+            </a:r>
+            <a:r>
+              <a:rPr lang="en-US" b="1" dirty="0" err="1"/>
+              <a:t>ing</a:t>
+            </a:r>
+            <a:r>
+              <a:rPr lang="zh-CN" altLang="en-US" dirty="0"/>
+              <a:t>以外的部分</a:t>
+            </a:r>
+            <a:r>
+              <a:rPr lang="en-US" altLang="zh-CN" dirty="0"/>
+              <a:t>)</a:t>
+            </a:r>
+            <a:r>
+              <a:rPr lang="zh-CN" altLang="en-US" dirty="0"/>
+              <a:t>，如查找</a:t>
+            </a:r>
+            <a:r>
+              <a:rPr lang="en-US" dirty="0"/>
+              <a:t>I'm </a:t>
+            </a:r>
+            <a:r>
+              <a:rPr lang="en-US" dirty="0">
+                <a:solidFill>
+                  <a:srgbClr val="FF0000"/>
+                </a:solidFill>
+              </a:rPr>
+              <a:t>sing</a:t>
+            </a:r>
+            <a:r>
+              <a:rPr lang="en-US" dirty="0"/>
+              <a:t>ing while you're </a:t>
+            </a:r>
+            <a:r>
+              <a:rPr lang="en-US" dirty="0">
+                <a:solidFill>
+                  <a:srgbClr val="FF0000"/>
+                </a:solidFill>
+              </a:rPr>
+              <a:t>danc</a:t>
+            </a:r>
+            <a:r>
+              <a:rPr lang="en-US" dirty="0"/>
+              <a:t>ing.</a:t>
+            </a:r>
+            <a:r>
+              <a:rPr lang="zh-CN" altLang="en-US" dirty="0"/>
+              <a:t>时，它会匹配</a:t>
+            </a:r>
+            <a:r>
+              <a:rPr lang="en-US" dirty="0"/>
+              <a:t>sing</a:t>
+            </a:r>
+            <a:r>
+              <a:rPr lang="zh-CN" altLang="en-US" dirty="0"/>
+              <a:t>和</a:t>
+            </a:r>
+            <a:r>
+              <a:rPr lang="en-US" dirty="0" err="1"/>
+              <a:t>danc</a:t>
+            </a:r>
+            <a:r>
+              <a:rPr lang="en-US" dirty="0"/>
+              <a:t>。</a:t>
+            </a:r>
+            <a:endParaRPr lang="en-US" altLang="zh-CN" dirty="0" smtClean="0"/>
+          </a:p>
+          <a:p>
+            <a:endParaRPr lang="en-US" dirty="0"/>
+          </a:p>
+        </p:txBody>
+      </p:sp>
+    </p:spTree>
+    <p:extLst>
+      <p:ext uri="{BB962C8B-B14F-4D97-AF65-F5344CB8AC3E}">
+        <p14:creationId xmlns:p14="http://schemas.microsoft.com/office/powerpoint/2010/main" val="378344466"/>
+      </p:ext>
+    </p:extLst>
+  </p:cSld>
+  <p:clrMapOvr>
+    <a:masterClrMapping/>
+  </p:clrMapOvr>
+</p:sld>
+</file>
+
 <file path=ppt/slides/slide2.xml><?xml version="1.0" encoding="utf-8"?>
 <p:sld xmlns:a="http://schemas.openxmlformats.org/drawingml/2006/main" xmlns:r="http://schemas.openxmlformats.org/officeDocument/2006/relationships" xmlns:p="http://schemas.openxmlformats.org/presentationml/2006/main">
   <p:cSld>
@@ -7638,6 +8004,353 @@
   <p:clrMapOvr>
     <a:masterClrMapping/>
   </p:clrMapOvr>
+  <p:timing>
+    <p:tnLst>
+      <p:par>
+        <p:cTn id="1" dur="indefinite" restart="never" nodeType="tmRoot"/>
+      </p:par>
+    </p:tnLst>
+  </p:timing>
+</p:sld>
+</file>
+
+<file path=ppt/slides/slide7.xml><?xml version="1.0" encoding="utf-8"?>
+<p:sld xmlns:a="http://schemas.openxmlformats.org/drawingml/2006/main" xmlns:r="http://schemas.openxmlformats.org/officeDocument/2006/relationships" xmlns:p="http://schemas.openxmlformats.org/presentationml/2006/main">
+  <p:cSld>
+    <p:spTree>
+      <p:nvGrpSpPr>
+        <p:cNvPr id="1" name=""/>
+        <p:cNvGrpSpPr/>
+        <p:nvPr/>
+      </p:nvGrpSpPr>
+      <p:grpSpPr>
+        <a:xfrm>
+          <a:off x="0" y="0"/>
+          <a:ext cx="0" cy="0"/>
+          <a:chOff x="0" y="0"/>
+          <a:chExt cx="0" cy="0"/>
+        </a:xfrm>
+      </p:grpSpPr>
+      <p:pic>
+        <p:nvPicPr>
+          <p:cNvPr id="3" name="Picture 2"/>
+          <p:cNvPicPr>
+            <a:picLocks noChangeAspect="1"/>
+          </p:cNvPicPr>
+          <p:nvPr/>
+        </p:nvPicPr>
+        <p:blipFill>
+          <a:blip r:embed="rId2"/>
+          <a:stretch>
+            <a:fillRect/>
+          </a:stretch>
+        </p:blipFill>
+        <p:spPr>
+          <a:xfrm>
+            <a:off x="477601" y="1002718"/>
+            <a:ext cx="4728749" cy="2033090"/>
+          </a:xfrm>
+          <a:prstGeom prst="rect">
+            <a:avLst/>
+          </a:prstGeom>
+          <a:ln w="38100">
+            <a:solidFill>
+              <a:schemeClr val="accent1"/>
+            </a:solidFill>
+          </a:ln>
+        </p:spPr>
+      </p:pic>
+      <p:pic>
+        <p:nvPicPr>
+          <p:cNvPr id="4" name="Picture 3"/>
+          <p:cNvPicPr>
+            <a:picLocks noChangeAspect="1"/>
+          </p:cNvPicPr>
+          <p:nvPr/>
+        </p:nvPicPr>
+        <p:blipFill>
+          <a:blip r:embed="rId3"/>
+          <a:stretch>
+            <a:fillRect/>
+          </a:stretch>
+        </p:blipFill>
+        <p:spPr>
+          <a:xfrm>
+            <a:off x="453582" y="3375570"/>
+            <a:ext cx="4752767" cy="2883701"/>
+          </a:xfrm>
+          <a:prstGeom prst="rect">
+            <a:avLst/>
+          </a:prstGeom>
+          <a:ln w="38100">
+            <a:solidFill>
+              <a:schemeClr val="accent1"/>
+            </a:solidFill>
+          </a:ln>
+        </p:spPr>
+      </p:pic>
+    </p:spTree>
+    <p:extLst>
+      <p:ext uri="{BB962C8B-B14F-4D97-AF65-F5344CB8AC3E}">
+        <p14:creationId xmlns:p14="http://schemas.microsoft.com/office/powerpoint/2010/main" val="4066832402"/>
+      </p:ext>
+    </p:extLst>
+  </p:cSld>
+  <p:clrMapOvr>
+    <a:masterClrMapping/>
+  </p:clrMapOvr>
+  <p:timing>
+    <p:tnLst>
+      <p:par>
+        <p:cTn id="1" dur="indefinite" restart="never" nodeType="tmRoot"/>
+      </p:par>
+    </p:tnLst>
+  </p:timing>
+</p:sld>
+</file>
+
+<file path=ppt/slides/slide8.xml><?xml version="1.0" encoding="utf-8"?>
+<p:sld xmlns:a="http://schemas.openxmlformats.org/drawingml/2006/main" xmlns:r="http://schemas.openxmlformats.org/officeDocument/2006/relationships" xmlns:p="http://schemas.openxmlformats.org/presentationml/2006/main">
+  <p:cSld>
+    <p:spTree>
+      <p:nvGrpSpPr>
+        <p:cNvPr id="1" name=""/>
+        <p:cNvGrpSpPr/>
+        <p:nvPr/>
+      </p:nvGrpSpPr>
+      <p:grpSpPr>
+        <a:xfrm>
+          <a:off x="0" y="0"/>
+          <a:ext cx="0" cy="0"/>
+          <a:chOff x="0" y="0"/>
+          <a:chExt cx="0" cy="0"/>
+        </a:xfrm>
+      </p:grpSpPr>
+      <p:pic>
+        <p:nvPicPr>
+          <p:cNvPr id="1026" name="Picture 2" descr="C:\Users\i042416\AppData\Local\YNote\data\cle.ee@163.com\d254098b87e8477c8b00cc56f09eeaa5\clipboard.png"/>
+          <p:cNvPicPr>
+            <a:picLocks noChangeAspect="1" noChangeArrowheads="1"/>
+          </p:cNvPicPr>
+          <p:nvPr/>
+        </p:nvPicPr>
+        <p:blipFill>
+          <a:blip r:embed="rId2">
+            <a:extLst>
+              <a:ext uri="{28A0092B-C50C-407E-A947-70E740481C1C}">
+                <a14:useLocalDpi xmlns:a14="http://schemas.microsoft.com/office/drawing/2010/main" val="0"/>
+              </a:ext>
+            </a:extLst>
+          </a:blip>
+          <a:srcRect/>
+          <a:stretch>
+            <a:fillRect/>
+          </a:stretch>
+        </p:blipFill>
+        <p:spPr bwMode="auto">
+          <a:xfrm>
+            <a:off x="170688" y="1117727"/>
+            <a:ext cx="5114925" cy="3552825"/>
+          </a:xfrm>
+          <a:prstGeom prst="rect">
+            <a:avLst/>
+          </a:prstGeom>
+          <a:noFill/>
+          <a:extLst>
+            <a:ext uri="{909E8E84-426E-40DD-AFC4-6F175D3DCCD1}">
+              <a14:hiddenFill xmlns:a14="http://schemas.microsoft.com/office/drawing/2010/main">
+                <a:solidFill>
+                  <a:srgbClr val="FFFFFF"/>
+                </a:solidFill>
+              </a14:hiddenFill>
+            </a:ext>
+          </a:extLst>
+        </p:spPr>
+      </p:pic>
+      <p:pic>
+        <p:nvPicPr>
+          <p:cNvPr id="3" name="Picture 2"/>
+          <p:cNvPicPr>
+            <a:picLocks noChangeAspect="1"/>
+          </p:cNvPicPr>
+          <p:nvPr/>
+        </p:nvPicPr>
+        <p:blipFill>
+          <a:blip r:embed="rId3"/>
+          <a:stretch>
+            <a:fillRect/>
+          </a:stretch>
+        </p:blipFill>
+        <p:spPr>
+          <a:xfrm>
+            <a:off x="6355232" y="406654"/>
+            <a:ext cx="5421001" cy="1080770"/>
+          </a:xfrm>
+          <a:prstGeom prst="rect">
+            <a:avLst/>
+          </a:prstGeom>
+          <a:ln w="38100">
+            <a:solidFill>
+              <a:schemeClr val="accent1"/>
+            </a:solidFill>
+          </a:ln>
+        </p:spPr>
+      </p:pic>
+      <p:pic>
+        <p:nvPicPr>
+          <p:cNvPr id="4" name="Picture 3"/>
+          <p:cNvPicPr>
+            <a:picLocks noChangeAspect="1"/>
+          </p:cNvPicPr>
+          <p:nvPr/>
+        </p:nvPicPr>
+        <p:blipFill>
+          <a:blip r:embed="rId4"/>
+          <a:stretch>
+            <a:fillRect/>
+          </a:stretch>
+        </p:blipFill>
+        <p:spPr>
+          <a:xfrm>
+            <a:off x="6355232" y="2015457"/>
+            <a:ext cx="4875126" cy="1471455"/>
+          </a:xfrm>
+          <a:prstGeom prst="rect">
+            <a:avLst/>
+          </a:prstGeom>
+          <a:ln w="38100">
+            <a:solidFill>
+              <a:schemeClr val="accent1"/>
+            </a:solidFill>
+          </a:ln>
+        </p:spPr>
+      </p:pic>
+      <p:pic>
+        <p:nvPicPr>
+          <p:cNvPr id="5" name="Picture 4"/>
+          <p:cNvPicPr>
+            <a:picLocks noChangeAspect="1"/>
+          </p:cNvPicPr>
+          <p:nvPr/>
+        </p:nvPicPr>
+        <p:blipFill>
+          <a:blip r:embed="rId5"/>
+          <a:stretch>
+            <a:fillRect/>
+          </a:stretch>
+        </p:blipFill>
+        <p:spPr>
+          <a:xfrm>
+            <a:off x="6355232" y="4100289"/>
+            <a:ext cx="5869299" cy="1849407"/>
+          </a:xfrm>
+          <a:prstGeom prst="rect">
+            <a:avLst/>
+          </a:prstGeom>
+          <a:ln w="38100">
+            <a:solidFill>
+              <a:schemeClr val="accent1"/>
+            </a:solidFill>
+          </a:ln>
+        </p:spPr>
+      </p:pic>
+    </p:spTree>
+    <p:extLst>
+      <p:ext uri="{BB962C8B-B14F-4D97-AF65-F5344CB8AC3E}">
+        <p14:creationId xmlns:p14="http://schemas.microsoft.com/office/powerpoint/2010/main" val="1000851360"/>
+      </p:ext>
+    </p:extLst>
+  </p:cSld>
+  <p:clrMapOvr>
+    <a:masterClrMapping/>
+  </p:clrMapOvr>
+  <p:timing>
+    <p:tnLst>
+      <p:par>
+        <p:cTn id="1" dur="indefinite" restart="never" nodeType="tmRoot"/>
+      </p:par>
+    </p:tnLst>
+  </p:timing>
+</p:sld>
+</file>
+
+<file path=ppt/slides/slide9.xml><?xml version="1.0" encoding="utf-8"?>
+<p:sld xmlns:a="http://schemas.openxmlformats.org/drawingml/2006/main" xmlns:r="http://schemas.openxmlformats.org/officeDocument/2006/relationships" xmlns:p="http://schemas.openxmlformats.org/presentationml/2006/main">
+  <p:cSld>
+    <p:spTree>
+      <p:nvGrpSpPr>
+        <p:cNvPr id="1" name=""/>
+        <p:cNvGrpSpPr/>
+        <p:nvPr/>
+      </p:nvGrpSpPr>
+      <p:grpSpPr>
+        <a:xfrm>
+          <a:off x="0" y="0"/>
+          <a:ext cx="0" cy="0"/>
+          <a:chOff x="0" y="0"/>
+          <a:chExt cx="0" cy="0"/>
+        </a:xfrm>
+      </p:grpSpPr>
+      <p:sp>
+        <p:nvSpPr>
+          <p:cNvPr id="2" name="Title 1"/>
+          <p:cNvSpPr>
+            <a:spLocks noGrp="1"/>
+          </p:cNvSpPr>
+          <p:nvPr>
+            <p:ph type="title"/>
+          </p:nvPr>
+        </p:nvSpPr>
+        <p:spPr/>
+        <p:txBody>
+          <a:bodyPr/>
+          <a:lstStyle/>
+          <a:p>
+            <a:endParaRPr lang="en-US"/>
+          </a:p>
+        </p:txBody>
+      </p:sp>
+      <p:pic>
+        <p:nvPicPr>
+          <p:cNvPr id="3" name="Picture 2"/>
+          <p:cNvPicPr>
+            <a:picLocks noChangeAspect="1"/>
+          </p:cNvPicPr>
+          <p:nvPr/>
+        </p:nvPicPr>
+        <p:blipFill>
+          <a:blip r:embed="rId2"/>
+          <a:stretch>
+            <a:fillRect/>
+          </a:stretch>
+        </p:blipFill>
+        <p:spPr>
+          <a:xfrm>
+            <a:off x="231902" y="395977"/>
+            <a:ext cx="11728196" cy="6066046"/>
+          </a:xfrm>
+          <a:prstGeom prst="rect">
+            <a:avLst/>
+          </a:prstGeom>
+        </p:spPr>
+      </p:pic>
+    </p:spTree>
+    <p:extLst>
+      <p:ext uri="{BB962C8B-B14F-4D97-AF65-F5344CB8AC3E}">
+        <p14:creationId xmlns:p14="http://schemas.microsoft.com/office/powerpoint/2010/main" val="3008183571"/>
+      </p:ext>
+    </p:extLst>
+  </p:cSld>
+  <p:clrMapOvr>
+    <a:masterClrMapping/>
+  </p:clrMapOvr>
+  <p:timing>
+    <p:tnLst>
+      <p:par>
+        <p:cTn id="1" dur="indefinite" restart="never" nodeType="tmRoot"/>
+      </p:par>
+    </p:tnLst>
+  </p:timing>
 </p:sld>
 </file>
 

</xml_diff>

<commit_message>
remember to add jQuery.proxy as example
</commit_message>
<xml_diff>
--- a/Jerry.pptx
+++ b/Jerry.pptx
@@ -5,7 +5,7 @@
     <p:sldMasterId id="2147483648" r:id="rId1"/>
   </p:sldMasterIdLst>
   <p:notesMasterIdLst>
-    <p:notesMasterId r:id="rId13"/>
+    <p:notesMasterId r:id="rId14"/>
   </p:notesMasterIdLst>
   <p:sldIdLst>
     <p:sldId id="257" r:id="rId2"/>
@@ -19,6 +19,7 @@
     <p:sldId id="268" r:id="rId10"/>
     <p:sldId id="269" r:id="rId11"/>
     <p:sldId id="270" r:id="rId12"/>
+    <p:sldId id="271" r:id="rId13"/>
   </p:sldIdLst>
   <p:sldSz cx="12192000" cy="6858000"/>
   <p:notesSz cx="6858000" cy="9144000"/>
@@ -207,7 +208,7 @@
           <a:p>
             <a:fld id="{C1FFF932-AE32-4CB2-A004-ABC55BBBB993}" type="datetimeFigureOut">
               <a:rPr lang="en-US" smtClean="0"/>
-              <a:t>2015-11-03</a:t>
+              <a:t>2015-12-09</a:t>
             </a:fld>
             <a:endParaRPr lang="en-US"/>
           </a:p>
@@ -1613,6 +1614,394 @@
 </p:notes>
 </file>
 
+<file path=ppt/notesSlides/notesSlide4.xml><?xml version="1.0" encoding="utf-8"?>
+<p:notes xmlns:a="http://schemas.openxmlformats.org/drawingml/2006/main" xmlns:r="http://schemas.openxmlformats.org/officeDocument/2006/relationships" xmlns:p="http://schemas.openxmlformats.org/presentationml/2006/main">
+  <p:cSld>
+    <p:spTree>
+      <p:nvGrpSpPr>
+        <p:cNvPr id="1" name=""/>
+        <p:cNvGrpSpPr/>
+        <p:nvPr/>
+      </p:nvGrpSpPr>
+      <p:grpSpPr>
+        <a:xfrm>
+          <a:off x="0" y="0"/>
+          <a:ext cx="0" cy="0"/>
+          <a:chOff x="0" y="0"/>
+          <a:chExt cx="0" cy="0"/>
+        </a:xfrm>
+      </p:grpSpPr>
+      <p:sp>
+        <p:nvSpPr>
+          <p:cNvPr id="2" name="Slide Image Placeholder 1"/>
+          <p:cNvSpPr>
+            <a:spLocks noGrp="1" noRot="1" noChangeAspect="1"/>
+          </p:cNvSpPr>
+          <p:nvPr>
+            <p:ph type="sldImg"/>
+          </p:nvPr>
+        </p:nvSpPr>
+        <p:spPr/>
+      </p:sp>
+      <p:sp>
+        <p:nvSpPr>
+          <p:cNvPr id="3" name="Notes Placeholder 2"/>
+          <p:cNvSpPr>
+            <a:spLocks noGrp="1"/>
+          </p:cNvSpPr>
+          <p:nvPr>
+            <p:ph type="body" idx="1"/>
+          </p:nvPr>
+        </p:nvSpPr>
+        <p:spPr/>
+        <p:txBody>
+          <a:bodyPr/>
+          <a:lstStyle/>
+          <a:p>
+            <a:pPr marL="0" marR="0" indent="0" algn="l" defTabSz="914400" rtl="0" eaLnBrk="1" fontAlgn="auto" latinLnBrk="0" hangingPunct="1">
+              <a:lnSpc>
+                <a:spcPct val="100000"/>
+              </a:lnSpc>
+              <a:spcBef>
+                <a:spcPts val="0"/>
+              </a:spcBef>
+              <a:spcAft>
+                <a:spcPts val="0"/>
+              </a:spcAft>
+              <a:buClrTx/>
+              <a:buSzTx/>
+              <a:buFontTx/>
+              <a:buNone/>
+              <a:tabLst/>
+              <a:defRPr/>
+            </a:pPr>
+            <a:r>
+              <a:rPr lang="zh-CN" altLang="en-US" sz="1200" kern="1200" dirty="0" smtClean="0">
+                <a:solidFill>
+                  <a:schemeClr val="tx1"/>
+                </a:solidFill>
+                <a:effectLst/>
+                <a:latin typeface="+mn-lt"/>
+                <a:ea typeface="+mn-ea"/>
+                <a:cs typeface="+mn-cs"/>
+              </a:rPr>
+              <a:t>第一个难点是如何避免左边针对</a:t>
+            </a:r>
+            <a:r>
+              <a:rPr lang="en-US" sz="1200" kern="1200" dirty="0" smtClean="0">
+                <a:solidFill>
+                  <a:schemeClr val="tx1"/>
+                </a:solidFill>
+                <a:effectLst/>
+                <a:latin typeface="+mn-lt"/>
+                <a:ea typeface="+mn-ea"/>
+                <a:cs typeface="+mn-cs"/>
+              </a:rPr>
+              <a:t>task</a:t>
+            </a:r>
+            <a:r>
+              <a:rPr lang="zh-CN" altLang="en-US" sz="1200" kern="1200" dirty="0" smtClean="0">
+                <a:solidFill>
+                  <a:schemeClr val="tx1"/>
+                </a:solidFill>
+                <a:effectLst/>
+                <a:latin typeface="+mn-lt"/>
+                <a:ea typeface="+mn-ea"/>
+                <a:cs typeface="+mn-cs"/>
+              </a:rPr>
+              <a:t>的</a:t>
+            </a:r>
+            <a:r>
+              <a:rPr lang="en-US" sz="1200" kern="1200" dirty="0" smtClean="0">
+                <a:solidFill>
+                  <a:schemeClr val="tx1"/>
+                </a:solidFill>
+                <a:effectLst/>
+                <a:latin typeface="+mn-lt"/>
+                <a:ea typeface="+mn-ea"/>
+                <a:cs typeface="+mn-cs"/>
+              </a:rPr>
+              <a:t>loop</a:t>
+            </a:r>
+            <a:r>
+              <a:rPr lang="zh-CN" altLang="en-US" sz="1200" kern="1200" dirty="0" smtClean="0">
+                <a:solidFill>
+                  <a:schemeClr val="tx1"/>
+                </a:solidFill>
+                <a:effectLst/>
+                <a:latin typeface="+mn-lt"/>
+                <a:ea typeface="+mn-ea"/>
+                <a:cs typeface="+mn-cs"/>
+              </a:rPr>
+              <a:t>， 把复杂度从</a:t>
+            </a:r>
+            <a:r>
+              <a:rPr lang="en-US" sz="1200" kern="1200" dirty="0" smtClean="0">
+                <a:solidFill>
+                  <a:schemeClr val="tx1"/>
+                </a:solidFill>
+                <a:effectLst/>
+                <a:latin typeface="+mn-lt"/>
+                <a:ea typeface="+mn-ea"/>
+                <a:cs typeface="+mn-cs"/>
+              </a:rPr>
+              <a:t>o(n</a:t>
+            </a:r>
+            <a:r>
+              <a:rPr lang="en-US" sz="1200" kern="1200" baseline="30000" dirty="0" smtClean="0">
+                <a:solidFill>
+                  <a:schemeClr val="tx1"/>
+                </a:solidFill>
+                <a:effectLst/>
+                <a:latin typeface="+mn-lt"/>
+                <a:ea typeface="+mn-ea"/>
+                <a:cs typeface="+mn-cs"/>
+              </a:rPr>
+              <a:t>2</a:t>
+            </a:r>
+            <a:r>
+              <a:rPr lang="en-US" sz="1200" kern="1200" dirty="0" smtClean="0">
+                <a:solidFill>
+                  <a:schemeClr val="tx1"/>
+                </a:solidFill>
+                <a:effectLst/>
+                <a:latin typeface="+mn-lt"/>
+                <a:ea typeface="+mn-ea"/>
+                <a:cs typeface="+mn-cs"/>
+              </a:rPr>
+              <a:t>)</a:t>
+            </a:r>
+            <a:r>
+              <a:rPr lang="zh-CN" altLang="en-US" sz="1200" kern="1200" dirty="0" smtClean="0">
+                <a:solidFill>
+                  <a:schemeClr val="tx1"/>
+                </a:solidFill>
+                <a:effectLst/>
+                <a:latin typeface="+mn-lt"/>
+                <a:ea typeface="+mn-ea"/>
+                <a:cs typeface="+mn-cs"/>
+              </a:rPr>
+              <a:t>降成</a:t>
+            </a:r>
+            <a:r>
+              <a:rPr lang="en-US" sz="1200" kern="1200" dirty="0" smtClean="0">
+                <a:solidFill>
+                  <a:schemeClr val="tx1"/>
+                </a:solidFill>
+                <a:effectLst/>
+                <a:latin typeface="+mn-lt"/>
+                <a:ea typeface="+mn-ea"/>
+                <a:cs typeface="+mn-cs"/>
+              </a:rPr>
+              <a:t>o(n)</a:t>
+            </a:r>
+            <a:r>
+              <a:rPr lang="zh-CN" altLang="en-US" sz="1200" kern="1200" dirty="0" smtClean="0">
+                <a:solidFill>
+                  <a:schemeClr val="tx1"/>
+                </a:solidFill>
+                <a:effectLst/>
+                <a:latin typeface="+mn-lt"/>
+                <a:ea typeface="+mn-ea"/>
+                <a:cs typeface="+mn-cs"/>
+              </a:rPr>
+              <a:t>。第二个难点是右边</a:t>
+            </a:r>
+            <a:r>
+              <a:rPr lang="en-US" sz="1200" kern="1200" dirty="0" smtClean="0">
+                <a:solidFill>
+                  <a:schemeClr val="tx1"/>
+                </a:solidFill>
+                <a:effectLst/>
+                <a:latin typeface="+mn-lt"/>
+                <a:ea typeface="+mn-ea"/>
+                <a:cs typeface="+mn-cs"/>
+              </a:rPr>
+              <a:t>task note</a:t>
+            </a:r>
+            <a:r>
+              <a:rPr lang="zh-CN" altLang="en-US" sz="1200" kern="1200" dirty="0" smtClean="0">
+                <a:solidFill>
+                  <a:schemeClr val="tx1"/>
+                </a:solidFill>
+                <a:effectLst/>
+                <a:latin typeface="+mn-lt"/>
+                <a:ea typeface="+mn-ea"/>
+                <a:cs typeface="+mn-cs"/>
+              </a:rPr>
+              <a:t>的</a:t>
+            </a:r>
+            <a:r>
+              <a:rPr lang="en-US" sz="1200" kern="1200" dirty="0" smtClean="0">
+                <a:solidFill>
+                  <a:schemeClr val="tx1"/>
+                </a:solidFill>
+                <a:effectLst/>
+                <a:latin typeface="+mn-lt"/>
+                <a:ea typeface="+mn-ea"/>
+                <a:cs typeface="+mn-cs"/>
+              </a:rPr>
+              <a:t>loop</a:t>
+            </a:r>
+            <a:r>
+              <a:rPr lang="zh-CN" altLang="en-US" sz="1200" kern="1200" dirty="0" smtClean="0">
+                <a:solidFill>
+                  <a:schemeClr val="tx1"/>
+                </a:solidFill>
+                <a:effectLst/>
+                <a:latin typeface="+mn-lt"/>
+                <a:ea typeface="+mn-ea"/>
+                <a:cs typeface="+mn-cs"/>
+              </a:rPr>
+              <a:t>里，取到每个</a:t>
+            </a:r>
+            <a:r>
+              <a:rPr lang="en-US" sz="1200" kern="1200" dirty="0" smtClean="0">
+                <a:solidFill>
+                  <a:schemeClr val="tx1"/>
+                </a:solidFill>
+                <a:effectLst/>
+                <a:latin typeface="+mn-lt"/>
+                <a:ea typeface="+mn-ea"/>
+                <a:cs typeface="+mn-cs"/>
+              </a:rPr>
+              <a:t>note instance</a:t>
+            </a:r>
+            <a:r>
+              <a:rPr lang="zh-CN" altLang="en-US" sz="1200" kern="1200" dirty="0" smtClean="0">
+                <a:solidFill>
+                  <a:schemeClr val="tx1"/>
+                </a:solidFill>
+                <a:effectLst/>
+                <a:latin typeface="+mn-lt"/>
+                <a:ea typeface="+mn-ea"/>
+                <a:cs typeface="+mn-cs"/>
+              </a:rPr>
+              <a:t>后，如何正确地将其写回到所属的</a:t>
+            </a:r>
+            <a:r>
+              <a:rPr lang="en-US" sz="1200" kern="1200" dirty="0" smtClean="0">
+                <a:solidFill>
+                  <a:schemeClr val="tx1"/>
+                </a:solidFill>
+                <a:effectLst/>
+                <a:latin typeface="+mn-lt"/>
+                <a:ea typeface="+mn-ea"/>
+                <a:cs typeface="+mn-cs"/>
+              </a:rPr>
+              <a:t>task</a:t>
+            </a:r>
+            <a:r>
+              <a:rPr lang="zh-CN" altLang="en-US" sz="1200" kern="1200" dirty="0" smtClean="0">
+                <a:solidFill>
+                  <a:schemeClr val="tx1"/>
+                </a:solidFill>
+                <a:effectLst/>
+                <a:latin typeface="+mn-lt"/>
+                <a:ea typeface="+mn-ea"/>
+                <a:cs typeface="+mn-cs"/>
+              </a:rPr>
+              <a:t>的</a:t>
+            </a:r>
+            <a:r>
+              <a:rPr lang="en-US" sz="1200" kern="1200" dirty="0" smtClean="0">
+                <a:solidFill>
+                  <a:schemeClr val="tx1"/>
+                </a:solidFill>
+                <a:effectLst/>
+                <a:latin typeface="+mn-lt"/>
+                <a:ea typeface="+mn-ea"/>
+                <a:cs typeface="+mn-cs"/>
+              </a:rPr>
+              <a:t>DOCUMENTNOTES</a:t>
+            </a:r>
+            <a:r>
+              <a:rPr lang="zh-CN" altLang="en-US" sz="1200" kern="1200" dirty="0" smtClean="0">
+                <a:solidFill>
+                  <a:schemeClr val="tx1"/>
+                </a:solidFill>
+                <a:effectLst/>
+                <a:latin typeface="+mn-lt"/>
+                <a:ea typeface="+mn-ea"/>
+                <a:cs typeface="+mn-cs"/>
+              </a:rPr>
+              <a:t>这个</a:t>
+            </a:r>
+            <a:r>
+              <a:rPr lang="en-US" sz="1200" kern="1200" dirty="0" smtClean="0">
+                <a:solidFill>
+                  <a:schemeClr val="tx1"/>
+                </a:solidFill>
+                <a:effectLst/>
+                <a:latin typeface="+mn-lt"/>
+                <a:ea typeface="+mn-ea"/>
+                <a:cs typeface="+mn-cs"/>
+              </a:rPr>
+              <a:t>internal table</a:t>
+            </a:r>
+            <a:r>
+              <a:rPr lang="zh-CN" altLang="en-US" sz="1200" kern="1200" dirty="0" smtClean="0">
+                <a:solidFill>
+                  <a:schemeClr val="tx1"/>
+                </a:solidFill>
+                <a:effectLst/>
+                <a:latin typeface="+mn-lt"/>
+                <a:ea typeface="+mn-ea"/>
+                <a:cs typeface="+mn-cs"/>
+              </a:rPr>
+              <a:t>里去。</a:t>
+            </a:r>
+            <a:endParaRPr lang="en-US" sz="1200" kern="1200" smtClean="0">
+              <a:solidFill>
+                <a:schemeClr val="tx1"/>
+              </a:solidFill>
+              <a:effectLst/>
+              <a:latin typeface="+mn-lt"/>
+              <a:ea typeface="+mn-ea"/>
+              <a:cs typeface="+mn-cs"/>
+            </a:endParaRPr>
+          </a:p>
+          <a:p>
+            <a:endParaRPr lang="en-US"/>
+          </a:p>
+        </p:txBody>
+      </p:sp>
+      <p:sp>
+        <p:nvSpPr>
+          <p:cNvPr id="4" name="Slide Number Placeholder 3"/>
+          <p:cNvSpPr>
+            <a:spLocks noGrp="1"/>
+          </p:cNvSpPr>
+          <p:nvPr>
+            <p:ph type="sldNum" sz="quarter" idx="10"/>
+          </p:nvPr>
+        </p:nvSpPr>
+        <p:spPr/>
+        <p:txBody>
+          <a:bodyPr/>
+          <a:lstStyle/>
+          <a:p>
+            <a:fld id="{25B1E16C-EC52-46D5-9BB3-59AA4A442EA6}" type="slidenum">
+              <a:rPr lang="en-US" smtClean="0"/>
+              <a:t>12</a:t>
+            </a:fld>
+            <a:endParaRPr lang="en-US"/>
+          </a:p>
+        </p:txBody>
+      </p:sp>
+    </p:spTree>
+    <p:extLst>
+      <p:ext uri="{BB962C8B-B14F-4D97-AF65-F5344CB8AC3E}">
+        <p14:creationId xmlns:p14="http://schemas.microsoft.com/office/powerpoint/2010/main" val="2486629095"/>
+      </p:ext>
+    </p:extLst>
+  </p:cSld>
+  <p:clrMapOvr>
+    <a:masterClrMapping/>
+  </p:clrMapOvr>
+</p:notes>
+</file>
+
 <file path=ppt/slideLayouts/slideLayout1.xml><?xml version="1.0" encoding="utf-8"?>
 <p:sldLayout xmlns:a="http://schemas.openxmlformats.org/drawingml/2006/main" xmlns:r="http://schemas.openxmlformats.org/officeDocument/2006/relationships" xmlns:p="http://schemas.openxmlformats.org/presentationml/2006/main" type="title" preserve="1">
   <p:cSld name="Title Slide">
@@ -1744,7 +2133,7 @@
           <a:p>
             <a:fld id="{32885C6E-53D4-4DF2-B9C6-C242624B2A8A}" type="datetimeFigureOut">
               <a:rPr lang="en-US" smtClean="0"/>
-              <a:t>2015-11-03</a:t>
+              <a:t>2015-12-09</a:t>
             </a:fld>
             <a:endParaRPr lang="en-US"/>
           </a:p>
@@ -1914,7 +2303,7 @@
           <a:p>
             <a:fld id="{32885C6E-53D4-4DF2-B9C6-C242624B2A8A}" type="datetimeFigureOut">
               <a:rPr lang="en-US" smtClean="0"/>
-              <a:t>2015-11-03</a:t>
+              <a:t>2015-12-09</a:t>
             </a:fld>
             <a:endParaRPr lang="en-US"/>
           </a:p>
@@ -2094,7 +2483,7 @@
           <a:p>
             <a:fld id="{32885C6E-53D4-4DF2-B9C6-C242624B2A8A}" type="datetimeFigureOut">
               <a:rPr lang="en-US" smtClean="0"/>
-              <a:t>2015-11-03</a:t>
+              <a:t>2015-12-09</a:t>
             </a:fld>
             <a:endParaRPr lang="en-US"/>
           </a:p>
@@ -2264,7 +2653,7 @@
           <a:p>
             <a:fld id="{32885C6E-53D4-4DF2-B9C6-C242624B2A8A}" type="datetimeFigureOut">
               <a:rPr lang="en-US" smtClean="0"/>
-              <a:t>2015-11-03</a:t>
+              <a:t>2015-12-09</a:t>
             </a:fld>
             <a:endParaRPr lang="en-US"/>
           </a:p>
@@ -2510,7 +2899,7 @@
           <a:p>
             <a:fld id="{32885C6E-53D4-4DF2-B9C6-C242624B2A8A}" type="datetimeFigureOut">
               <a:rPr lang="en-US" smtClean="0"/>
-              <a:t>2015-11-03</a:t>
+              <a:t>2015-12-09</a:t>
             </a:fld>
             <a:endParaRPr lang="en-US"/>
           </a:p>
@@ -2742,7 +3131,7 @@
           <a:p>
             <a:fld id="{32885C6E-53D4-4DF2-B9C6-C242624B2A8A}" type="datetimeFigureOut">
               <a:rPr lang="en-US" smtClean="0"/>
-              <a:t>2015-11-03</a:t>
+              <a:t>2015-12-09</a:t>
             </a:fld>
             <a:endParaRPr lang="en-US"/>
           </a:p>
@@ -3109,7 +3498,7 @@
           <a:p>
             <a:fld id="{32885C6E-53D4-4DF2-B9C6-C242624B2A8A}" type="datetimeFigureOut">
               <a:rPr lang="en-US" smtClean="0"/>
-              <a:t>2015-11-03</a:t>
+              <a:t>2015-12-09</a:t>
             </a:fld>
             <a:endParaRPr lang="en-US"/>
           </a:p>
@@ -3227,7 +3616,7 @@
           <a:p>
             <a:fld id="{32885C6E-53D4-4DF2-B9C6-C242624B2A8A}" type="datetimeFigureOut">
               <a:rPr lang="en-US" smtClean="0"/>
-              <a:t>2015-11-03</a:t>
+              <a:t>2015-12-09</a:t>
             </a:fld>
             <a:endParaRPr lang="en-US"/>
           </a:p>
@@ -3322,7 +3711,7 @@
           <a:p>
             <a:fld id="{32885C6E-53D4-4DF2-B9C6-C242624B2A8A}" type="datetimeFigureOut">
               <a:rPr lang="en-US" smtClean="0"/>
-              <a:t>2015-11-03</a:t>
+              <a:t>2015-12-09</a:t>
             </a:fld>
             <a:endParaRPr lang="en-US"/>
           </a:p>
@@ -3599,7 +3988,7 @@
           <a:p>
             <a:fld id="{32885C6E-53D4-4DF2-B9C6-C242624B2A8A}" type="datetimeFigureOut">
               <a:rPr lang="en-US" smtClean="0"/>
-              <a:t>2015-11-03</a:t>
+              <a:t>2015-12-09</a:t>
             </a:fld>
             <a:endParaRPr lang="en-US"/>
           </a:p>
@@ -3852,7 +4241,7 @@
           <a:p>
             <a:fld id="{32885C6E-53D4-4DF2-B9C6-C242624B2A8A}" type="datetimeFigureOut">
               <a:rPr lang="en-US" smtClean="0"/>
-              <a:t>2015-11-03</a:t>
+              <a:t>2015-12-09</a:t>
             </a:fld>
             <a:endParaRPr lang="en-US"/>
           </a:p>
@@ -4065,7 +4454,7 @@
           <a:p>
             <a:fld id="{32885C6E-53D4-4DF2-B9C6-C242624B2A8A}" type="datetimeFigureOut">
               <a:rPr lang="en-US" smtClean="0"/>
-              <a:t>2015-11-03</a:t>
+              <a:t>2015-12-09</a:t>
             </a:fld>
             <a:endParaRPr lang="en-US"/>
           </a:p>
@@ -4977,6 +5366,897 @@
   <p:clrMapOvr>
     <a:masterClrMapping/>
   </p:clrMapOvr>
+  <p:timing>
+    <p:tnLst>
+      <p:par>
+        <p:cTn id="1" dur="indefinite" restart="never" nodeType="tmRoot"/>
+      </p:par>
+    </p:tnLst>
+  </p:timing>
+</p:sld>
+</file>
+
+<file path=ppt/slides/slide12.xml><?xml version="1.0" encoding="utf-8"?>
+<p:sld xmlns:a="http://schemas.openxmlformats.org/drawingml/2006/main" xmlns:r="http://schemas.openxmlformats.org/officeDocument/2006/relationships" xmlns:p="http://schemas.openxmlformats.org/presentationml/2006/main">
+  <p:cSld>
+    <p:spTree>
+      <p:nvGrpSpPr>
+        <p:cNvPr id="1" name=""/>
+        <p:cNvGrpSpPr/>
+        <p:nvPr/>
+      </p:nvGrpSpPr>
+      <p:grpSpPr>
+        <a:xfrm>
+          <a:off x="0" y="0"/>
+          <a:ext cx="0" cy="0"/>
+          <a:chOff x="0" y="0"/>
+          <a:chExt cx="0" cy="0"/>
+        </a:xfrm>
+      </p:grpSpPr>
+      <p:sp>
+        <p:nvSpPr>
+          <p:cNvPr id="3" name="Rectangle 2"/>
+          <p:cNvSpPr/>
+          <p:nvPr/>
+        </p:nvSpPr>
+        <p:spPr>
+          <a:xfrm>
+            <a:off x="548640" y="1255776"/>
+            <a:ext cx="1341120" cy="597408"/>
+          </a:xfrm>
+          <a:prstGeom prst="rect">
+            <a:avLst/>
+          </a:prstGeom>
+        </p:spPr>
+        <p:style>
+          <a:lnRef idx="2">
+            <a:schemeClr val="accent1">
+              <a:shade val="50000"/>
+            </a:schemeClr>
+          </a:lnRef>
+          <a:fillRef idx="1">
+            <a:schemeClr val="accent1"/>
+          </a:fillRef>
+          <a:effectRef idx="0">
+            <a:schemeClr val="accent1"/>
+          </a:effectRef>
+          <a:fontRef idx="minor">
+            <a:schemeClr val="lt1"/>
+          </a:fontRef>
+        </p:style>
+        <p:txBody>
+          <a:bodyPr rtlCol="0" anchor="ctr"/>
+          <a:lstStyle/>
+          <a:p>
+            <a:pPr algn="ctr"/>
+            <a:r>
+              <a:rPr lang="en-US" altLang="zh-CN" dirty="0" smtClean="0"/>
+              <a:t>Task A</a:t>
+            </a:r>
+            <a:endParaRPr lang="en-US" dirty="0"/>
+          </a:p>
+        </p:txBody>
+      </p:sp>
+      <p:sp>
+        <p:nvSpPr>
+          <p:cNvPr id="5" name="Rectangle 4"/>
+          <p:cNvSpPr/>
+          <p:nvPr/>
+        </p:nvSpPr>
+        <p:spPr>
+          <a:xfrm>
+            <a:off x="2633472" y="646176"/>
+            <a:ext cx="1353312" cy="451104"/>
+          </a:xfrm>
+          <a:prstGeom prst="rect">
+            <a:avLst/>
+          </a:prstGeom>
+        </p:spPr>
+        <p:style>
+          <a:lnRef idx="2">
+            <a:schemeClr val="accent1">
+              <a:shade val="50000"/>
+            </a:schemeClr>
+          </a:lnRef>
+          <a:fillRef idx="1">
+            <a:schemeClr val="accent1"/>
+          </a:fillRef>
+          <a:effectRef idx="0">
+            <a:schemeClr val="accent1"/>
+          </a:effectRef>
+          <a:fontRef idx="minor">
+            <a:schemeClr val="lt1"/>
+          </a:fontRef>
+        </p:style>
+        <p:txBody>
+          <a:bodyPr rtlCol="0" anchor="ctr"/>
+          <a:lstStyle/>
+          <a:p>
+            <a:pPr algn="ctr"/>
+            <a:r>
+              <a:rPr lang="en-US" altLang="zh-CN" dirty="0" smtClean="0"/>
+              <a:t>Note 1</a:t>
+            </a:r>
+            <a:endParaRPr lang="en-US" dirty="0"/>
+          </a:p>
+        </p:txBody>
+      </p:sp>
+      <p:sp>
+        <p:nvSpPr>
+          <p:cNvPr id="6" name="Rectangle 5"/>
+          <p:cNvSpPr/>
+          <p:nvPr/>
+        </p:nvSpPr>
+        <p:spPr>
+          <a:xfrm>
+            <a:off x="2633472" y="1402080"/>
+            <a:ext cx="1353312" cy="451104"/>
+          </a:xfrm>
+          <a:prstGeom prst="rect">
+            <a:avLst/>
+          </a:prstGeom>
+        </p:spPr>
+        <p:style>
+          <a:lnRef idx="2">
+            <a:schemeClr val="accent1">
+              <a:shade val="50000"/>
+            </a:schemeClr>
+          </a:lnRef>
+          <a:fillRef idx="1">
+            <a:schemeClr val="accent1"/>
+          </a:fillRef>
+          <a:effectRef idx="0">
+            <a:schemeClr val="accent1"/>
+          </a:effectRef>
+          <a:fontRef idx="minor">
+            <a:schemeClr val="lt1"/>
+          </a:fontRef>
+        </p:style>
+        <p:txBody>
+          <a:bodyPr rtlCol="0" anchor="ctr"/>
+          <a:lstStyle/>
+          <a:p>
+            <a:pPr algn="ctr"/>
+            <a:r>
+              <a:rPr lang="en-US" altLang="zh-CN" dirty="0" smtClean="0"/>
+              <a:t>Note 2</a:t>
+            </a:r>
+            <a:endParaRPr lang="en-US" dirty="0"/>
+          </a:p>
+        </p:txBody>
+      </p:sp>
+      <p:sp>
+        <p:nvSpPr>
+          <p:cNvPr id="7" name="Rectangle 6"/>
+          <p:cNvSpPr/>
+          <p:nvPr/>
+        </p:nvSpPr>
+        <p:spPr>
+          <a:xfrm>
+            <a:off x="2633472" y="2377440"/>
+            <a:ext cx="1353312" cy="451104"/>
+          </a:xfrm>
+          <a:prstGeom prst="rect">
+            <a:avLst/>
+          </a:prstGeom>
+        </p:spPr>
+        <p:style>
+          <a:lnRef idx="2">
+            <a:schemeClr val="accent1">
+              <a:shade val="50000"/>
+            </a:schemeClr>
+          </a:lnRef>
+          <a:fillRef idx="1">
+            <a:schemeClr val="accent1"/>
+          </a:fillRef>
+          <a:effectRef idx="0">
+            <a:schemeClr val="accent1"/>
+          </a:effectRef>
+          <a:fontRef idx="minor">
+            <a:schemeClr val="lt1"/>
+          </a:fontRef>
+        </p:style>
+        <p:txBody>
+          <a:bodyPr rtlCol="0" anchor="ctr"/>
+          <a:lstStyle/>
+          <a:p>
+            <a:pPr algn="ctr"/>
+            <a:r>
+              <a:rPr lang="en-US" altLang="zh-CN" dirty="0" smtClean="0"/>
+              <a:t>Note 3</a:t>
+            </a:r>
+            <a:endParaRPr lang="en-US" dirty="0"/>
+          </a:p>
+        </p:txBody>
+      </p:sp>
+      <p:cxnSp>
+        <p:nvCxnSpPr>
+          <p:cNvPr id="9" name="Straight Arrow Connector 8"/>
+          <p:cNvCxnSpPr>
+            <a:stCxn id="5" idx="1"/>
+            <a:endCxn id="3" idx="3"/>
+          </p:cNvCxnSpPr>
+          <p:nvPr/>
+        </p:nvCxnSpPr>
+        <p:spPr>
+          <a:xfrm flipH="1">
+            <a:off x="1889760" y="871728"/>
+            <a:ext cx="743712" cy="682752"/>
+          </a:xfrm>
+          <a:prstGeom prst="straightConnector1">
+            <a:avLst/>
+          </a:prstGeom>
+          <a:ln>
+            <a:tailEnd type="triangle"/>
+          </a:ln>
+        </p:spPr>
+        <p:style>
+          <a:lnRef idx="1">
+            <a:schemeClr val="accent1"/>
+          </a:lnRef>
+          <a:fillRef idx="0">
+            <a:schemeClr val="accent1"/>
+          </a:fillRef>
+          <a:effectRef idx="0">
+            <a:schemeClr val="accent1"/>
+          </a:effectRef>
+          <a:fontRef idx="minor">
+            <a:schemeClr val="tx1"/>
+          </a:fontRef>
+        </p:style>
+      </p:cxnSp>
+      <p:cxnSp>
+        <p:nvCxnSpPr>
+          <p:cNvPr id="11" name="Straight Arrow Connector 10"/>
+          <p:cNvCxnSpPr>
+            <a:endCxn id="3" idx="3"/>
+          </p:cNvCxnSpPr>
+          <p:nvPr/>
+        </p:nvCxnSpPr>
+        <p:spPr>
+          <a:xfrm flipH="1" flipV="1">
+            <a:off x="1889760" y="1554480"/>
+            <a:ext cx="743712" cy="140208"/>
+          </a:xfrm>
+          <a:prstGeom prst="straightConnector1">
+            <a:avLst/>
+          </a:prstGeom>
+          <a:ln>
+            <a:tailEnd type="triangle"/>
+          </a:ln>
+        </p:spPr>
+        <p:style>
+          <a:lnRef idx="1">
+            <a:schemeClr val="accent1"/>
+          </a:lnRef>
+          <a:fillRef idx="0">
+            <a:schemeClr val="accent1"/>
+          </a:fillRef>
+          <a:effectRef idx="0">
+            <a:schemeClr val="accent1"/>
+          </a:effectRef>
+          <a:fontRef idx="minor">
+            <a:schemeClr val="tx1"/>
+          </a:fontRef>
+        </p:style>
+      </p:cxnSp>
+      <p:cxnSp>
+        <p:nvCxnSpPr>
+          <p:cNvPr id="13" name="Straight Arrow Connector 12"/>
+          <p:cNvCxnSpPr>
+            <a:stCxn id="7" idx="1"/>
+            <a:endCxn id="3" idx="3"/>
+          </p:cNvCxnSpPr>
+          <p:nvPr/>
+        </p:nvCxnSpPr>
+        <p:spPr>
+          <a:xfrm flipH="1" flipV="1">
+            <a:off x="1889760" y="1554480"/>
+            <a:ext cx="743712" cy="1048512"/>
+          </a:xfrm>
+          <a:prstGeom prst="straightConnector1">
+            <a:avLst/>
+          </a:prstGeom>
+          <a:ln>
+            <a:tailEnd type="triangle"/>
+          </a:ln>
+        </p:spPr>
+        <p:style>
+          <a:lnRef idx="1">
+            <a:schemeClr val="accent1"/>
+          </a:lnRef>
+          <a:fillRef idx="0">
+            <a:schemeClr val="accent1"/>
+          </a:fillRef>
+          <a:effectRef idx="0">
+            <a:schemeClr val="accent1"/>
+          </a:effectRef>
+          <a:fontRef idx="minor">
+            <a:schemeClr val="tx1"/>
+          </a:fontRef>
+        </p:style>
+      </p:cxnSp>
+      <p:sp>
+        <p:nvSpPr>
+          <p:cNvPr id="16" name="Rectangle 15"/>
+          <p:cNvSpPr/>
+          <p:nvPr/>
+        </p:nvSpPr>
+        <p:spPr>
+          <a:xfrm>
+            <a:off x="548640" y="4053840"/>
+            <a:ext cx="1341120" cy="597408"/>
+          </a:xfrm>
+          <a:prstGeom prst="rect">
+            <a:avLst/>
+          </a:prstGeom>
+        </p:spPr>
+        <p:style>
+          <a:lnRef idx="2">
+            <a:schemeClr val="accent1">
+              <a:shade val="50000"/>
+            </a:schemeClr>
+          </a:lnRef>
+          <a:fillRef idx="1">
+            <a:schemeClr val="accent1"/>
+          </a:fillRef>
+          <a:effectRef idx="0">
+            <a:schemeClr val="accent1"/>
+          </a:effectRef>
+          <a:fontRef idx="minor">
+            <a:schemeClr val="lt1"/>
+          </a:fontRef>
+        </p:style>
+        <p:txBody>
+          <a:bodyPr rtlCol="0" anchor="ctr"/>
+          <a:lstStyle/>
+          <a:p>
+            <a:pPr algn="ctr"/>
+            <a:r>
+              <a:rPr lang="en-US" altLang="zh-CN" dirty="0" smtClean="0"/>
+              <a:t>Task A</a:t>
+            </a:r>
+            <a:endParaRPr lang="en-US" dirty="0"/>
+          </a:p>
+        </p:txBody>
+      </p:sp>
+      <p:sp>
+        <p:nvSpPr>
+          <p:cNvPr id="17" name="Rectangle 16"/>
+          <p:cNvSpPr/>
+          <p:nvPr/>
+        </p:nvSpPr>
+        <p:spPr>
+          <a:xfrm>
+            <a:off x="548640" y="5010912"/>
+            <a:ext cx="1341120" cy="597408"/>
+          </a:xfrm>
+          <a:prstGeom prst="rect">
+            <a:avLst/>
+          </a:prstGeom>
+        </p:spPr>
+        <p:style>
+          <a:lnRef idx="2">
+            <a:schemeClr val="accent1">
+              <a:shade val="50000"/>
+            </a:schemeClr>
+          </a:lnRef>
+          <a:fillRef idx="1">
+            <a:schemeClr val="accent1"/>
+          </a:fillRef>
+          <a:effectRef idx="0">
+            <a:schemeClr val="accent1"/>
+          </a:effectRef>
+          <a:fontRef idx="minor">
+            <a:schemeClr val="lt1"/>
+          </a:fontRef>
+        </p:style>
+        <p:txBody>
+          <a:bodyPr rtlCol="0" anchor="ctr"/>
+          <a:lstStyle/>
+          <a:p>
+            <a:pPr algn="ctr"/>
+            <a:r>
+              <a:rPr lang="en-US" altLang="zh-CN" dirty="0" smtClean="0"/>
+              <a:t>Task B</a:t>
+            </a:r>
+            <a:endParaRPr lang="en-US" dirty="0"/>
+          </a:p>
+        </p:txBody>
+      </p:sp>
+      <p:sp>
+        <p:nvSpPr>
+          <p:cNvPr id="19" name="Rectangle 18"/>
+          <p:cNvSpPr/>
+          <p:nvPr/>
+        </p:nvSpPr>
+        <p:spPr>
+          <a:xfrm>
+            <a:off x="2633472" y="3355848"/>
+            <a:ext cx="1353312" cy="451104"/>
+          </a:xfrm>
+          <a:prstGeom prst="rect">
+            <a:avLst/>
+          </a:prstGeom>
+        </p:spPr>
+        <p:style>
+          <a:lnRef idx="2">
+            <a:schemeClr val="accent1">
+              <a:shade val="50000"/>
+            </a:schemeClr>
+          </a:lnRef>
+          <a:fillRef idx="1">
+            <a:schemeClr val="accent1"/>
+          </a:fillRef>
+          <a:effectRef idx="0">
+            <a:schemeClr val="accent1"/>
+          </a:effectRef>
+          <a:fontRef idx="minor">
+            <a:schemeClr val="lt1"/>
+          </a:fontRef>
+        </p:style>
+        <p:txBody>
+          <a:bodyPr rtlCol="0" anchor="ctr"/>
+          <a:lstStyle/>
+          <a:p>
+            <a:pPr algn="ctr"/>
+            <a:r>
+              <a:rPr lang="en-US" altLang="zh-CN" dirty="0" smtClean="0"/>
+              <a:t>Note A 1</a:t>
+            </a:r>
+            <a:endParaRPr lang="en-US" dirty="0"/>
+          </a:p>
+        </p:txBody>
+      </p:sp>
+      <p:sp>
+        <p:nvSpPr>
+          <p:cNvPr id="20" name="Rectangle 19"/>
+          <p:cNvSpPr/>
+          <p:nvPr/>
+        </p:nvSpPr>
+        <p:spPr>
+          <a:xfrm>
+            <a:off x="2633472" y="4053840"/>
+            <a:ext cx="1353312" cy="451104"/>
+          </a:xfrm>
+          <a:prstGeom prst="rect">
+            <a:avLst/>
+          </a:prstGeom>
+        </p:spPr>
+        <p:style>
+          <a:lnRef idx="2">
+            <a:schemeClr val="accent1">
+              <a:shade val="50000"/>
+            </a:schemeClr>
+          </a:lnRef>
+          <a:fillRef idx="1">
+            <a:schemeClr val="accent1"/>
+          </a:fillRef>
+          <a:effectRef idx="0">
+            <a:schemeClr val="accent1"/>
+          </a:effectRef>
+          <a:fontRef idx="minor">
+            <a:schemeClr val="lt1"/>
+          </a:fontRef>
+        </p:style>
+        <p:txBody>
+          <a:bodyPr rtlCol="0" anchor="ctr"/>
+          <a:lstStyle/>
+          <a:p>
+            <a:pPr algn="ctr"/>
+            <a:r>
+              <a:rPr lang="en-US" altLang="zh-CN" dirty="0" smtClean="0"/>
+              <a:t>Note B 1</a:t>
+            </a:r>
+            <a:endParaRPr lang="en-US" dirty="0"/>
+          </a:p>
+        </p:txBody>
+      </p:sp>
+      <p:sp>
+        <p:nvSpPr>
+          <p:cNvPr id="21" name="Rectangle 20"/>
+          <p:cNvSpPr/>
+          <p:nvPr/>
+        </p:nvSpPr>
+        <p:spPr>
+          <a:xfrm>
+            <a:off x="2633472" y="4858512"/>
+            <a:ext cx="1353312" cy="451104"/>
+          </a:xfrm>
+          <a:prstGeom prst="rect">
+            <a:avLst/>
+          </a:prstGeom>
+        </p:spPr>
+        <p:style>
+          <a:lnRef idx="2">
+            <a:schemeClr val="accent1">
+              <a:shade val="50000"/>
+            </a:schemeClr>
+          </a:lnRef>
+          <a:fillRef idx="1">
+            <a:schemeClr val="accent1"/>
+          </a:fillRef>
+          <a:effectRef idx="0">
+            <a:schemeClr val="accent1"/>
+          </a:effectRef>
+          <a:fontRef idx="minor">
+            <a:schemeClr val="lt1"/>
+          </a:fontRef>
+        </p:style>
+        <p:txBody>
+          <a:bodyPr rtlCol="0" anchor="ctr"/>
+          <a:lstStyle/>
+          <a:p>
+            <a:pPr algn="ctr"/>
+            <a:r>
+              <a:rPr lang="en-US" altLang="zh-CN" dirty="0" smtClean="0"/>
+              <a:t>Note A 2</a:t>
+            </a:r>
+            <a:endParaRPr lang="en-US" dirty="0"/>
+          </a:p>
+        </p:txBody>
+      </p:sp>
+      <p:sp>
+        <p:nvSpPr>
+          <p:cNvPr id="22" name="Rectangle 21"/>
+          <p:cNvSpPr/>
+          <p:nvPr/>
+        </p:nvSpPr>
+        <p:spPr>
+          <a:xfrm>
+            <a:off x="2633472" y="5608320"/>
+            <a:ext cx="1353312" cy="451104"/>
+          </a:xfrm>
+          <a:prstGeom prst="rect">
+            <a:avLst/>
+          </a:prstGeom>
+        </p:spPr>
+        <p:style>
+          <a:lnRef idx="2">
+            <a:schemeClr val="accent1">
+              <a:shade val="50000"/>
+            </a:schemeClr>
+          </a:lnRef>
+          <a:fillRef idx="1">
+            <a:schemeClr val="accent1"/>
+          </a:fillRef>
+          <a:effectRef idx="0">
+            <a:schemeClr val="accent1"/>
+          </a:effectRef>
+          <a:fontRef idx="minor">
+            <a:schemeClr val="lt1"/>
+          </a:fontRef>
+        </p:style>
+        <p:txBody>
+          <a:bodyPr rtlCol="0" anchor="ctr"/>
+          <a:lstStyle/>
+          <a:p>
+            <a:pPr algn="ctr"/>
+            <a:r>
+              <a:rPr lang="en-US" altLang="zh-CN" dirty="0" smtClean="0"/>
+              <a:t>Note B 2</a:t>
+            </a:r>
+            <a:endParaRPr lang="en-US" dirty="0"/>
+          </a:p>
+        </p:txBody>
+      </p:sp>
+      <p:cxnSp>
+        <p:nvCxnSpPr>
+          <p:cNvPr id="23" name="Straight Arrow Connector 22"/>
+          <p:cNvCxnSpPr>
+            <a:endCxn id="16" idx="3"/>
+          </p:cNvCxnSpPr>
+          <p:nvPr/>
+        </p:nvCxnSpPr>
+        <p:spPr>
+          <a:xfrm flipH="1">
+            <a:off x="1889760" y="3584448"/>
+            <a:ext cx="743712" cy="768096"/>
+          </a:xfrm>
+          <a:prstGeom prst="straightConnector1">
+            <a:avLst/>
+          </a:prstGeom>
+          <a:ln>
+            <a:tailEnd type="triangle"/>
+          </a:ln>
+        </p:spPr>
+        <p:style>
+          <a:lnRef idx="1">
+            <a:schemeClr val="accent1"/>
+          </a:lnRef>
+          <a:fillRef idx="0">
+            <a:schemeClr val="accent1"/>
+          </a:fillRef>
+          <a:effectRef idx="0">
+            <a:schemeClr val="accent1"/>
+          </a:effectRef>
+          <a:fontRef idx="minor">
+            <a:schemeClr val="tx1"/>
+          </a:fontRef>
+        </p:style>
+      </p:cxnSp>
+      <p:cxnSp>
+        <p:nvCxnSpPr>
+          <p:cNvPr id="25" name="Straight Arrow Connector 24"/>
+          <p:cNvCxnSpPr>
+            <a:stCxn id="21" idx="1"/>
+            <a:endCxn id="16" idx="3"/>
+          </p:cNvCxnSpPr>
+          <p:nvPr/>
+        </p:nvCxnSpPr>
+        <p:spPr>
+          <a:xfrm flipH="1" flipV="1">
+            <a:off x="1889760" y="4352544"/>
+            <a:ext cx="743712" cy="731520"/>
+          </a:xfrm>
+          <a:prstGeom prst="straightConnector1">
+            <a:avLst/>
+          </a:prstGeom>
+          <a:ln>
+            <a:tailEnd type="triangle"/>
+          </a:ln>
+        </p:spPr>
+        <p:style>
+          <a:lnRef idx="1">
+            <a:schemeClr val="accent1"/>
+          </a:lnRef>
+          <a:fillRef idx="0">
+            <a:schemeClr val="accent1"/>
+          </a:fillRef>
+          <a:effectRef idx="0">
+            <a:schemeClr val="accent1"/>
+          </a:effectRef>
+          <a:fontRef idx="minor">
+            <a:schemeClr val="tx1"/>
+          </a:fontRef>
+        </p:style>
+      </p:cxnSp>
+      <p:cxnSp>
+        <p:nvCxnSpPr>
+          <p:cNvPr id="28" name="Straight Arrow Connector 27"/>
+          <p:cNvCxnSpPr>
+            <a:stCxn id="20" idx="1"/>
+            <a:endCxn id="17" idx="3"/>
+          </p:cNvCxnSpPr>
+          <p:nvPr/>
+        </p:nvCxnSpPr>
+        <p:spPr>
+          <a:xfrm flipH="1">
+            <a:off x="1889760" y="4279392"/>
+            <a:ext cx="743712" cy="1030224"/>
+          </a:xfrm>
+          <a:prstGeom prst="straightConnector1">
+            <a:avLst/>
+          </a:prstGeom>
+          <a:ln>
+            <a:tailEnd type="triangle"/>
+          </a:ln>
+        </p:spPr>
+        <p:style>
+          <a:lnRef idx="1">
+            <a:schemeClr val="accent1"/>
+          </a:lnRef>
+          <a:fillRef idx="0">
+            <a:schemeClr val="accent1"/>
+          </a:fillRef>
+          <a:effectRef idx="0">
+            <a:schemeClr val="accent1"/>
+          </a:effectRef>
+          <a:fontRef idx="minor">
+            <a:schemeClr val="tx1"/>
+          </a:fontRef>
+        </p:style>
+      </p:cxnSp>
+      <p:cxnSp>
+        <p:nvCxnSpPr>
+          <p:cNvPr id="32" name="Straight Arrow Connector 31"/>
+          <p:cNvCxnSpPr>
+            <a:endCxn id="17" idx="3"/>
+          </p:cNvCxnSpPr>
+          <p:nvPr/>
+        </p:nvCxnSpPr>
+        <p:spPr>
+          <a:xfrm flipH="1" flipV="1">
+            <a:off x="1889760" y="5309616"/>
+            <a:ext cx="743712" cy="524256"/>
+          </a:xfrm>
+          <a:prstGeom prst="straightConnector1">
+            <a:avLst/>
+          </a:prstGeom>
+          <a:ln>
+            <a:tailEnd type="triangle"/>
+          </a:ln>
+        </p:spPr>
+        <p:style>
+          <a:lnRef idx="1">
+            <a:schemeClr val="accent1"/>
+          </a:lnRef>
+          <a:fillRef idx="0">
+            <a:schemeClr val="accent1"/>
+          </a:fillRef>
+          <a:effectRef idx="0">
+            <a:schemeClr val="accent1"/>
+          </a:effectRef>
+          <a:fontRef idx="minor">
+            <a:schemeClr val="tx1"/>
+          </a:fontRef>
+        </p:style>
+      </p:cxnSp>
+      <p:sp>
+        <p:nvSpPr>
+          <p:cNvPr id="34" name="Rectangle 33"/>
+          <p:cNvSpPr/>
+          <p:nvPr/>
+        </p:nvSpPr>
+        <p:spPr>
+          <a:xfrm>
+            <a:off x="2133600" y="475488"/>
+            <a:ext cx="2523744" cy="2584704"/>
+          </a:xfrm>
+          <a:prstGeom prst="rect">
+            <a:avLst/>
+          </a:prstGeom>
+          <a:noFill/>
+          <a:ln>
+            <a:prstDash val="dashDot"/>
+          </a:ln>
+        </p:spPr>
+        <p:style>
+          <a:lnRef idx="2">
+            <a:schemeClr val="accent1">
+              <a:shade val="50000"/>
+            </a:schemeClr>
+          </a:lnRef>
+          <a:fillRef idx="1">
+            <a:schemeClr val="accent1"/>
+          </a:fillRef>
+          <a:effectRef idx="0">
+            <a:schemeClr val="accent1"/>
+          </a:effectRef>
+          <a:fontRef idx="minor">
+            <a:schemeClr val="lt1"/>
+          </a:fontRef>
+        </p:style>
+        <p:txBody>
+          <a:bodyPr rtlCol="0" anchor="ctr"/>
+          <a:lstStyle/>
+          <a:p>
+            <a:pPr algn="ctr"/>
+            <a:endParaRPr lang="en-US"/>
+          </a:p>
+        </p:txBody>
+      </p:sp>
+      <p:sp>
+        <p:nvSpPr>
+          <p:cNvPr id="35" name="TextBox 34"/>
+          <p:cNvSpPr txBox="1"/>
+          <p:nvPr/>
+        </p:nvSpPr>
+        <p:spPr>
+          <a:xfrm>
+            <a:off x="4852416" y="1097280"/>
+            <a:ext cx="2572512" cy="755904"/>
+          </a:xfrm>
+          <a:prstGeom prst="rect">
+            <a:avLst/>
+          </a:prstGeom>
+          <a:noFill/>
+        </p:spPr>
+        <p:txBody>
+          <a:bodyPr wrap="square" rtlCol="0">
+            <a:spAutoFit/>
+          </a:bodyPr>
+          <a:lstStyle/>
+          <a:p>
+            <a:endParaRPr lang="en-US" dirty="0"/>
+          </a:p>
+        </p:txBody>
+      </p:sp>
+      <p:sp>
+        <p:nvSpPr>
+          <p:cNvPr id="36" name="Rectangle 35"/>
+          <p:cNvSpPr/>
+          <p:nvPr/>
+        </p:nvSpPr>
+        <p:spPr>
+          <a:xfrm>
+            <a:off x="307848" y="3656076"/>
+            <a:ext cx="1822704" cy="2124456"/>
+          </a:xfrm>
+          <a:prstGeom prst="rect">
+            <a:avLst/>
+          </a:prstGeom>
+          <a:noFill/>
+          <a:ln>
+            <a:prstDash val="dashDot"/>
+          </a:ln>
+        </p:spPr>
+        <p:style>
+          <a:lnRef idx="2">
+            <a:schemeClr val="accent1">
+              <a:shade val="50000"/>
+            </a:schemeClr>
+          </a:lnRef>
+          <a:fillRef idx="1">
+            <a:schemeClr val="accent1"/>
+          </a:fillRef>
+          <a:effectRef idx="0">
+            <a:schemeClr val="accent1"/>
+          </a:effectRef>
+          <a:fontRef idx="minor">
+            <a:schemeClr val="lt1"/>
+          </a:fontRef>
+        </p:style>
+        <p:txBody>
+          <a:bodyPr rtlCol="0" anchor="ctr"/>
+          <a:lstStyle/>
+          <a:p>
+            <a:pPr algn="ctr"/>
+            <a:endParaRPr lang="en-US"/>
+          </a:p>
+        </p:txBody>
+      </p:sp>
+      <p:sp>
+        <p:nvSpPr>
+          <p:cNvPr id="37" name="Rectangle 36"/>
+          <p:cNvSpPr/>
+          <p:nvPr/>
+        </p:nvSpPr>
+        <p:spPr>
+          <a:xfrm>
+            <a:off x="2371344" y="3195828"/>
+            <a:ext cx="1969008" cy="3070860"/>
+          </a:xfrm>
+          <a:prstGeom prst="rect">
+            <a:avLst/>
+          </a:prstGeom>
+          <a:noFill/>
+          <a:ln>
+            <a:prstDash val="dashDot"/>
+          </a:ln>
+        </p:spPr>
+        <p:style>
+          <a:lnRef idx="2">
+            <a:schemeClr val="accent1">
+              <a:shade val="50000"/>
+            </a:schemeClr>
+          </a:lnRef>
+          <a:fillRef idx="1">
+            <a:schemeClr val="accent1"/>
+          </a:fillRef>
+          <a:effectRef idx="0">
+            <a:schemeClr val="accent1"/>
+          </a:effectRef>
+          <a:fontRef idx="minor">
+            <a:schemeClr val="lt1"/>
+          </a:fontRef>
+        </p:style>
+        <p:txBody>
+          <a:bodyPr rtlCol="0" anchor="ctr"/>
+          <a:lstStyle/>
+          <a:p>
+            <a:pPr algn="ctr"/>
+            <a:endParaRPr lang="en-US"/>
+          </a:p>
+        </p:txBody>
+      </p:sp>
+    </p:spTree>
+    <p:extLst>
+      <p:ext uri="{BB962C8B-B14F-4D97-AF65-F5344CB8AC3E}">
+        <p14:creationId xmlns:p14="http://schemas.microsoft.com/office/powerpoint/2010/main" val="4090245834"/>
+      </p:ext>
+    </p:extLst>
+  </p:cSld>
+  <p:clrMapOvr>
+    <a:masterClrMapping/>
+  </p:clrMapOvr>
+  <p:timing>
+    <p:tnLst>
+      <p:par>
+        <p:cTn id="1" dur="indefinite" restart="never" nodeType="tmRoot"/>
+      </p:par>
+    </p:tnLst>
+  </p:timing>
 </p:sld>
 </file>
 

</xml_diff>

<commit_message>
add user status improvement slide
</commit_message>
<xml_diff>
--- a/Jerry.pptx
+++ b/Jerry.pptx
@@ -5,7 +5,7 @@
     <p:sldMasterId id="2147483648" r:id="rId1"/>
   </p:sldMasterIdLst>
   <p:notesMasterIdLst>
-    <p:notesMasterId r:id="rId15"/>
+    <p:notesMasterId r:id="rId16"/>
   </p:notesMasterIdLst>
   <p:sldIdLst>
     <p:sldId id="257" r:id="rId2"/>
@@ -21,6 +21,7 @@
     <p:sldId id="270" r:id="rId12"/>
     <p:sldId id="271" r:id="rId13"/>
     <p:sldId id="272" r:id="rId14"/>
+    <p:sldId id="273" r:id="rId15"/>
   </p:sldIdLst>
   <p:sldSz cx="12192000" cy="6858000"/>
   <p:notesSz cx="6858000" cy="9144000"/>
@@ -209,7 +210,7 @@
           <a:p>
             <a:fld id="{C1FFF932-AE32-4CB2-A004-ABC55BBBB993}" type="datetimeFigureOut">
               <a:rPr lang="en-US" smtClean="0"/>
-              <a:t>2015-12-22</a:t>
+              <a:t>2015-12-31</a:t>
             </a:fld>
             <a:endParaRPr lang="en-US"/>
           </a:p>
@@ -2134,7 +2135,7 @@
           <a:p>
             <a:fld id="{32885C6E-53D4-4DF2-B9C6-C242624B2A8A}" type="datetimeFigureOut">
               <a:rPr lang="en-US" smtClean="0"/>
-              <a:t>2015-12-22</a:t>
+              <a:t>2015-12-31</a:t>
             </a:fld>
             <a:endParaRPr lang="en-US"/>
           </a:p>
@@ -2304,7 +2305,7 @@
           <a:p>
             <a:fld id="{32885C6E-53D4-4DF2-B9C6-C242624B2A8A}" type="datetimeFigureOut">
               <a:rPr lang="en-US" smtClean="0"/>
-              <a:t>2015-12-22</a:t>
+              <a:t>2015-12-31</a:t>
             </a:fld>
             <a:endParaRPr lang="en-US"/>
           </a:p>
@@ -2484,7 +2485,7 @@
           <a:p>
             <a:fld id="{32885C6E-53D4-4DF2-B9C6-C242624B2A8A}" type="datetimeFigureOut">
               <a:rPr lang="en-US" smtClean="0"/>
-              <a:t>2015-12-22</a:t>
+              <a:t>2015-12-31</a:t>
             </a:fld>
             <a:endParaRPr lang="en-US"/>
           </a:p>
@@ -2654,7 +2655,7 @@
           <a:p>
             <a:fld id="{32885C6E-53D4-4DF2-B9C6-C242624B2A8A}" type="datetimeFigureOut">
               <a:rPr lang="en-US" smtClean="0"/>
-              <a:t>2015-12-22</a:t>
+              <a:t>2015-12-31</a:t>
             </a:fld>
             <a:endParaRPr lang="en-US"/>
           </a:p>
@@ -2900,7 +2901,7 @@
           <a:p>
             <a:fld id="{32885C6E-53D4-4DF2-B9C6-C242624B2A8A}" type="datetimeFigureOut">
               <a:rPr lang="en-US" smtClean="0"/>
-              <a:t>2015-12-22</a:t>
+              <a:t>2015-12-31</a:t>
             </a:fld>
             <a:endParaRPr lang="en-US"/>
           </a:p>
@@ -3132,7 +3133,7 @@
           <a:p>
             <a:fld id="{32885C6E-53D4-4DF2-B9C6-C242624B2A8A}" type="datetimeFigureOut">
               <a:rPr lang="en-US" smtClean="0"/>
-              <a:t>2015-12-22</a:t>
+              <a:t>2015-12-31</a:t>
             </a:fld>
             <a:endParaRPr lang="en-US"/>
           </a:p>
@@ -3499,7 +3500,7 @@
           <a:p>
             <a:fld id="{32885C6E-53D4-4DF2-B9C6-C242624B2A8A}" type="datetimeFigureOut">
               <a:rPr lang="en-US" smtClean="0"/>
-              <a:t>2015-12-22</a:t>
+              <a:t>2015-12-31</a:t>
             </a:fld>
             <a:endParaRPr lang="en-US"/>
           </a:p>
@@ -3617,7 +3618,7 @@
           <a:p>
             <a:fld id="{32885C6E-53D4-4DF2-B9C6-C242624B2A8A}" type="datetimeFigureOut">
               <a:rPr lang="en-US" smtClean="0"/>
-              <a:t>2015-12-22</a:t>
+              <a:t>2015-12-31</a:t>
             </a:fld>
             <a:endParaRPr lang="en-US"/>
           </a:p>
@@ -3712,7 +3713,7 @@
           <a:p>
             <a:fld id="{32885C6E-53D4-4DF2-B9C6-C242624B2A8A}" type="datetimeFigureOut">
               <a:rPr lang="en-US" smtClean="0"/>
-              <a:t>2015-12-22</a:t>
+              <a:t>2015-12-31</a:t>
             </a:fld>
             <a:endParaRPr lang="en-US"/>
           </a:p>
@@ -3989,7 +3990,7 @@
           <a:p>
             <a:fld id="{32885C6E-53D4-4DF2-B9C6-C242624B2A8A}" type="datetimeFigureOut">
               <a:rPr lang="en-US" smtClean="0"/>
-              <a:t>2015-12-22</a:t>
+              <a:t>2015-12-31</a:t>
             </a:fld>
             <a:endParaRPr lang="en-US"/>
           </a:p>
@@ -4242,7 +4243,7 @@
           <a:p>
             <a:fld id="{32885C6E-53D4-4DF2-B9C6-C242624B2A8A}" type="datetimeFigureOut">
               <a:rPr lang="en-US" smtClean="0"/>
-              <a:t>2015-12-22</a:t>
+              <a:t>2015-12-31</a:t>
             </a:fld>
             <a:endParaRPr lang="en-US"/>
           </a:p>
@@ -4455,7 +4456,7 @@
           <a:p>
             <a:fld id="{32885C6E-53D4-4DF2-B9C6-C242624B2A8A}" type="datetimeFigureOut">
               <a:rPr lang="en-US" smtClean="0"/>
-              <a:t>2015-12-22</a:t>
+              <a:t>2015-12-31</a:t>
             </a:fld>
             <a:endParaRPr lang="en-US"/>
           </a:p>
@@ -6724,6 +6725,652 @@
   <p:clrMapOvr>
     <a:masterClrMapping/>
   </p:clrMapOvr>
+  <p:timing>
+    <p:tnLst>
+      <p:par>
+        <p:cTn id="1" dur="indefinite" restart="never" nodeType="tmRoot"/>
+      </p:par>
+    </p:tnLst>
+  </p:timing>
+</p:sld>
+</file>
+
+<file path=ppt/slides/slide14.xml><?xml version="1.0" encoding="utf-8"?>
+<p:sld xmlns:a="http://schemas.openxmlformats.org/drawingml/2006/main" xmlns:r="http://schemas.openxmlformats.org/officeDocument/2006/relationships" xmlns:p="http://schemas.openxmlformats.org/presentationml/2006/main">
+  <p:cSld>
+    <p:spTree>
+      <p:nvGrpSpPr>
+        <p:cNvPr id="1" name=""/>
+        <p:cNvGrpSpPr/>
+        <p:nvPr/>
+      </p:nvGrpSpPr>
+      <p:grpSpPr>
+        <a:xfrm>
+          <a:off x="0" y="0"/>
+          <a:ext cx="0" cy="0"/>
+          <a:chOff x="0" y="0"/>
+          <a:chExt cx="0" cy="0"/>
+        </a:xfrm>
+      </p:grpSpPr>
+      <p:sp>
+        <p:nvSpPr>
+          <p:cNvPr id="3" name="Flowchart: Decision 2"/>
+          <p:cNvSpPr/>
+          <p:nvPr/>
+        </p:nvSpPr>
+        <p:spPr>
+          <a:xfrm>
+            <a:off x="1252603" y="237994"/>
+            <a:ext cx="3538602" cy="1440493"/>
+          </a:xfrm>
+          <a:prstGeom prst="flowChartDecision">
+            <a:avLst/>
+          </a:prstGeom>
+        </p:spPr>
+        <p:style>
+          <a:lnRef idx="2">
+            <a:schemeClr val="accent1">
+              <a:shade val="50000"/>
+            </a:schemeClr>
+          </a:lnRef>
+          <a:fillRef idx="1">
+            <a:schemeClr val="accent1"/>
+          </a:fillRef>
+          <a:effectRef idx="0">
+            <a:schemeClr val="accent1"/>
+          </a:effectRef>
+          <a:fontRef idx="minor">
+            <a:schemeClr val="lt1"/>
+          </a:fontRef>
+        </p:style>
+        <p:txBody>
+          <a:bodyPr rtlCol="0" anchor="ctr"/>
+          <a:lstStyle/>
+          <a:p>
+            <a:pPr algn="ctr"/>
+            <a:r>
+              <a:rPr lang="en-US" dirty="0" smtClean="0"/>
+              <a:t>does the transaction type has status profile? </a:t>
+            </a:r>
+            <a:endParaRPr lang="en-US" dirty="0"/>
+          </a:p>
+        </p:txBody>
+      </p:sp>
+      <p:sp>
+        <p:nvSpPr>
+          <p:cNvPr id="5" name="Rectangle 4"/>
+          <p:cNvSpPr/>
+          <p:nvPr/>
+        </p:nvSpPr>
+        <p:spPr>
+          <a:xfrm>
+            <a:off x="1625252" y="2430049"/>
+            <a:ext cx="2793304" cy="864817"/>
+          </a:xfrm>
+          <a:prstGeom prst="rect">
+            <a:avLst/>
+          </a:prstGeom>
+        </p:spPr>
+        <p:style>
+          <a:lnRef idx="2">
+            <a:schemeClr val="accent1">
+              <a:shade val="50000"/>
+            </a:schemeClr>
+          </a:lnRef>
+          <a:fillRef idx="1">
+            <a:schemeClr val="accent1"/>
+          </a:fillRef>
+          <a:effectRef idx="0">
+            <a:schemeClr val="accent1"/>
+          </a:effectRef>
+          <a:fontRef idx="minor">
+            <a:schemeClr val="lt1"/>
+          </a:fontRef>
+        </p:style>
+        <p:txBody>
+          <a:bodyPr rtlCol="0" anchor="ctr"/>
+          <a:lstStyle/>
+          <a:p>
+            <a:pPr algn="ctr"/>
+            <a:r>
+              <a:rPr lang="en-US" dirty="0" smtClean="0"/>
+              <a:t>Read user statuses assigned to that profile</a:t>
+            </a:r>
+            <a:endParaRPr lang="en-US" dirty="0"/>
+          </a:p>
+        </p:txBody>
+      </p:sp>
+      <p:sp>
+        <p:nvSpPr>
+          <p:cNvPr id="6" name="Rectangle 5"/>
+          <p:cNvSpPr/>
+          <p:nvPr/>
+        </p:nvSpPr>
+        <p:spPr>
+          <a:xfrm>
+            <a:off x="5448822" y="2426393"/>
+            <a:ext cx="2605414" cy="868473"/>
+          </a:xfrm>
+          <a:prstGeom prst="rect">
+            <a:avLst/>
+          </a:prstGeom>
+          <a:solidFill>
+            <a:schemeClr val="accent4">
+              <a:lumMod val="60000"/>
+              <a:lumOff val="40000"/>
+            </a:schemeClr>
+          </a:solidFill>
+        </p:spPr>
+        <p:style>
+          <a:lnRef idx="2">
+            <a:schemeClr val="accent1">
+              <a:shade val="50000"/>
+            </a:schemeClr>
+          </a:lnRef>
+          <a:fillRef idx="1">
+            <a:schemeClr val="accent1"/>
+          </a:fillRef>
+          <a:effectRef idx="0">
+            <a:schemeClr val="accent1"/>
+          </a:effectRef>
+          <a:fontRef idx="minor">
+            <a:schemeClr val="lt1"/>
+          </a:fontRef>
+        </p:style>
+        <p:txBody>
+          <a:bodyPr rtlCol="0" anchor="ctr"/>
+          <a:lstStyle/>
+          <a:p>
+            <a:pPr algn="ctr"/>
+            <a:r>
+              <a:rPr lang="en-US" sz="2000" b="1" dirty="0" smtClean="0">
+                <a:solidFill>
+                  <a:schemeClr val="tx1"/>
+                </a:solidFill>
+              </a:rPr>
+              <a:t>Get </a:t>
+            </a:r>
+            <a:r>
+              <a:rPr lang="en-US" sz="2000" b="1" dirty="0" smtClean="0">
+                <a:solidFill>
+                  <a:schemeClr val="tx1"/>
+                </a:solidFill>
+              </a:rPr>
+              <a:t>all system statuses from C table</a:t>
+            </a:r>
+            <a:endParaRPr lang="en-US" sz="2000" b="1" dirty="0">
+              <a:solidFill>
+                <a:schemeClr val="tx1"/>
+              </a:solidFill>
+            </a:endParaRPr>
+          </a:p>
+        </p:txBody>
+      </p:sp>
+      <p:sp>
+        <p:nvSpPr>
+          <p:cNvPr id="8" name="Rectangle 7"/>
+          <p:cNvSpPr/>
+          <p:nvPr/>
+        </p:nvSpPr>
+        <p:spPr>
+          <a:xfrm>
+            <a:off x="3507287" y="4076687"/>
+            <a:ext cx="2605414" cy="1102291"/>
+          </a:xfrm>
+          <a:prstGeom prst="rect">
+            <a:avLst/>
+          </a:prstGeom>
+          <a:solidFill>
+            <a:srgbClr val="FF0000"/>
+          </a:solidFill>
+        </p:spPr>
+        <p:style>
+          <a:lnRef idx="2">
+            <a:schemeClr val="accent1">
+              <a:shade val="50000"/>
+            </a:schemeClr>
+          </a:lnRef>
+          <a:fillRef idx="1">
+            <a:schemeClr val="accent1"/>
+          </a:fillRef>
+          <a:effectRef idx="0">
+            <a:schemeClr val="accent1"/>
+          </a:effectRef>
+          <a:fontRef idx="minor">
+            <a:schemeClr val="lt1"/>
+          </a:fontRef>
+        </p:style>
+        <p:txBody>
+          <a:bodyPr rtlCol="0" anchor="ctr"/>
+          <a:lstStyle/>
+          <a:p>
+            <a:pPr algn="ctr"/>
+            <a:r>
+              <a:rPr lang="en-US" b="1" dirty="0" smtClean="0"/>
+              <a:t>Do </a:t>
+            </a:r>
+            <a:r>
+              <a:rPr lang="en-US" b="1" dirty="0" smtClean="0"/>
+              <a:t>filtering according to status management internal logic</a:t>
+            </a:r>
+            <a:endParaRPr lang="en-US" b="1" dirty="0"/>
+          </a:p>
+        </p:txBody>
+      </p:sp>
+      <p:cxnSp>
+        <p:nvCxnSpPr>
+          <p:cNvPr id="10" name="Straight Arrow Connector 9"/>
+          <p:cNvCxnSpPr>
+            <a:stCxn id="3" idx="2"/>
+          </p:cNvCxnSpPr>
+          <p:nvPr/>
+        </p:nvCxnSpPr>
+        <p:spPr>
+          <a:xfrm>
+            <a:off x="3021904" y="1678487"/>
+            <a:ext cx="0" cy="1177447"/>
+          </a:xfrm>
+          <a:prstGeom prst="straightConnector1">
+            <a:avLst/>
+          </a:prstGeom>
+          <a:ln w="25400">
+            <a:tailEnd type="triangle"/>
+          </a:ln>
+        </p:spPr>
+        <p:style>
+          <a:lnRef idx="1">
+            <a:schemeClr val="accent1"/>
+          </a:lnRef>
+          <a:fillRef idx="0">
+            <a:schemeClr val="accent1"/>
+          </a:fillRef>
+          <a:effectRef idx="0">
+            <a:schemeClr val="accent1"/>
+          </a:effectRef>
+          <a:fontRef idx="minor">
+            <a:schemeClr val="tx1"/>
+          </a:fontRef>
+        </p:style>
+      </p:cxnSp>
+      <p:sp>
+        <p:nvSpPr>
+          <p:cNvPr id="12" name="TextBox 11"/>
+          <p:cNvSpPr txBox="1"/>
+          <p:nvPr/>
+        </p:nvSpPr>
+        <p:spPr>
+          <a:xfrm>
+            <a:off x="2392471" y="1869602"/>
+            <a:ext cx="629433" cy="369332"/>
+          </a:xfrm>
+          <a:prstGeom prst="rect">
+            <a:avLst/>
+          </a:prstGeom>
+          <a:noFill/>
+        </p:spPr>
+        <p:txBody>
+          <a:bodyPr wrap="square" rtlCol="0">
+            <a:spAutoFit/>
+          </a:bodyPr>
+          <a:lstStyle/>
+          <a:p>
+            <a:r>
+              <a:rPr lang="en-US" dirty="0" smtClean="0"/>
+              <a:t>Yes</a:t>
+            </a:r>
+            <a:endParaRPr lang="en-US" dirty="0"/>
+          </a:p>
+        </p:txBody>
+      </p:sp>
+      <p:sp>
+        <p:nvSpPr>
+          <p:cNvPr id="13" name="TextBox 12"/>
+          <p:cNvSpPr txBox="1"/>
+          <p:nvPr/>
+        </p:nvSpPr>
+        <p:spPr>
+          <a:xfrm>
+            <a:off x="5448822" y="639012"/>
+            <a:ext cx="629433" cy="369332"/>
+          </a:xfrm>
+          <a:prstGeom prst="rect">
+            <a:avLst/>
+          </a:prstGeom>
+          <a:noFill/>
+        </p:spPr>
+        <p:txBody>
+          <a:bodyPr wrap="square" rtlCol="0">
+            <a:spAutoFit/>
+          </a:bodyPr>
+          <a:lstStyle/>
+          <a:p>
+            <a:r>
+              <a:rPr lang="en-US" dirty="0" smtClean="0"/>
+              <a:t>No</a:t>
+            </a:r>
+            <a:endParaRPr lang="en-US" dirty="0"/>
+          </a:p>
+        </p:txBody>
+      </p:sp>
+      <p:cxnSp>
+        <p:nvCxnSpPr>
+          <p:cNvPr id="15" name="Elbow Connector 14"/>
+          <p:cNvCxnSpPr>
+            <a:stCxn id="3" idx="3"/>
+            <a:endCxn id="6" idx="0"/>
+          </p:cNvCxnSpPr>
+          <p:nvPr/>
+        </p:nvCxnSpPr>
+        <p:spPr>
+          <a:xfrm>
+            <a:off x="4791205" y="958241"/>
+            <a:ext cx="1960324" cy="1468152"/>
+          </a:xfrm>
+          <a:prstGeom prst="bentConnector2">
+            <a:avLst/>
+          </a:prstGeom>
+          <a:ln>
+            <a:tailEnd type="triangle"/>
+          </a:ln>
+        </p:spPr>
+        <p:style>
+          <a:lnRef idx="1">
+            <a:schemeClr val="accent1"/>
+          </a:lnRef>
+          <a:fillRef idx="0">
+            <a:schemeClr val="accent1"/>
+          </a:fillRef>
+          <a:effectRef idx="0">
+            <a:schemeClr val="accent1"/>
+          </a:effectRef>
+          <a:fontRef idx="minor">
+            <a:schemeClr val="tx1"/>
+          </a:fontRef>
+        </p:style>
+      </p:cxnSp>
+      <p:cxnSp>
+        <p:nvCxnSpPr>
+          <p:cNvPr id="16" name="Straight Arrow Connector 15"/>
+          <p:cNvCxnSpPr>
+            <a:endCxn id="6" idx="0"/>
+          </p:cNvCxnSpPr>
+          <p:nvPr/>
+        </p:nvCxnSpPr>
+        <p:spPr>
+          <a:xfrm>
+            <a:off x="6751529" y="2342367"/>
+            <a:ext cx="0" cy="84026"/>
+          </a:xfrm>
+          <a:prstGeom prst="straightConnector1">
+            <a:avLst/>
+          </a:prstGeom>
+          <a:ln w="25400">
+            <a:tailEnd type="triangle"/>
+          </a:ln>
+        </p:spPr>
+        <p:style>
+          <a:lnRef idx="1">
+            <a:schemeClr val="accent1"/>
+          </a:lnRef>
+          <a:fillRef idx="0">
+            <a:schemeClr val="accent1"/>
+          </a:fillRef>
+          <a:effectRef idx="0">
+            <a:schemeClr val="accent1"/>
+          </a:effectRef>
+          <a:fontRef idx="minor">
+            <a:schemeClr val="tx1"/>
+          </a:fontRef>
+        </p:style>
+      </p:cxnSp>
+      <p:sp>
+        <p:nvSpPr>
+          <p:cNvPr id="25" name="Rounded Rectangle 24"/>
+          <p:cNvSpPr/>
+          <p:nvPr/>
+        </p:nvSpPr>
+        <p:spPr>
+          <a:xfrm>
+            <a:off x="2038611" y="5733780"/>
+            <a:ext cx="1966586" cy="870563"/>
+          </a:xfrm>
+          <a:prstGeom prst="roundRect">
+            <a:avLst/>
+          </a:prstGeom>
+        </p:spPr>
+        <p:style>
+          <a:lnRef idx="2">
+            <a:schemeClr val="accent1">
+              <a:shade val="50000"/>
+            </a:schemeClr>
+          </a:lnRef>
+          <a:fillRef idx="1">
+            <a:schemeClr val="accent1"/>
+          </a:fillRef>
+          <a:effectRef idx="0">
+            <a:schemeClr val="accent1"/>
+          </a:effectRef>
+          <a:fontRef idx="minor">
+            <a:schemeClr val="lt1"/>
+          </a:fontRef>
+        </p:style>
+        <p:txBody>
+          <a:bodyPr rtlCol="0" anchor="ctr"/>
+          <a:lstStyle/>
+          <a:p>
+            <a:pPr algn="ctr"/>
+            <a:r>
+              <a:rPr lang="en-US" b="1" dirty="0" smtClean="0"/>
+              <a:t>User status returned</a:t>
+            </a:r>
+            <a:endParaRPr lang="en-US" b="1" dirty="0"/>
+          </a:p>
+        </p:txBody>
+      </p:sp>
+      <p:sp>
+        <p:nvSpPr>
+          <p:cNvPr id="26" name="Rounded Rectangle 25"/>
+          <p:cNvSpPr/>
+          <p:nvPr/>
+        </p:nvSpPr>
+        <p:spPr>
+          <a:xfrm>
+            <a:off x="5771367" y="5733780"/>
+            <a:ext cx="1966586" cy="870563"/>
+          </a:xfrm>
+          <a:prstGeom prst="roundRect">
+            <a:avLst/>
+          </a:prstGeom>
+        </p:spPr>
+        <p:style>
+          <a:lnRef idx="2">
+            <a:schemeClr val="accent1">
+              <a:shade val="50000"/>
+            </a:schemeClr>
+          </a:lnRef>
+          <a:fillRef idx="1">
+            <a:schemeClr val="accent1"/>
+          </a:fillRef>
+          <a:effectRef idx="0">
+            <a:schemeClr val="accent1"/>
+          </a:effectRef>
+          <a:fontRef idx="minor">
+            <a:schemeClr val="lt1"/>
+          </a:fontRef>
+        </p:style>
+        <p:txBody>
+          <a:bodyPr rtlCol="0" anchor="ctr"/>
+          <a:lstStyle/>
+          <a:p>
+            <a:pPr algn="ctr"/>
+            <a:r>
+              <a:rPr lang="en-US" b="1" dirty="0" smtClean="0"/>
+              <a:t>System status returned</a:t>
+            </a:r>
+            <a:endParaRPr lang="en-US" b="1" dirty="0"/>
+          </a:p>
+        </p:txBody>
+      </p:sp>
+      <p:cxnSp>
+        <p:nvCxnSpPr>
+          <p:cNvPr id="11" name="Elbow Connector 10"/>
+          <p:cNvCxnSpPr>
+            <a:stCxn id="5" idx="2"/>
+            <a:endCxn id="8" idx="1"/>
+          </p:cNvCxnSpPr>
+          <p:nvPr/>
+        </p:nvCxnSpPr>
+        <p:spPr>
+          <a:xfrm rot="16200000" flipH="1">
+            <a:off x="2598112" y="3718657"/>
+            <a:ext cx="1332967" cy="485383"/>
+          </a:xfrm>
+          <a:prstGeom prst="bentConnector2">
+            <a:avLst/>
+          </a:prstGeom>
+          <a:ln>
+            <a:tailEnd type="triangle"/>
+          </a:ln>
+        </p:spPr>
+        <p:style>
+          <a:lnRef idx="1">
+            <a:schemeClr val="accent1"/>
+          </a:lnRef>
+          <a:fillRef idx="0">
+            <a:schemeClr val="accent1"/>
+          </a:fillRef>
+          <a:effectRef idx="0">
+            <a:schemeClr val="accent1"/>
+          </a:effectRef>
+          <a:fontRef idx="minor">
+            <a:schemeClr val="tx1"/>
+          </a:fontRef>
+        </p:style>
+      </p:cxnSp>
+      <p:cxnSp>
+        <p:nvCxnSpPr>
+          <p:cNvPr id="23" name="Elbow Connector 22"/>
+          <p:cNvCxnSpPr>
+            <a:endCxn id="8" idx="3"/>
+          </p:cNvCxnSpPr>
+          <p:nvPr/>
+        </p:nvCxnSpPr>
+        <p:spPr>
+          <a:xfrm rot="5400000">
+            <a:off x="5747758" y="3624061"/>
+            <a:ext cx="1368716" cy="638829"/>
+          </a:xfrm>
+          <a:prstGeom prst="bentConnector2">
+            <a:avLst/>
+          </a:prstGeom>
+          <a:ln>
+            <a:tailEnd type="triangle"/>
+          </a:ln>
+        </p:spPr>
+        <p:style>
+          <a:lnRef idx="1">
+            <a:schemeClr val="accent1"/>
+          </a:lnRef>
+          <a:fillRef idx="0">
+            <a:schemeClr val="accent1"/>
+          </a:fillRef>
+          <a:effectRef idx="0">
+            <a:schemeClr val="accent1"/>
+          </a:effectRef>
+          <a:fontRef idx="minor">
+            <a:schemeClr val="tx1"/>
+          </a:fontRef>
+        </p:style>
+      </p:cxnSp>
+      <p:cxnSp>
+        <p:nvCxnSpPr>
+          <p:cNvPr id="24" name="Elbow Connector 23"/>
+          <p:cNvCxnSpPr>
+            <a:stCxn id="8" idx="2"/>
+            <a:endCxn id="25" idx="0"/>
+          </p:cNvCxnSpPr>
+          <p:nvPr/>
+        </p:nvCxnSpPr>
+        <p:spPr>
+          <a:xfrm rot="5400000">
+            <a:off x="3638548" y="4562334"/>
+            <a:ext cx="554802" cy="1788090"/>
+          </a:xfrm>
+          <a:prstGeom prst="bentConnector3">
+            <a:avLst/>
+          </a:prstGeom>
+          <a:ln>
+            <a:tailEnd type="triangle"/>
+          </a:ln>
+        </p:spPr>
+        <p:style>
+          <a:lnRef idx="1">
+            <a:schemeClr val="accent1"/>
+          </a:lnRef>
+          <a:fillRef idx="0">
+            <a:schemeClr val="accent1"/>
+          </a:fillRef>
+          <a:effectRef idx="0">
+            <a:schemeClr val="accent1"/>
+          </a:effectRef>
+          <a:fontRef idx="minor">
+            <a:schemeClr val="tx1"/>
+          </a:fontRef>
+        </p:style>
+      </p:cxnSp>
+      <p:cxnSp>
+        <p:nvCxnSpPr>
+          <p:cNvPr id="31" name="Elbow Connector 30"/>
+          <p:cNvCxnSpPr>
+            <a:stCxn id="8" idx="2"/>
+            <a:endCxn id="26" idx="0"/>
+          </p:cNvCxnSpPr>
+          <p:nvPr/>
+        </p:nvCxnSpPr>
+        <p:spPr>
+          <a:xfrm rot="16200000" flipH="1">
+            <a:off x="5504926" y="4484046"/>
+            <a:ext cx="554802" cy="1944666"/>
+          </a:xfrm>
+          <a:prstGeom prst="bentConnector3">
+            <a:avLst/>
+          </a:prstGeom>
+          <a:ln>
+            <a:tailEnd type="triangle"/>
+          </a:ln>
+        </p:spPr>
+        <p:style>
+          <a:lnRef idx="1">
+            <a:schemeClr val="accent1"/>
+          </a:lnRef>
+          <a:fillRef idx="0">
+            <a:schemeClr val="accent1"/>
+          </a:fillRef>
+          <a:effectRef idx="0">
+            <a:schemeClr val="accent1"/>
+          </a:effectRef>
+          <a:fontRef idx="minor">
+            <a:schemeClr val="tx1"/>
+          </a:fontRef>
+        </p:style>
+      </p:cxnSp>
+    </p:spTree>
+    <p:extLst>
+      <p:ext uri="{BB962C8B-B14F-4D97-AF65-F5344CB8AC3E}">
+        <p14:creationId xmlns:p14="http://schemas.microsoft.com/office/powerpoint/2010/main" val="1742348430"/>
+      </p:ext>
+    </p:extLst>
+  </p:cSld>
+  <p:clrMapOvr>
+    <a:masterClrMapping/>
+  </p:clrMapOvr>
+  <p:timing>
+    <p:tnLst>
+      <p:par>
+        <p:cTn id="1" dur="indefinite" restart="never" nodeType="tmRoot"/>
+      </p:par>
+    </p:tnLst>
+  </p:timing>
 </p:sld>
 </file>
 

</xml_diff>

<commit_message>
doc history without campaign scenario done
</commit_message>
<xml_diff>
--- a/Jerry.pptx
+++ b/Jerry.pptx
@@ -5,7 +5,7 @@
     <p:sldMasterId id="2147483648" r:id="rId1"/>
   </p:sldMasterIdLst>
   <p:notesMasterIdLst>
-    <p:notesMasterId r:id="rId16"/>
+    <p:notesMasterId r:id="rId17"/>
   </p:notesMasterIdLst>
   <p:sldIdLst>
     <p:sldId id="257" r:id="rId2"/>
@@ -22,6 +22,7 @@
     <p:sldId id="271" r:id="rId13"/>
     <p:sldId id="272" r:id="rId14"/>
     <p:sldId id="273" r:id="rId15"/>
+    <p:sldId id="274" r:id="rId16"/>
   </p:sldIdLst>
   <p:sldSz cx="12192000" cy="6858000"/>
   <p:notesSz cx="6858000" cy="9144000"/>
@@ -210,7 +211,7 @@
           <a:p>
             <a:fld id="{C1FFF932-AE32-4CB2-A004-ABC55BBBB993}" type="datetimeFigureOut">
               <a:rPr lang="en-US" smtClean="0"/>
-              <a:t>2015-12-31</a:t>
+              <a:t>2016-01-13</a:t>
             </a:fld>
             <a:endParaRPr lang="en-US"/>
           </a:p>
@@ -2135,7 +2136,7 @@
           <a:p>
             <a:fld id="{32885C6E-53D4-4DF2-B9C6-C242624B2A8A}" type="datetimeFigureOut">
               <a:rPr lang="en-US" smtClean="0"/>
-              <a:t>2015-12-31</a:t>
+              <a:t>2016-01-13</a:t>
             </a:fld>
             <a:endParaRPr lang="en-US"/>
           </a:p>
@@ -2305,7 +2306,7 @@
           <a:p>
             <a:fld id="{32885C6E-53D4-4DF2-B9C6-C242624B2A8A}" type="datetimeFigureOut">
               <a:rPr lang="en-US" smtClean="0"/>
-              <a:t>2015-12-31</a:t>
+              <a:t>2016-01-13</a:t>
             </a:fld>
             <a:endParaRPr lang="en-US"/>
           </a:p>
@@ -2485,7 +2486,7 @@
           <a:p>
             <a:fld id="{32885C6E-53D4-4DF2-B9C6-C242624B2A8A}" type="datetimeFigureOut">
               <a:rPr lang="en-US" smtClean="0"/>
-              <a:t>2015-12-31</a:t>
+              <a:t>2016-01-13</a:t>
             </a:fld>
             <a:endParaRPr lang="en-US"/>
           </a:p>
@@ -2655,7 +2656,7 @@
           <a:p>
             <a:fld id="{32885C6E-53D4-4DF2-B9C6-C242624B2A8A}" type="datetimeFigureOut">
               <a:rPr lang="en-US" smtClean="0"/>
-              <a:t>2015-12-31</a:t>
+              <a:t>2016-01-13</a:t>
             </a:fld>
             <a:endParaRPr lang="en-US"/>
           </a:p>
@@ -2901,7 +2902,7 @@
           <a:p>
             <a:fld id="{32885C6E-53D4-4DF2-B9C6-C242624B2A8A}" type="datetimeFigureOut">
               <a:rPr lang="en-US" smtClean="0"/>
-              <a:t>2015-12-31</a:t>
+              <a:t>2016-01-13</a:t>
             </a:fld>
             <a:endParaRPr lang="en-US"/>
           </a:p>
@@ -3133,7 +3134,7 @@
           <a:p>
             <a:fld id="{32885C6E-53D4-4DF2-B9C6-C242624B2A8A}" type="datetimeFigureOut">
               <a:rPr lang="en-US" smtClean="0"/>
-              <a:t>2015-12-31</a:t>
+              <a:t>2016-01-13</a:t>
             </a:fld>
             <a:endParaRPr lang="en-US"/>
           </a:p>
@@ -3500,7 +3501,7 @@
           <a:p>
             <a:fld id="{32885C6E-53D4-4DF2-B9C6-C242624B2A8A}" type="datetimeFigureOut">
               <a:rPr lang="en-US" smtClean="0"/>
-              <a:t>2015-12-31</a:t>
+              <a:t>2016-01-13</a:t>
             </a:fld>
             <a:endParaRPr lang="en-US"/>
           </a:p>
@@ -3618,7 +3619,7 @@
           <a:p>
             <a:fld id="{32885C6E-53D4-4DF2-B9C6-C242624B2A8A}" type="datetimeFigureOut">
               <a:rPr lang="en-US" smtClean="0"/>
-              <a:t>2015-12-31</a:t>
+              <a:t>2016-01-13</a:t>
             </a:fld>
             <a:endParaRPr lang="en-US"/>
           </a:p>
@@ -3713,7 +3714,7 @@
           <a:p>
             <a:fld id="{32885C6E-53D4-4DF2-B9C6-C242624B2A8A}" type="datetimeFigureOut">
               <a:rPr lang="en-US" smtClean="0"/>
-              <a:t>2015-12-31</a:t>
+              <a:t>2016-01-13</a:t>
             </a:fld>
             <a:endParaRPr lang="en-US"/>
           </a:p>
@@ -3990,7 +3991,7 @@
           <a:p>
             <a:fld id="{32885C6E-53D4-4DF2-B9C6-C242624B2A8A}" type="datetimeFigureOut">
               <a:rPr lang="en-US" smtClean="0"/>
-              <a:t>2015-12-31</a:t>
+              <a:t>2016-01-13</a:t>
             </a:fld>
             <a:endParaRPr lang="en-US"/>
           </a:p>
@@ -4243,7 +4244,7 @@
           <a:p>
             <a:fld id="{32885C6E-53D4-4DF2-B9C6-C242624B2A8A}" type="datetimeFigureOut">
               <a:rPr lang="en-US" smtClean="0"/>
-              <a:t>2015-12-31</a:t>
+              <a:t>2016-01-13</a:t>
             </a:fld>
             <a:endParaRPr lang="en-US"/>
           </a:p>
@@ -4456,7 +4457,7 @@
           <a:p>
             <a:fld id="{32885C6E-53D4-4DF2-B9C6-C242624B2A8A}" type="datetimeFigureOut">
               <a:rPr lang="en-US" smtClean="0"/>
-              <a:t>2015-12-31</a:t>
+              <a:t>2016-01-13</a:t>
             </a:fld>
             <a:endParaRPr lang="en-US"/>
           </a:p>
@@ -6888,15 +6889,7 @@
                   <a:schemeClr val="tx1"/>
                 </a:solidFill>
               </a:rPr>
-              <a:t>Get </a:t>
-            </a:r>
-            <a:r>
-              <a:rPr lang="en-US" sz="2000" b="1" dirty="0" smtClean="0">
-                <a:solidFill>
-                  <a:schemeClr val="tx1"/>
-                </a:solidFill>
-              </a:rPr>
-              <a:t>all system statuses from C table</a:t>
+              <a:t>Get all system statuses from C table</a:t>
             </a:r>
             <a:endParaRPr lang="en-US" sz="2000" b="1" dirty="0">
               <a:solidFill>
@@ -6947,11 +6940,7 @@
             <a:pPr algn="ctr"/>
             <a:r>
               <a:rPr lang="en-US" b="1" dirty="0" smtClean="0"/>
-              <a:t>Do </a:t>
-            </a:r>
-            <a:r>
-              <a:rPr lang="en-US" b="1" dirty="0" smtClean="0"/>
-              <a:t>filtering according to status management internal logic</a:t>
+              <a:t>Do filtering according to status management internal logic</a:t>
             </a:r>
             <a:endParaRPr lang="en-US" b="1" dirty="0"/>
           </a:p>
@@ -7358,6 +7347,158 @@
     <p:extLst>
       <p:ext uri="{BB962C8B-B14F-4D97-AF65-F5344CB8AC3E}">
         <p14:creationId xmlns:p14="http://schemas.microsoft.com/office/powerpoint/2010/main" val="1742348430"/>
+      </p:ext>
+    </p:extLst>
+  </p:cSld>
+  <p:clrMapOvr>
+    <a:masterClrMapping/>
+  </p:clrMapOvr>
+  <p:timing>
+    <p:tnLst>
+      <p:par>
+        <p:cTn id="1" dur="indefinite" restart="never" nodeType="tmRoot"/>
+      </p:par>
+    </p:tnLst>
+  </p:timing>
+</p:sld>
+</file>
+
+<file path=ppt/slides/slide15.xml><?xml version="1.0" encoding="utf-8"?>
+<p:sld xmlns:a="http://schemas.openxmlformats.org/drawingml/2006/main" xmlns:r="http://schemas.openxmlformats.org/officeDocument/2006/relationships" xmlns:p="http://schemas.openxmlformats.org/presentationml/2006/main">
+  <p:cSld>
+    <p:spTree>
+      <p:nvGrpSpPr>
+        <p:cNvPr id="1" name=""/>
+        <p:cNvGrpSpPr/>
+        <p:nvPr/>
+      </p:nvGrpSpPr>
+      <p:grpSpPr>
+        <a:xfrm>
+          <a:off x="0" y="0"/>
+          <a:ext cx="0" cy="0"/>
+          <a:chOff x="0" y="0"/>
+          <a:chExt cx="0" cy="0"/>
+        </a:xfrm>
+      </p:grpSpPr>
+      <p:sp>
+        <p:nvSpPr>
+          <p:cNvPr id="2" name="Title 1"/>
+          <p:cNvSpPr>
+            <a:spLocks noGrp="1"/>
+          </p:cNvSpPr>
+          <p:nvPr>
+            <p:ph type="title"/>
+          </p:nvPr>
+        </p:nvSpPr>
+        <p:spPr/>
+        <p:txBody>
+          <a:bodyPr/>
+          <a:lstStyle/>
+          <a:p>
+            <a:endParaRPr lang="en-US"/>
+          </a:p>
+        </p:txBody>
+      </p:sp>
+      <p:pic>
+        <p:nvPicPr>
+          <p:cNvPr id="3" name="Picture 2"/>
+          <p:cNvPicPr>
+            <a:picLocks noChangeAspect="1"/>
+          </p:cNvPicPr>
+          <p:nvPr/>
+        </p:nvPicPr>
+        <p:blipFill>
+          <a:blip r:embed="rId2"/>
+          <a:stretch>
+            <a:fillRect/>
+          </a:stretch>
+        </p:blipFill>
+        <p:spPr>
+          <a:xfrm>
+            <a:off x="426759" y="2068656"/>
+            <a:ext cx="5016910" cy="674543"/>
+          </a:xfrm>
+          <a:prstGeom prst="rect">
+            <a:avLst/>
+          </a:prstGeom>
+        </p:spPr>
+      </p:pic>
+      <p:pic>
+        <p:nvPicPr>
+          <p:cNvPr id="6" name="Picture 5"/>
+          <p:cNvPicPr>
+            <a:picLocks noChangeAspect="1"/>
+          </p:cNvPicPr>
+          <p:nvPr/>
+        </p:nvPicPr>
+        <p:blipFill>
+          <a:blip r:embed="rId3"/>
+          <a:stretch>
+            <a:fillRect/>
+          </a:stretch>
+        </p:blipFill>
+        <p:spPr>
+          <a:xfrm>
+            <a:off x="410057" y="4247136"/>
+            <a:ext cx="4007674" cy="750749"/>
+          </a:xfrm>
+          <a:prstGeom prst="rect">
+            <a:avLst/>
+          </a:prstGeom>
+        </p:spPr>
+      </p:pic>
+      <p:pic>
+        <p:nvPicPr>
+          <p:cNvPr id="8" name="Picture 7"/>
+          <p:cNvPicPr>
+            <a:picLocks noChangeAspect="1"/>
+          </p:cNvPicPr>
+          <p:nvPr/>
+        </p:nvPicPr>
+        <p:blipFill>
+          <a:blip r:embed="rId4"/>
+          <a:stretch>
+            <a:fillRect/>
+          </a:stretch>
+        </p:blipFill>
+        <p:spPr>
+          <a:xfrm>
+            <a:off x="410057" y="2927428"/>
+            <a:ext cx="8497036" cy="1135478"/>
+          </a:xfrm>
+          <a:prstGeom prst="rect">
+            <a:avLst/>
+          </a:prstGeom>
+        </p:spPr>
+      </p:pic>
+      <p:pic>
+        <p:nvPicPr>
+          <p:cNvPr id="10" name="Picture 9"/>
+          <p:cNvPicPr>
+            <a:picLocks noChangeAspect="1"/>
+          </p:cNvPicPr>
+          <p:nvPr/>
+        </p:nvPicPr>
+        <p:blipFill>
+          <a:blip r:embed="rId5"/>
+          <a:stretch>
+            <a:fillRect/>
+          </a:stretch>
+        </p:blipFill>
+        <p:spPr>
+          <a:xfrm>
+            <a:off x="426759" y="5182115"/>
+            <a:ext cx="8390347" cy="1348857"/>
+          </a:xfrm>
+          <a:prstGeom prst="rect">
+            <a:avLst/>
+          </a:prstGeom>
+        </p:spPr>
+      </p:pic>
+    </p:spTree>
+    <p:extLst>
+      <p:ext uri="{BB962C8B-B14F-4D97-AF65-F5344CB8AC3E}">
+        <p14:creationId xmlns:p14="http://schemas.microsoft.com/office/powerpoint/2010/main" val="785920965"/>
       </p:ext>
     </p:extLst>
   </p:cSld>

</xml_diff>

<commit_message>
add initial react folder
</commit_message>
<xml_diff>
--- a/Jerry.pptx
+++ b/Jerry.pptx
@@ -5,7 +5,7 @@
     <p:sldMasterId id="2147483648" r:id="rId1"/>
   </p:sldMasterIdLst>
   <p:notesMasterIdLst>
-    <p:notesMasterId r:id="rId17"/>
+    <p:notesMasterId r:id="rId18"/>
   </p:notesMasterIdLst>
   <p:sldIdLst>
     <p:sldId id="257" r:id="rId2"/>
@@ -23,6 +23,7 @@
     <p:sldId id="272" r:id="rId14"/>
     <p:sldId id="273" r:id="rId15"/>
     <p:sldId id="274" r:id="rId16"/>
+    <p:sldId id="275" r:id="rId17"/>
   </p:sldIdLst>
   <p:sldSz cx="12192000" cy="6858000"/>
   <p:notesSz cx="6858000" cy="9144000"/>
@@ -211,7 +212,7 @@
           <a:p>
             <a:fld id="{C1FFF932-AE32-4CB2-A004-ABC55BBBB993}" type="datetimeFigureOut">
               <a:rPr lang="en-US" smtClean="0"/>
-              <a:t>2016-01-13</a:t>
+              <a:t>2016-02-01</a:t>
             </a:fld>
             <a:endParaRPr lang="en-US"/>
           </a:p>
@@ -2136,7 +2137,7 @@
           <a:p>
             <a:fld id="{32885C6E-53D4-4DF2-B9C6-C242624B2A8A}" type="datetimeFigureOut">
               <a:rPr lang="en-US" smtClean="0"/>
-              <a:t>2016-01-13</a:t>
+              <a:t>2016-02-01</a:t>
             </a:fld>
             <a:endParaRPr lang="en-US"/>
           </a:p>
@@ -2306,7 +2307,7 @@
           <a:p>
             <a:fld id="{32885C6E-53D4-4DF2-B9C6-C242624B2A8A}" type="datetimeFigureOut">
               <a:rPr lang="en-US" smtClean="0"/>
-              <a:t>2016-01-13</a:t>
+              <a:t>2016-02-01</a:t>
             </a:fld>
             <a:endParaRPr lang="en-US"/>
           </a:p>
@@ -2486,7 +2487,7 @@
           <a:p>
             <a:fld id="{32885C6E-53D4-4DF2-B9C6-C242624B2A8A}" type="datetimeFigureOut">
               <a:rPr lang="en-US" smtClean="0"/>
-              <a:t>2016-01-13</a:t>
+              <a:t>2016-02-01</a:t>
             </a:fld>
             <a:endParaRPr lang="en-US"/>
           </a:p>
@@ -2656,7 +2657,7 @@
           <a:p>
             <a:fld id="{32885C6E-53D4-4DF2-B9C6-C242624B2A8A}" type="datetimeFigureOut">
               <a:rPr lang="en-US" smtClean="0"/>
-              <a:t>2016-01-13</a:t>
+              <a:t>2016-02-01</a:t>
             </a:fld>
             <a:endParaRPr lang="en-US"/>
           </a:p>
@@ -2902,7 +2903,7 @@
           <a:p>
             <a:fld id="{32885C6E-53D4-4DF2-B9C6-C242624B2A8A}" type="datetimeFigureOut">
               <a:rPr lang="en-US" smtClean="0"/>
-              <a:t>2016-01-13</a:t>
+              <a:t>2016-02-01</a:t>
             </a:fld>
             <a:endParaRPr lang="en-US"/>
           </a:p>
@@ -3134,7 +3135,7 @@
           <a:p>
             <a:fld id="{32885C6E-53D4-4DF2-B9C6-C242624B2A8A}" type="datetimeFigureOut">
               <a:rPr lang="en-US" smtClean="0"/>
-              <a:t>2016-01-13</a:t>
+              <a:t>2016-02-01</a:t>
             </a:fld>
             <a:endParaRPr lang="en-US"/>
           </a:p>
@@ -3501,7 +3502,7 @@
           <a:p>
             <a:fld id="{32885C6E-53D4-4DF2-B9C6-C242624B2A8A}" type="datetimeFigureOut">
               <a:rPr lang="en-US" smtClean="0"/>
-              <a:t>2016-01-13</a:t>
+              <a:t>2016-02-01</a:t>
             </a:fld>
             <a:endParaRPr lang="en-US"/>
           </a:p>
@@ -3619,7 +3620,7 @@
           <a:p>
             <a:fld id="{32885C6E-53D4-4DF2-B9C6-C242624B2A8A}" type="datetimeFigureOut">
               <a:rPr lang="en-US" smtClean="0"/>
-              <a:t>2016-01-13</a:t>
+              <a:t>2016-02-01</a:t>
             </a:fld>
             <a:endParaRPr lang="en-US"/>
           </a:p>
@@ -3714,7 +3715,7 @@
           <a:p>
             <a:fld id="{32885C6E-53D4-4DF2-B9C6-C242624B2A8A}" type="datetimeFigureOut">
               <a:rPr lang="en-US" smtClean="0"/>
-              <a:t>2016-01-13</a:t>
+              <a:t>2016-02-01</a:t>
             </a:fld>
             <a:endParaRPr lang="en-US"/>
           </a:p>
@@ -3991,7 +3992,7 @@
           <a:p>
             <a:fld id="{32885C6E-53D4-4DF2-B9C6-C242624B2A8A}" type="datetimeFigureOut">
               <a:rPr lang="en-US" smtClean="0"/>
-              <a:t>2016-01-13</a:t>
+              <a:t>2016-02-01</a:t>
             </a:fld>
             <a:endParaRPr lang="en-US"/>
           </a:p>
@@ -4244,7 +4245,7 @@
           <a:p>
             <a:fld id="{32885C6E-53D4-4DF2-B9C6-C242624B2A8A}" type="datetimeFigureOut">
               <a:rPr lang="en-US" smtClean="0"/>
-              <a:t>2016-01-13</a:t>
+              <a:t>2016-02-01</a:t>
             </a:fld>
             <a:endParaRPr lang="en-US"/>
           </a:p>
@@ -4457,7 +4458,7 @@
           <a:p>
             <a:fld id="{32885C6E-53D4-4DF2-B9C6-C242624B2A8A}" type="datetimeFigureOut">
               <a:rPr lang="en-US" smtClean="0"/>
-              <a:t>2016-01-13</a:t>
+              <a:t>2016-02-01</a:t>
             </a:fld>
             <a:endParaRPr lang="en-US"/>
           </a:p>
@@ -7499,6 +7500,91 @@
     <p:extLst>
       <p:ext uri="{BB962C8B-B14F-4D97-AF65-F5344CB8AC3E}">
         <p14:creationId xmlns:p14="http://schemas.microsoft.com/office/powerpoint/2010/main" val="785920965"/>
+      </p:ext>
+    </p:extLst>
+  </p:cSld>
+  <p:clrMapOvr>
+    <a:masterClrMapping/>
+  </p:clrMapOvr>
+  <p:timing>
+    <p:tnLst>
+      <p:par>
+        <p:cTn id="1" dur="indefinite" restart="never" nodeType="tmRoot"/>
+      </p:par>
+    </p:tnLst>
+  </p:timing>
+</p:sld>
+</file>
+
+<file path=ppt/slides/slide16.xml><?xml version="1.0" encoding="utf-8"?>
+<p:sld xmlns:a="http://schemas.openxmlformats.org/drawingml/2006/main" xmlns:r="http://schemas.openxmlformats.org/officeDocument/2006/relationships" xmlns:p="http://schemas.openxmlformats.org/presentationml/2006/main">
+  <p:cSld>
+    <p:spTree>
+      <p:nvGrpSpPr>
+        <p:cNvPr id="1" name=""/>
+        <p:cNvGrpSpPr/>
+        <p:nvPr/>
+      </p:nvGrpSpPr>
+      <p:grpSpPr>
+        <a:xfrm>
+          <a:off x="0" y="0"/>
+          <a:ext cx="0" cy="0"/>
+          <a:chOff x="0" y="0"/>
+          <a:chExt cx="0" cy="0"/>
+        </a:xfrm>
+      </p:grpSpPr>
+      <p:pic>
+        <p:nvPicPr>
+          <p:cNvPr id="3" name="Picture 2"/>
+          <p:cNvPicPr>
+            <a:picLocks noChangeAspect="1"/>
+          </p:cNvPicPr>
+          <p:nvPr/>
+        </p:nvPicPr>
+        <p:blipFill>
+          <a:blip r:embed="rId2"/>
+          <a:stretch>
+            <a:fillRect/>
+          </a:stretch>
+        </p:blipFill>
+        <p:spPr>
+          <a:xfrm>
+            <a:off x="231202" y="363898"/>
+            <a:ext cx="5969181" cy="4654540"/>
+          </a:xfrm>
+          <a:prstGeom prst="rect">
+            <a:avLst/>
+          </a:prstGeom>
+        </p:spPr>
+      </p:pic>
+      <p:pic>
+        <p:nvPicPr>
+          <p:cNvPr id="4" name="Picture 3"/>
+          <p:cNvPicPr>
+            <a:picLocks noChangeAspect="1"/>
+          </p:cNvPicPr>
+          <p:nvPr/>
+        </p:nvPicPr>
+        <p:blipFill>
+          <a:blip r:embed="rId3"/>
+          <a:stretch>
+            <a:fillRect/>
+          </a:stretch>
+        </p:blipFill>
+        <p:spPr>
+          <a:xfrm>
+            <a:off x="6407015" y="854818"/>
+            <a:ext cx="4177146" cy="1337238"/>
+          </a:xfrm>
+          <a:prstGeom prst="rect">
+            <a:avLst/>
+          </a:prstGeom>
+        </p:spPr>
+      </p:pic>
+    </p:spTree>
+    <p:extLst>
+      <p:ext uri="{BB962C8B-B14F-4D97-AF65-F5344CB8AC3E}">
+        <p14:creationId xmlns:p14="http://schemas.microsoft.com/office/powerpoint/2010/main" val="1926334056"/>
       </p:ext>
     </p:extLst>
   </p:cSld>

</xml_diff>

<commit_message>
learn smart table today
</commit_message>
<xml_diff>
--- a/Jerry.pptx
+++ b/Jerry.pptx
@@ -5,7 +5,7 @@
     <p:sldMasterId id="2147483648" r:id="rId1"/>
   </p:sldMasterIdLst>
   <p:notesMasterIdLst>
-    <p:notesMasterId r:id="rId19"/>
+    <p:notesMasterId r:id="rId20"/>
   </p:notesMasterIdLst>
   <p:sldIdLst>
     <p:sldId id="257" r:id="rId2"/>
@@ -25,6 +25,7 @@
     <p:sldId id="274" r:id="rId16"/>
     <p:sldId id="275" r:id="rId17"/>
     <p:sldId id="276" r:id="rId18"/>
+    <p:sldId id="277" r:id="rId19"/>
   </p:sldIdLst>
   <p:sldSz cx="12192000" cy="6858000"/>
   <p:notesSz cx="6858000" cy="9144000"/>
@@ -213,7 +214,7 @@
           <a:p>
             <a:fld id="{C1FFF932-AE32-4CB2-A004-ABC55BBBB993}" type="datetimeFigureOut">
               <a:rPr lang="en-US" smtClean="0"/>
-              <a:t>2016-03-10</a:t>
+              <a:t>2016-03-15</a:t>
             </a:fld>
             <a:endParaRPr lang="en-US"/>
           </a:p>
@@ -2138,7 +2139,7 @@
           <a:p>
             <a:fld id="{32885C6E-53D4-4DF2-B9C6-C242624B2A8A}" type="datetimeFigureOut">
               <a:rPr lang="en-US" smtClean="0"/>
-              <a:t>2016-03-10</a:t>
+              <a:t>2016-03-15</a:t>
             </a:fld>
             <a:endParaRPr lang="en-US"/>
           </a:p>
@@ -2308,7 +2309,7 @@
           <a:p>
             <a:fld id="{32885C6E-53D4-4DF2-B9C6-C242624B2A8A}" type="datetimeFigureOut">
               <a:rPr lang="en-US" smtClean="0"/>
-              <a:t>2016-03-10</a:t>
+              <a:t>2016-03-15</a:t>
             </a:fld>
             <a:endParaRPr lang="en-US"/>
           </a:p>
@@ -2488,7 +2489,7 @@
           <a:p>
             <a:fld id="{32885C6E-53D4-4DF2-B9C6-C242624B2A8A}" type="datetimeFigureOut">
               <a:rPr lang="en-US" smtClean="0"/>
-              <a:t>2016-03-10</a:t>
+              <a:t>2016-03-15</a:t>
             </a:fld>
             <a:endParaRPr lang="en-US"/>
           </a:p>
@@ -2658,7 +2659,7 @@
           <a:p>
             <a:fld id="{32885C6E-53D4-4DF2-B9C6-C242624B2A8A}" type="datetimeFigureOut">
               <a:rPr lang="en-US" smtClean="0"/>
-              <a:t>2016-03-10</a:t>
+              <a:t>2016-03-15</a:t>
             </a:fld>
             <a:endParaRPr lang="en-US"/>
           </a:p>
@@ -2904,7 +2905,7 @@
           <a:p>
             <a:fld id="{32885C6E-53D4-4DF2-B9C6-C242624B2A8A}" type="datetimeFigureOut">
               <a:rPr lang="en-US" smtClean="0"/>
-              <a:t>2016-03-10</a:t>
+              <a:t>2016-03-15</a:t>
             </a:fld>
             <a:endParaRPr lang="en-US"/>
           </a:p>
@@ -3136,7 +3137,7 @@
           <a:p>
             <a:fld id="{32885C6E-53D4-4DF2-B9C6-C242624B2A8A}" type="datetimeFigureOut">
               <a:rPr lang="en-US" smtClean="0"/>
-              <a:t>2016-03-10</a:t>
+              <a:t>2016-03-15</a:t>
             </a:fld>
             <a:endParaRPr lang="en-US"/>
           </a:p>
@@ -3503,7 +3504,7 @@
           <a:p>
             <a:fld id="{32885C6E-53D4-4DF2-B9C6-C242624B2A8A}" type="datetimeFigureOut">
               <a:rPr lang="en-US" smtClean="0"/>
-              <a:t>2016-03-10</a:t>
+              <a:t>2016-03-15</a:t>
             </a:fld>
             <a:endParaRPr lang="en-US"/>
           </a:p>
@@ -3621,7 +3622,7 @@
           <a:p>
             <a:fld id="{32885C6E-53D4-4DF2-B9C6-C242624B2A8A}" type="datetimeFigureOut">
               <a:rPr lang="en-US" smtClean="0"/>
-              <a:t>2016-03-10</a:t>
+              <a:t>2016-03-15</a:t>
             </a:fld>
             <a:endParaRPr lang="en-US"/>
           </a:p>
@@ -3716,7 +3717,7 @@
           <a:p>
             <a:fld id="{32885C6E-53D4-4DF2-B9C6-C242624B2A8A}" type="datetimeFigureOut">
               <a:rPr lang="en-US" smtClean="0"/>
-              <a:t>2016-03-10</a:t>
+              <a:t>2016-03-15</a:t>
             </a:fld>
             <a:endParaRPr lang="en-US"/>
           </a:p>
@@ -3993,7 +3994,7 @@
           <a:p>
             <a:fld id="{32885C6E-53D4-4DF2-B9C6-C242624B2A8A}" type="datetimeFigureOut">
               <a:rPr lang="en-US" smtClean="0"/>
-              <a:t>2016-03-10</a:t>
+              <a:t>2016-03-15</a:t>
             </a:fld>
             <a:endParaRPr lang="en-US"/>
           </a:p>
@@ -4246,7 +4247,7 @@
           <a:p>
             <a:fld id="{32885C6E-53D4-4DF2-B9C6-C242624B2A8A}" type="datetimeFigureOut">
               <a:rPr lang="en-US" smtClean="0"/>
-              <a:t>2016-03-10</a:t>
+              <a:t>2016-03-15</a:t>
             </a:fld>
             <a:endParaRPr lang="en-US"/>
           </a:p>
@@ -4459,7 +4460,7 @@
           <a:p>
             <a:fld id="{32885C6E-53D4-4DF2-B9C6-C242624B2A8A}" type="datetimeFigureOut">
               <a:rPr lang="en-US" smtClean="0"/>
-              <a:t>2016-03-10</a:t>
+              <a:t>2016-03-15</a:t>
             </a:fld>
             <a:endParaRPr lang="en-US"/>
           </a:p>
@@ -7833,6 +7834,487 @@
   <p:clrMapOvr>
     <a:masterClrMapping/>
   </p:clrMapOvr>
+  <p:timing>
+    <p:tnLst>
+      <p:par>
+        <p:cTn id="1" dur="indefinite" restart="never" nodeType="tmRoot"/>
+      </p:par>
+    </p:tnLst>
+  </p:timing>
+</p:sld>
+</file>
+
+<file path=ppt/slides/slide18.xml><?xml version="1.0" encoding="utf-8"?>
+<p:sld xmlns:a="http://schemas.openxmlformats.org/drawingml/2006/main" xmlns:r="http://schemas.openxmlformats.org/officeDocument/2006/relationships" xmlns:p="http://schemas.openxmlformats.org/presentationml/2006/main">
+  <p:cSld>
+    <p:spTree>
+      <p:nvGrpSpPr>
+        <p:cNvPr id="1" name=""/>
+        <p:cNvGrpSpPr/>
+        <p:nvPr/>
+      </p:nvGrpSpPr>
+      <p:grpSpPr>
+        <a:xfrm>
+          <a:off x="0" y="0"/>
+          <a:ext cx="0" cy="0"/>
+          <a:chOff x="0" y="0"/>
+          <a:chExt cx="0" cy="0"/>
+        </a:xfrm>
+      </p:grpSpPr>
+      <p:pic>
+        <p:nvPicPr>
+          <p:cNvPr id="3" name="Picture 2"/>
+          <p:cNvPicPr>
+            <a:picLocks noChangeAspect="1"/>
+          </p:cNvPicPr>
+          <p:nvPr/>
+        </p:nvPicPr>
+        <p:blipFill>
+          <a:blip r:embed="rId2"/>
+          <a:stretch>
+            <a:fillRect/>
+          </a:stretch>
+        </p:blipFill>
+        <p:spPr>
+          <a:xfrm>
+            <a:off x="328137" y="2346544"/>
+            <a:ext cx="5408633" cy="2232274"/>
+          </a:xfrm>
+          <a:prstGeom prst="rect">
+            <a:avLst/>
+          </a:prstGeom>
+          <a:ln w="38100">
+            <a:solidFill>
+              <a:srgbClr val="00B050"/>
+            </a:solidFill>
+          </a:ln>
+        </p:spPr>
+      </p:pic>
+      <p:pic>
+        <p:nvPicPr>
+          <p:cNvPr id="4" name="Picture 3"/>
+          <p:cNvPicPr>
+            <a:picLocks noChangeAspect="1"/>
+          </p:cNvPicPr>
+          <p:nvPr/>
+        </p:nvPicPr>
+        <p:blipFill>
+          <a:blip r:embed="rId3"/>
+          <a:stretch>
+            <a:fillRect/>
+          </a:stretch>
+        </p:blipFill>
+        <p:spPr>
+          <a:xfrm>
+            <a:off x="6442067" y="372793"/>
+            <a:ext cx="5220152" cy="2705334"/>
+          </a:xfrm>
+          <a:prstGeom prst="rect">
+            <a:avLst/>
+          </a:prstGeom>
+          <a:noFill/>
+          <a:ln w="38100">
+            <a:solidFill>
+              <a:schemeClr val="accent1"/>
+            </a:solidFill>
+          </a:ln>
+        </p:spPr>
+      </p:pic>
+      <p:pic>
+        <p:nvPicPr>
+          <p:cNvPr id="5" name="Picture 4"/>
+          <p:cNvPicPr>
+            <a:picLocks noChangeAspect="1"/>
+          </p:cNvPicPr>
+          <p:nvPr/>
+        </p:nvPicPr>
+        <p:blipFill>
+          <a:blip r:embed="rId4"/>
+          <a:stretch>
+            <a:fillRect/>
+          </a:stretch>
+        </p:blipFill>
+        <p:spPr>
+          <a:xfrm>
+            <a:off x="6793730" y="3174121"/>
+            <a:ext cx="1668925" cy="731583"/>
+          </a:xfrm>
+          <a:prstGeom prst="rect">
+            <a:avLst/>
+          </a:prstGeom>
+          <a:ln w="38100">
+            <a:solidFill>
+              <a:schemeClr val="accent1"/>
+            </a:solidFill>
+          </a:ln>
+        </p:spPr>
+      </p:pic>
+      <p:pic>
+        <p:nvPicPr>
+          <p:cNvPr id="6" name="Picture 5"/>
+          <p:cNvPicPr>
+            <a:picLocks noChangeAspect="1"/>
+          </p:cNvPicPr>
+          <p:nvPr/>
+        </p:nvPicPr>
+        <p:blipFill>
+          <a:blip r:embed="rId5"/>
+          <a:stretch>
+            <a:fillRect/>
+          </a:stretch>
+        </p:blipFill>
+        <p:spPr>
+          <a:xfrm>
+            <a:off x="8584018" y="4001698"/>
+            <a:ext cx="2484335" cy="1539373"/>
+          </a:xfrm>
+          <a:prstGeom prst="rect">
+            <a:avLst/>
+          </a:prstGeom>
+          <a:ln w="38100">
+            <a:solidFill>
+              <a:schemeClr val="accent1"/>
+            </a:solidFill>
+          </a:ln>
+        </p:spPr>
+      </p:pic>
+      <p:pic>
+        <p:nvPicPr>
+          <p:cNvPr id="7" name="Picture 6"/>
+          <p:cNvPicPr>
+            <a:picLocks noChangeAspect="1"/>
+          </p:cNvPicPr>
+          <p:nvPr/>
+        </p:nvPicPr>
+        <p:blipFill>
+          <a:blip r:embed="rId6"/>
+          <a:stretch>
+            <a:fillRect/>
+          </a:stretch>
+        </p:blipFill>
+        <p:spPr>
+          <a:xfrm>
+            <a:off x="733011" y="5348504"/>
+            <a:ext cx="7719729" cy="906859"/>
+          </a:xfrm>
+          <a:prstGeom prst="rect">
+            <a:avLst/>
+          </a:prstGeom>
+          <a:ln w="38100">
+            <a:solidFill>
+              <a:schemeClr val="accent1"/>
+            </a:solidFill>
+          </a:ln>
+        </p:spPr>
+      </p:pic>
+      <p:cxnSp>
+        <p:nvCxnSpPr>
+          <p:cNvPr id="9" name="Straight Arrow Connector 8"/>
+          <p:cNvCxnSpPr/>
+          <p:nvPr/>
+        </p:nvCxnSpPr>
+        <p:spPr>
+          <a:xfrm flipH="1">
+            <a:off x="1014609" y="1265129"/>
+            <a:ext cx="5711868" cy="1177446"/>
+          </a:xfrm>
+          <a:prstGeom prst="straightConnector1">
+            <a:avLst/>
+          </a:prstGeom>
+          <a:ln>
+            <a:tailEnd type="triangle"/>
+          </a:ln>
+        </p:spPr>
+        <p:style>
+          <a:lnRef idx="1">
+            <a:schemeClr val="accent1"/>
+          </a:lnRef>
+          <a:fillRef idx="0">
+            <a:schemeClr val="accent1"/>
+          </a:fillRef>
+          <a:effectRef idx="0">
+            <a:schemeClr val="accent1"/>
+          </a:effectRef>
+          <a:fontRef idx="minor">
+            <a:schemeClr val="tx1"/>
+          </a:fontRef>
+        </p:style>
+      </p:cxnSp>
+      <p:cxnSp>
+        <p:nvCxnSpPr>
+          <p:cNvPr id="12" name="Straight Arrow Connector 11"/>
+          <p:cNvCxnSpPr/>
+          <p:nvPr/>
+        </p:nvCxnSpPr>
+        <p:spPr>
+          <a:xfrm flipH="1" flipV="1">
+            <a:off x="2304789" y="2530258"/>
+            <a:ext cx="4672208" cy="1009654"/>
+          </a:xfrm>
+          <a:prstGeom prst="straightConnector1">
+            <a:avLst/>
+          </a:prstGeom>
+          <a:ln>
+            <a:tailEnd type="triangle"/>
+          </a:ln>
+        </p:spPr>
+        <p:style>
+          <a:lnRef idx="1">
+            <a:schemeClr val="accent1"/>
+          </a:lnRef>
+          <a:fillRef idx="0">
+            <a:schemeClr val="accent1"/>
+          </a:fillRef>
+          <a:effectRef idx="0">
+            <a:schemeClr val="accent1"/>
+          </a:effectRef>
+          <a:fontRef idx="minor">
+            <a:schemeClr val="tx1"/>
+          </a:fontRef>
+        </p:style>
+      </p:cxnSp>
+      <p:cxnSp>
+        <p:nvCxnSpPr>
+          <p:cNvPr id="14" name="Straight Arrow Connector 13"/>
+          <p:cNvCxnSpPr/>
+          <p:nvPr/>
+        </p:nvCxnSpPr>
+        <p:spPr>
+          <a:xfrm flipH="1" flipV="1">
+            <a:off x="3645074" y="3443629"/>
+            <a:ext cx="5407069" cy="1135189"/>
+          </a:xfrm>
+          <a:prstGeom prst="straightConnector1">
+            <a:avLst/>
+          </a:prstGeom>
+          <a:ln>
+            <a:tailEnd type="triangle"/>
+          </a:ln>
+        </p:spPr>
+        <p:style>
+          <a:lnRef idx="1">
+            <a:schemeClr val="accent1"/>
+          </a:lnRef>
+          <a:fillRef idx="0">
+            <a:schemeClr val="accent1"/>
+          </a:fillRef>
+          <a:effectRef idx="0">
+            <a:schemeClr val="accent1"/>
+          </a:effectRef>
+          <a:fontRef idx="minor">
+            <a:schemeClr val="tx1"/>
+          </a:fontRef>
+        </p:style>
+      </p:cxnSp>
+      <p:cxnSp>
+        <p:nvCxnSpPr>
+          <p:cNvPr id="17" name="Straight Arrow Connector 16"/>
+          <p:cNvCxnSpPr/>
+          <p:nvPr/>
+        </p:nvCxnSpPr>
+        <p:spPr>
+          <a:xfrm flipH="1" flipV="1">
+            <a:off x="3206663" y="4146115"/>
+            <a:ext cx="3587067" cy="1394956"/>
+          </a:xfrm>
+          <a:prstGeom prst="straightConnector1">
+            <a:avLst/>
+          </a:prstGeom>
+          <a:ln>
+            <a:tailEnd type="triangle"/>
+          </a:ln>
+        </p:spPr>
+        <p:style>
+          <a:lnRef idx="1">
+            <a:schemeClr val="accent1"/>
+          </a:lnRef>
+          <a:fillRef idx="0">
+            <a:schemeClr val="accent1"/>
+          </a:fillRef>
+          <a:effectRef idx="0">
+            <a:schemeClr val="accent1"/>
+          </a:effectRef>
+          <a:fontRef idx="minor">
+            <a:schemeClr val="tx1"/>
+          </a:fontRef>
+        </p:style>
+      </p:cxnSp>
+      <p:cxnSp>
+        <p:nvCxnSpPr>
+          <p:cNvPr id="19" name="Straight Arrow Connector 18"/>
+          <p:cNvCxnSpPr/>
+          <p:nvPr/>
+        </p:nvCxnSpPr>
+        <p:spPr>
+          <a:xfrm flipH="1" flipV="1">
+            <a:off x="2931090" y="4459266"/>
+            <a:ext cx="1903957" cy="1342667"/>
+          </a:xfrm>
+          <a:prstGeom prst="straightConnector1">
+            <a:avLst/>
+          </a:prstGeom>
+          <a:ln>
+            <a:tailEnd type="triangle"/>
+          </a:ln>
+        </p:spPr>
+        <p:style>
+          <a:lnRef idx="1">
+            <a:schemeClr val="accent1"/>
+          </a:lnRef>
+          <a:fillRef idx="0">
+            <a:schemeClr val="accent1"/>
+          </a:fillRef>
+          <a:effectRef idx="0">
+            <a:schemeClr val="accent1"/>
+          </a:effectRef>
+          <a:fontRef idx="minor">
+            <a:schemeClr val="tx1"/>
+          </a:fontRef>
+        </p:style>
+      </p:cxnSp>
+      <p:sp>
+        <p:nvSpPr>
+          <p:cNvPr id="20" name="TextBox 19"/>
+          <p:cNvSpPr txBox="1"/>
+          <p:nvPr/>
+        </p:nvSpPr>
+        <p:spPr>
+          <a:xfrm>
+            <a:off x="9306838" y="513567"/>
+            <a:ext cx="2066795" cy="400110"/>
+          </a:xfrm>
+          <a:prstGeom prst="rect">
+            <a:avLst/>
+          </a:prstGeom>
+          <a:noFill/>
+        </p:spPr>
+        <p:txBody>
+          <a:bodyPr wrap="square" rtlCol="0">
+            <a:spAutoFit/>
+          </a:bodyPr>
+          <a:lstStyle/>
+          <a:p>
+            <a:r>
+              <a:rPr lang="en-US" altLang="zh-CN" sz="2000" b="1" dirty="0" smtClean="0">
+                <a:solidFill>
+                  <a:srgbClr val="FFC000"/>
+                </a:solidFill>
+                <a:latin typeface="Arial" panose="020B0604020202020204" pitchFamily="34" charset="0"/>
+                <a:cs typeface="Arial" panose="020B0604020202020204" pitchFamily="34" charset="0"/>
+              </a:rPr>
+              <a:t>metadata.xml</a:t>
+            </a:r>
+            <a:endParaRPr lang="en-US" sz="2000" b="1" dirty="0">
+              <a:solidFill>
+                <a:srgbClr val="FFC000"/>
+              </a:solidFill>
+              <a:latin typeface="Arial" panose="020B0604020202020204" pitchFamily="34" charset="0"/>
+              <a:cs typeface="Arial" panose="020B0604020202020204" pitchFamily="34" charset="0"/>
+            </a:endParaRPr>
+          </a:p>
+        </p:txBody>
+      </p:sp>
+      <p:sp>
+        <p:nvSpPr>
+          <p:cNvPr id="21" name="TextBox 20"/>
+          <p:cNvSpPr txBox="1"/>
+          <p:nvPr/>
+        </p:nvSpPr>
+        <p:spPr>
+          <a:xfrm>
+            <a:off x="8462655" y="3281819"/>
+            <a:ext cx="3199564" cy="400110"/>
+          </a:xfrm>
+          <a:prstGeom prst="rect">
+            <a:avLst/>
+          </a:prstGeom>
+          <a:noFill/>
+        </p:spPr>
+        <p:txBody>
+          <a:bodyPr wrap="square" rtlCol="0">
+            <a:spAutoFit/>
+          </a:bodyPr>
+          <a:lstStyle/>
+          <a:p>
+            <a:r>
+              <a:rPr lang="en-US" sz="2000" b="1" dirty="0" smtClean="0">
+                <a:solidFill>
+                  <a:srgbClr val="FFC000"/>
+                </a:solidFill>
+                <a:latin typeface="Arial" panose="020B0604020202020204" pitchFamily="34" charset="0"/>
+                <a:cs typeface="Arial" panose="020B0604020202020204" pitchFamily="34" charset="0"/>
+              </a:rPr>
+              <a:t>Products.json</a:t>
+            </a:r>
+            <a:endParaRPr lang="en-US" sz="2000" b="1" dirty="0">
+              <a:solidFill>
+                <a:srgbClr val="FFC000"/>
+              </a:solidFill>
+              <a:latin typeface="Arial" panose="020B0604020202020204" pitchFamily="34" charset="0"/>
+              <a:cs typeface="Arial" panose="020B0604020202020204" pitchFamily="34" charset="0"/>
+            </a:endParaRPr>
+          </a:p>
+        </p:txBody>
+      </p:sp>
+      <p:sp>
+        <p:nvSpPr>
+          <p:cNvPr id="22" name="TextBox 21"/>
+          <p:cNvSpPr txBox="1"/>
+          <p:nvPr/>
+        </p:nvSpPr>
+        <p:spPr>
+          <a:xfrm>
+            <a:off x="8584018" y="5661764"/>
+            <a:ext cx="3315708" cy="400110"/>
+          </a:xfrm>
+          <a:prstGeom prst="rect">
+            <a:avLst/>
+          </a:prstGeom>
+          <a:noFill/>
+        </p:spPr>
+        <p:txBody>
+          <a:bodyPr wrap="square" rtlCol="0">
+            <a:spAutoFit/>
+          </a:bodyPr>
+          <a:lstStyle/>
+          <a:p>
+            <a:r>
+              <a:rPr lang="en-US" sz="2000" dirty="0" smtClean="0">
+                <a:solidFill>
+                  <a:srgbClr val="FFC000"/>
+                </a:solidFill>
+                <a:latin typeface="Arial" panose="020B0604020202020204" pitchFamily="34" charset="0"/>
+                <a:cs typeface="Arial" panose="020B0604020202020204" pitchFamily="34" charset="0"/>
+              </a:rPr>
+              <a:t>Application code</a:t>
+            </a:r>
+            <a:endParaRPr lang="en-US" sz="2000" dirty="0">
+              <a:solidFill>
+                <a:srgbClr val="FFC000"/>
+              </a:solidFill>
+              <a:latin typeface="Arial" panose="020B0604020202020204" pitchFamily="34" charset="0"/>
+              <a:cs typeface="Arial" panose="020B0604020202020204" pitchFamily="34" charset="0"/>
+            </a:endParaRPr>
+          </a:p>
+        </p:txBody>
+      </p:sp>
+    </p:spTree>
+    <p:extLst>
+      <p:ext uri="{BB962C8B-B14F-4D97-AF65-F5344CB8AC3E}">
+        <p14:creationId xmlns:p14="http://schemas.microsoft.com/office/powerpoint/2010/main" val="2544082298"/>
+      </p:ext>
+    </p:extLst>
+  </p:cSld>
+  <p:clrMapOvr>
+    <a:masterClrMapping/>
+  </p:clrMapOvr>
+  <p:timing>
+    <p:tnLst>
+      <p:par>
+        <p:cTn id="1" dur="indefinite" restart="never" nodeType="tmRoot"/>
+      </p:par>
+    </p:tnLst>
+  </p:timing>
 </p:sld>
 </file>
 

</xml_diff>

<commit_message>
add Part6 self study
</commit_message>
<xml_diff>
--- a/Jerry.pptx
+++ b/Jerry.pptx
@@ -5,7 +5,7 @@
     <p:sldMasterId id="2147483648" r:id="rId1"/>
   </p:sldMasterIdLst>
   <p:notesMasterIdLst>
-    <p:notesMasterId r:id="rId20"/>
+    <p:notesMasterId r:id="rId21"/>
   </p:notesMasterIdLst>
   <p:sldIdLst>
     <p:sldId id="257" r:id="rId2"/>
@@ -26,6 +26,7 @@
     <p:sldId id="275" r:id="rId17"/>
     <p:sldId id="276" r:id="rId18"/>
     <p:sldId id="277" r:id="rId19"/>
+    <p:sldId id="278" r:id="rId20"/>
   </p:sldIdLst>
   <p:sldSz cx="12192000" cy="6858000"/>
   <p:notesSz cx="6858000" cy="9144000"/>
@@ -214,7 +215,7 @@
           <a:p>
             <a:fld id="{C1FFF932-AE32-4CB2-A004-ABC55BBBB993}" type="datetimeFigureOut">
               <a:rPr lang="en-US" smtClean="0"/>
-              <a:t>2016-03-15</a:t>
+              <a:t>2016-03-25</a:t>
             </a:fld>
             <a:endParaRPr lang="en-US"/>
           </a:p>
@@ -2139,7 +2140,7 @@
           <a:p>
             <a:fld id="{32885C6E-53D4-4DF2-B9C6-C242624B2A8A}" type="datetimeFigureOut">
               <a:rPr lang="en-US" smtClean="0"/>
-              <a:t>2016-03-15</a:t>
+              <a:t>2016-03-25</a:t>
             </a:fld>
             <a:endParaRPr lang="en-US"/>
           </a:p>
@@ -2309,7 +2310,7 @@
           <a:p>
             <a:fld id="{32885C6E-53D4-4DF2-B9C6-C242624B2A8A}" type="datetimeFigureOut">
               <a:rPr lang="en-US" smtClean="0"/>
-              <a:t>2016-03-15</a:t>
+              <a:t>2016-03-25</a:t>
             </a:fld>
             <a:endParaRPr lang="en-US"/>
           </a:p>
@@ -2489,7 +2490,7 @@
           <a:p>
             <a:fld id="{32885C6E-53D4-4DF2-B9C6-C242624B2A8A}" type="datetimeFigureOut">
               <a:rPr lang="en-US" smtClean="0"/>
-              <a:t>2016-03-15</a:t>
+              <a:t>2016-03-25</a:t>
             </a:fld>
             <a:endParaRPr lang="en-US"/>
           </a:p>
@@ -2659,7 +2660,7 @@
           <a:p>
             <a:fld id="{32885C6E-53D4-4DF2-B9C6-C242624B2A8A}" type="datetimeFigureOut">
               <a:rPr lang="en-US" smtClean="0"/>
-              <a:t>2016-03-15</a:t>
+              <a:t>2016-03-25</a:t>
             </a:fld>
             <a:endParaRPr lang="en-US"/>
           </a:p>
@@ -2905,7 +2906,7 @@
           <a:p>
             <a:fld id="{32885C6E-53D4-4DF2-B9C6-C242624B2A8A}" type="datetimeFigureOut">
               <a:rPr lang="en-US" smtClean="0"/>
-              <a:t>2016-03-15</a:t>
+              <a:t>2016-03-25</a:t>
             </a:fld>
             <a:endParaRPr lang="en-US"/>
           </a:p>
@@ -3137,7 +3138,7 @@
           <a:p>
             <a:fld id="{32885C6E-53D4-4DF2-B9C6-C242624B2A8A}" type="datetimeFigureOut">
               <a:rPr lang="en-US" smtClean="0"/>
-              <a:t>2016-03-15</a:t>
+              <a:t>2016-03-25</a:t>
             </a:fld>
             <a:endParaRPr lang="en-US"/>
           </a:p>
@@ -3504,7 +3505,7 @@
           <a:p>
             <a:fld id="{32885C6E-53D4-4DF2-B9C6-C242624B2A8A}" type="datetimeFigureOut">
               <a:rPr lang="en-US" smtClean="0"/>
-              <a:t>2016-03-15</a:t>
+              <a:t>2016-03-25</a:t>
             </a:fld>
             <a:endParaRPr lang="en-US"/>
           </a:p>
@@ -3622,7 +3623,7 @@
           <a:p>
             <a:fld id="{32885C6E-53D4-4DF2-B9C6-C242624B2A8A}" type="datetimeFigureOut">
               <a:rPr lang="en-US" smtClean="0"/>
-              <a:t>2016-03-15</a:t>
+              <a:t>2016-03-25</a:t>
             </a:fld>
             <a:endParaRPr lang="en-US"/>
           </a:p>
@@ -3717,7 +3718,7 @@
           <a:p>
             <a:fld id="{32885C6E-53D4-4DF2-B9C6-C242624B2A8A}" type="datetimeFigureOut">
               <a:rPr lang="en-US" smtClean="0"/>
-              <a:t>2016-03-15</a:t>
+              <a:t>2016-03-25</a:t>
             </a:fld>
             <a:endParaRPr lang="en-US"/>
           </a:p>
@@ -3994,7 +3995,7 @@
           <a:p>
             <a:fld id="{32885C6E-53D4-4DF2-B9C6-C242624B2A8A}" type="datetimeFigureOut">
               <a:rPr lang="en-US" smtClean="0"/>
-              <a:t>2016-03-15</a:t>
+              <a:t>2016-03-25</a:t>
             </a:fld>
             <a:endParaRPr lang="en-US"/>
           </a:p>
@@ -4247,7 +4248,7 @@
           <a:p>
             <a:fld id="{32885C6E-53D4-4DF2-B9C6-C242624B2A8A}" type="datetimeFigureOut">
               <a:rPr lang="en-US" smtClean="0"/>
-              <a:t>2016-03-15</a:t>
+              <a:t>2016-03-25</a:t>
             </a:fld>
             <a:endParaRPr lang="en-US"/>
           </a:p>
@@ -4460,7 +4461,7 @@
           <a:p>
             <a:fld id="{32885C6E-53D4-4DF2-B9C6-C242624B2A8A}" type="datetimeFigureOut">
               <a:rPr lang="en-US" smtClean="0"/>
-              <a:t>2016-03-15</a:t>
+              <a:t>2016-03-25</a:t>
             </a:fld>
             <a:endParaRPr lang="en-US"/>
           </a:p>
@@ -8315,6 +8316,106 @@
       </p:par>
     </p:tnLst>
   </p:timing>
+</p:sld>
+</file>
+
+<file path=ppt/slides/slide19.xml><?xml version="1.0" encoding="utf-8"?>
+<p:sld xmlns:a="http://schemas.openxmlformats.org/drawingml/2006/main" xmlns:r="http://schemas.openxmlformats.org/officeDocument/2006/relationships" xmlns:p="http://schemas.openxmlformats.org/presentationml/2006/main">
+  <p:cSld>
+    <p:spTree>
+      <p:nvGrpSpPr>
+        <p:cNvPr id="1" name=""/>
+        <p:cNvGrpSpPr/>
+        <p:nvPr/>
+      </p:nvGrpSpPr>
+      <p:grpSpPr>
+        <a:xfrm>
+          <a:off x="0" y="0"/>
+          <a:ext cx="0" cy="0"/>
+          <a:chOff x="0" y="0"/>
+          <a:chExt cx="0" cy="0"/>
+        </a:xfrm>
+      </p:grpSpPr>
+      <p:pic>
+        <p:nvPicPr>
+          <p:cNvPr id="1026" name="Picture 2" descr="C:\Users\i042416\AppData\Local\YNote\data\cle.ee@163.com\0d61a6b7ea234aac9774ff03696dda57\clipboard.png"/>
+          <p:cNvPicPr>
+            <a:picLocks noChangeAspect="1" noChangeArrowheads="1"/>
+          </p:cNvPicPr>
+          <p:nvPr/>
+        </p:nvPicPr>
+        <p:blipFill>
+          <a:blip r:embed="rId2">
+            <a:extLst>
+              <a:ext uri="{28A0092B-C50C-407E-A947-70E740481C1C}">
+                <a14:useLocalDpi xmlns:a14="http://schemas.microsoft.com/office/drawing/2010/main" val="0"/>
+              </a:ext>
+            </a:extLst>
+          </a:blip>
+          <a:srcRect/>
+          <a:stretch>
+            <a:fillRect/>
+          </a:stretch>
+        </p:blipFill>
+        <p:spPr bwMode="auto">
+          <a:xfrm>
+            <a:off x="393570" y="750931"/>
+            <a:ext cx="9906000" cy="4629151"/>
+          </a:xfrm>
+          <a:prstGeom prst="rect">
+            <a:avLst/>
+          </a:prstGeom>
+          <a:noFill/>
+          <a:extLst>
+            <a:ext uri="{909E8E84-426E-40DD-AFC4-6F175D3DCCD1}">
+              <a14:hiddenFill xmlns:a14="http://schemas.microsoft.com/office/drawing/2010/main">
+                <a:solidFill>
+                  <a:srgbClr val="FFFFFF"/>
+                </a:solidFill>
+              </a14:hiddenFill>
+            </a:ext>
+          </a:extLst>
+        </p:spPr>
+      </p:pic>
+      <p:pic>
+        <p:nvPicPr>
+          <p:cNvPr id="3" name="Picture 2"/>
+          <p:cNvPicPr>
+            <a:picLocks noChangeAspect="1"/>
+          </p:cNvPicPr>
+          <p:nvPr/>
+        </p:nvPicPr>
+        <p:blipFill>
+          <a:blip r:embed="rId3"/>
+          <a:stretch>
+            <a:fillRect/>
+          </a:stretch>
+        </p:blipFill>
+        <p:spPr>
+          <a:xfrm>
+            <a:off x="4909813" y="2688923"/>
+            <a:ext cx="4885540" cy="2728057"/>
+          </a:xfrm>
+          <a:prstGeom prst="rect">
+            <a:avLst/>
+          </a:prstGeom>
+          <a:ln w="38100">
+            <a:solidFill>
+              <a:schemeClr val="accent1"/>
+            </a:solidFill>
+          </a:ln>
+        </p:spPr>
+      </p:pic>
+    </p:spTree>
+    <p:extLst>
+      <p:ext uri="{BB962C8B-B14F-4D97-AF65-F5344CB8AC3E}">
+        <p14:creationId xmlns:p14="http://schemas.microsoft.com/office/powerpoint/2010/main" val="4188252244"/>
+      </p:ext>
+    </p:extLst>
+  </p:cSld>
+  <p:clrMapOvr>
+    <a:masterClrMapping/>
+  </p:clrMapOvr>
 </p:sld>
 </file>
 

</xml_diff>

<commit_message>
Jerry adds some graph of view relationships
</commit_message>
<xml_diff>
--- a/Jerry.pptx
+++ b/Jerry.pptx
@@ -5,7 +5,7 @@
     <p:sldMasterId id="2147483648" r:id="rId1"/>
   </p:sldMasterIdLst>
   <p:notesMasterIdLst>
-    <p:notesMasterId r:id="rId22"/>
+    <p:notesMasterId r:id="rId23"/>
   </p:notesMasterIdLst>
   <p:sldIdLst>
     <p:sldId id="257" r:id="rId2"/>
@@ -28,6 +28,7 @@
     <p:sldId id="277" r:id="rId19"/>
     <p:sldId id="278" r:id="rId20"/>
     <p:sldId id="279" r:id="rId21"/>
+    <p:sldId id="280" r:id="rId22"/>
   </p:sldIdLst>
   <p:sldSz cx="12192000" cy="6858000"/>
   <p:notesSz cx="6858000" cy="9144000"/>
@@ -216,7 +217,7 @@
           <a:p>
             <a:fld id="{C1FFF932-AE32-4CB2-A004-ABC55BBBB993}" type="datetimeFigureOut">
               <a:rPr lang="en-US" smtClean="0"/>
-              <a:t>2016-03-26</a:t>
+              <a:t>2016-03-30</a:t>
             </a:fld>
             <a:endParaRPr lang="en-US"/>
           </a:p>
@@ -2141,7 +2142,7 @@
           <a:p>
             <a:fld id="{32885C6E-53D4-4DF2-B9C6-C242624B2A8A}" type="datetimeFigureOut">
               <a:rPr lang="en-US" smtClean="0"/>
-              <a:t>2016-03-26</a:t>
+              <a:t>2016-03-30</a:t>
             </a:fld>
             <a:endParaRPr lang="en-US"/>
           </a:p>
@@ -2311,7 +2312,7 @@
           <a:p>
             <a:fld id="{32885C6E-53D4-4DF2-B9C6-C242624B2A8A}" type="datetimeFigureOut">
               <a:rPr lang="en-US" smtClean="0"/>
-              <a:t>2016-03-26</a:t>
+              <a:t>2016-03-30</a:t>
             </a:fld>
             <a:endParaRPr lang="en-US"/>
           </a:p>
@@ -2491,7 +2492,7 @@
           <a:p>
             <a:fld id="{32885C6E-53D4-4DF2-B9C6-C242624B2A8A}" type="datetimeFigureOut">
               <a:rPr lang="en-US" smtClean="0"/>
-              <a:t>2016-03-26</a:t>
+              <a:t>2016-03-30</a:t>
             </a:fld>
             <a:endParaRPr lang="en-US"/>
           </a:p>
@@ -2661,7 +2662,7 @@
           <a:p>
             <a:fld id="{32885C6E-53D4-4DF2-B9C6-C242624B2A8A}" type="datetimeFigureOut">
               <a:rPr lang="en-US" smtClean="0"/>
-              <a:t>2016-03-26</a:t>
+              <a:t>2016-03-30</a:t>
             </a:fld>
             <a:endParaRPr lang="en-US"/>
           </a:p>
@@ -2907,7 +2908,7 @@
           <a:p>
             <a:fld id="{32885C6E-53D4-4DF2-B9C6-C242624B2A8A}" type="datetimeFigureOut">
               <a:rPr lang="en-US" smtClean="0"/>
-              <a:t>2016-03-26</a:t>
+              <a:t>2016-03-30</a:t>
             </a:fld>
             <a:endParaRPr lang="en-US"/>
           </a:p>
@@ -3139,7 +3140,7 @@
           <a:p>
             <a:fld id="{32885C6E-53D4-4DF2-B9C6-C242624B2A8A}" type="datetimeFigureOut">
               <a:rPr lang="en-US" smtClean="0"/>
-              <a:t>2016-03-26</a:t>
+              <a:t>2016-03-30</a:t>
             </a:fld>
             <a:endParaRPr lang="en-US"/>
           </a:p>
@@ -3506,7 +3507,7 @@
           <a:p>
             <a:fld id="{32885C6E-53D4-4DF2-B9C6-C242624B2A8A}" type="datetimeFigureOut">
               <a:rPr lang="en-US" smtClean="0"/>
-              <a:t>2016-03-26</a:t>
+              <a:t>2016-03-30</a:t>
             </a:fld>
             <a:endParaRPr lang="en-US"/>
           </a:p>
@@ -3624,7 +3625,7 @@
           <a:p>
             <a:fld id="{32885C6E-53D4-4DF2-B9C6-C242624B2A8A}" type="datetimeFigureOut">
               <a:rPr lang="en-US" smtClean="0"/>
-              <a:t>2016-03-26</a:t>
+              <a:t>2016-03-30</a:t>
             </a:fld>
             <a:endParaRPr lang="en-US"/>
           </a:p>
@@ -3719,7 +3720,7 @@
           <a:p>
             <a:fld id="{32885C6E-53D4-4DF2-B9C6-C242624B2A8A}" type="datetimeFigureOut">
               <a:rPr lang="en-US" smtClean="0"/>
-              <a:t>2016-03-26</a:t>
+              <a:t>2016-03-30</a:t>
             </a:fld>
             <a:endParaRPr lang="en-US"/>
           </a:p>
@@ -3996,7 +3997,7 @@
           <a:p>
             <a:fld id="{32885C6E-53D4-4DF2-B9C6-C242624B2A8A}" type="datetimeFigureOut">
               <a:rPr lang="en-US" smtClean="0"/>
-              <a:t>2016-03-26</a:t>
+              <a:t>2016-03-30</a:t>
             </a:fld>
             <a:endParaRPr lang="en-US"/>
           </a:p>
@@ -4249,7 +4250,7 @@
           <a:p>
             <a:fld id="{32885C6E-53D4-4DF2-B9C6-C242624B2A8A}" type="datetimeFigureOut">
               <a:rPr lang="en-US" smtClean="0"/>
-              <a:t>2016-03-26</a:t>
+              <a:t>2016-03-30</a:t>
             </a:fld>
             <a:endParaRPr lang="en-US"/>
           </a:p>
@@ -4462,7 +4463,7 @@
           <a:p>
             <a:fld id="{32885C6E-53D4-4DF2-B9C6-C242624B2A8A}" type="datetimeFigureOut">
               <a:rPr lang="en-US" smtClean="0"/>
-              <a:t>2016-03-26</a:t>
+              <a:t>2016-03-30</a:t>
             </a:fld>
             <a:endParaRPr lang="en-US"/>
           </a:p>
@@ -9814,6 +9815,439 @@
     <p:extLst>
       <p:ext uri="{BB962C8B-B14F-4D97-AF65-F5344CB8AC3E}">
         <p14:creationId xmlns:p14="http://schemas.microsoft.com/office/powerpoint/2010/main" val="3514660500"/>
+      </p:ext>
+    </p:extLst>
+  </p:cSld>
+  <p:clrMapOvr>
+    <a:masterClrMapping/>
+  </p:clrMapOvr>
+</p:sld>
+</file>
+
+<file path=ppt/slides/slide21.xml><?xml version="1.0" encoding="utf-8"?>
+<p:sld xmlns:a="http://schemas.openxmlformats.org/drawingml/2006/main" xmlns:r="http://schemas.openxmlformats.org/officeDocument/2006/relationships" xmlns:p="http://schemas.openxmlformats.org/presentationml/2006/main">
+  <p:cSld>
+    <p:spTree>
+      <p:nvGrpSpPr>
+        <p:cNvPr id="1" name=""/>
+        <p:cNvGrpSpPr/>
+        <p:nvPr/>
+      </p:nvGrpSpPr>
+      <p:grpSpPr>
+        <a:xfrm>
+          <a:off x="0" y="0"/>
+          <a:ext cx="0" cy="0"/>
+          <a:chOff x="0" y="0"/>
+          <a:chExt cx="0" cy="0"/>
+        </a:xfrm>
+      </p:grpSpPr>
+      <p:sp>
+        <p:nvSpPr>
+          <p:cNvPr id="3" name="Rectangle 2"/>
+          <p:cNvSpPr/>
+          <p:nvPr/>
+        </p:nvSpPr>
+        <p:spPr>
+          <a:xfrm>
+            <a:off x="1453019" y="964504"/>
+            <a:ext cx="2517732" cy="688932"/>
+          </a:xfrm>
+          <a:prstGeom prst="rect">
+            <a:avLst/>
+          </a:prstGeom>
+        </p:spPr>
+        <p:style>
+          <a:lnRef idx="2">
+            <a:schemeClr val="accent1">
+              <a:shade val="50000"/>
+            </a:schemeClr>
+          </a:lnRef>
+          <a:fillRef idx="1">
+            <a:schemeClr val="accent1"/>
+          </a:fillRef>
+          <a:effectRef idx="0">
+            <a:schemeClr val="accent1"/>
+          </a:effectRef>
+          <a:fontRef idx="minor">
+            <a:schemeClr val="lt1"/>
+          </a:fontRef>
+        </p:style>
+        <p:txBody>
+          <a:bodyPr rtlCol="0" anchor="ctr"/>
+          <a:lstStyle/>
+          <a:p>
+            <a:pPr algn="ctr"/>
+            <a:r>
+              <a:rPr lang="en-US" altLang="zh-CN" dirty="0" smtClean="0"/>
+              <a:t>Consumption view</a:t>
+            </a:r>
+            <a:endParaRPr lang="en-US" altLang="zh-CN" dirty="0"/>
+          </a:p>
+          <a:p>
+            <a:pPr algn="ctr"/>
+            <a:r>
+              <a:rPr lang="en-US" b="1" dirty="0" err="1"/>
+              <a:t>Zflight_Com</a:t>
+            </a:r>
+            <a:endParaRPr lang="en-US" b="1" dirty="0"/>
+          </a:p>
+        </p:txBody>
+      </p:sp>
+      <p:sp>
+        <p:nvSpPr>
+          <p:cNvPr id="4" name="TextBox 3"/>
+          <p:cNvSpPr txBox="1"/>
+          <p:nvPr/>
+        </p:nvSpPr>
+        <p:spPr>
+          <a:xfrm>
+            <a:off x="2066795" y="1653436"/>
+            <a:ext cx="2254684" cy="369332"/>
+          </a:xfrm>
+          <a:prstGeom prst="rect">
+            <a:avLst/>
+          </a:prstGeom>
+          <a:noFill/>
+        </p:spPr>
+        <p:txBody>
+          <a:bodyPr wrap="square" rtlCol="0">
+            <a:spAutoFit/>
+          </a:bodyPr>
+          <a:lstStyle/>
+          <a:p>
+            <a:r>
+              <a:rPr lang="en-US" dirty="0" err="1"/>
+              <a:t>Zspfli_Root</a:t>
+            </a:r>
+            <a:r>
+              <a:rPr lang="en-US" b="1" dirty="0" err="1"/>
+              <a:t>._Item</a:t>
+            </a:r>
+            <a:endParaRPr lang="en-US" dirty="0"/>
+          </a:p>
+        </p:txBody>
+      </p:sp>
+      <p:sp>
+        <p:nvSpPr>
+          <p:cNvPr id="5" name="Rectangle 4"/>
+          <p:cNvSpPr/>
+          <p:nvPr/>
+        </p:nvSpPr>
+        <p:spPr>
+          <a:xfrm>
+            <a:off x="3807912" y="2404997"/>
+            <a:ext cx="2004165" cy="676406"/>
+          </a:xfrm>
+          <a:prstGeom prst="rect">
+            <a:avLst/>
+          </a:prstGeom>
+        </p:spPr>
+        <p:style>
+          <a:lnRef idx="2">
+            <a:schemeClr val="accent1">
+              <a:shade val="50000"/>
+            </a:schemeClr>
+          </a:lnRef>
+          <a:fillRef idx="1">
+            <a:schemeClr val="accent1"/>
+          </a:fillRef>
+          <a:effectRef idx="0">
+            <a:schemeClr val="accent1"/>
+          </a:effectRef>
+          <a:fontRef idx="minor">
+            <a:schemeClr val="lt1"/>
+          </a:fontRef>
+        </p:style>
+        <p:txBody>
+          <a:bodyPr rtlCol="0" anchor="ctr"/>
+          <a:lstStyle/>
+          <a:p>
+            <a:pPr algn="ctr"/>
+            <a:r>
+              <a:rPr lang="en-US" dirty="0" err="1"/>
+              <a:t>Zspfli_Root</a:t>
+            </a:r>
+            <a:endParaRPr lang="en-US" dirty="0"/>
+          </a:p>
+        </p:txBody>
+      </p:sp>
+      <p:sp>
+        <p:nvSpPr>
+          <p:cNvPr id="6" name="TextBox 5"/>
+          <p:cNvSpPr txBox="1"/>
+          <p:nvPr/>
+        </p:nvSpPr>
+        <p:spPr>
+          <a:xfrm>
+            <a:off x="5987441" y="2542784"/>
+            <a:ext cx="5436296" cy="923330"/>
+          </a:xfrm>
+          <a:prstGeom prst="rect">
+            <a:avLst/>
+          </a:prstGeom>
+          <a:noFill/>
+        </p:spPr>
+        <p:txBody>
+          <a:bodyPr wrap="square" rtlCol="0">
+            <a:spAutoFit/>
+          </a:bodyPr>
+          <a:lstStyle/>
+          <a:p>
+            <a:r>
+              <a:rPr lang="en-US" b="1" dirty="0"/>
+              <a:t>association [0..*] to </a:t>
+            </a:r>
+            <a:r>
+              <a:rPr lang="en-US" b="1" dirty="0" err="1"/>
+              <a:t>Zsflight_Child</a:t>
+            </a:r>
+            <a:r>
+              <a:rPr lang="en-US" b="1" dirty="0"/>
+              <a:t> as _Item on $</a:t>
+            </a:r>
+            <a:r>
+              <a:rPr lang="en-US" b="1" dirty="0" err="1"/>
+              <a:t>projection.carrid</a:t>
+            </a:r>
+            <a:r>
+              <a:rPr lang="en-US" b="1" dirty="0"/>
+              <a:t> = _</a:t>
+            </a:r>
+            <a:r>
+              <a:rPr lang="en-US" b="1" dirty="0" err="1"/>
+              <a:t>Item.carrid</a:t>
+            </a:r>
+            <a:endParaRPr lang="en-US" b="1" dirty="0"/>
+          </a:p>
+          <a:p>
+            <a:r>
+              <a:rPr lang="en-US" b="1" dirty="0" smtClean="0"/>
+              <a:t>and </a:t>
+            </a:r>
+            <a:r>
+              <a:rPr lang="en-US" b="1" dirty="0"/>
+              <a:t>$</a:t>
+            </a:r>
+            <a:r>
+              <a:rPr lang="en-US" b="1" dirty="0" err="1"/>
+              <a:t>projection.connid</a:t>
+            </a:r>
+            <a:r>
+              <a:rPr lang="en-US" b="1" dirty="0"/>
+              <a:t> = _</a:t>
+            </a:r>
+            <a:r>
+              <a:rPr lang="en-US" b="1" dirty="0" err="1"/>
+              <a:t>Item.connid</a:t>
+            </a:r>
+            <a:endParaRPr lang="en-US" dirty="0"/>
+          </a:p>
+        </p:txBody>
+      </p:sp>
+      <p:sp>
+        <p:nvSpPr>
+          <p:cNvPr id="7" name="TextBox 6"/>
+          <p:cNvSpPr txBox="1"/>
+          <p:nvPr/>
+        </p:nvSpPr>
+        <p:spPr>
+          <a:xfrm>
+            <a:off x="5987441" y="3582444"/>
+            <a:ext cx="4709786" cy="923330"/>
+          </a:xfrm>
+          <a:prstGeom prst="rect">
+            <a:avLst/>
+          </a:prstGeom>
+          <a:noFill/>
+        </p:spPr>
+        <p:txBody>
+          <a:bodyPr wrap="square" rtlCol="0">
+            <a:spAutoFit/>
+          </a:bodyPr>
+          <a:lstStyle/>
+          <a:p>
+            <a:r>
+              <a:rPr lang="en-US" dirty="0"/>
+              <a:t>@</a:t>
+            </a:r>
+            <a:r>
+              <a:rPr lang="en-US" dirty="0" err="1"/>
+              <a:t>ObjectModel.association.type</a:t>
+            </a:r>
+            <a:r>
+              <a:rPr lang="en-US" dirty="0"/>
+              <a:t>: #TO_COMPOSITION_CHILD</a:t>
+            </a:r>
+          </a:p>
+          <a:p>
+            <a:r>
+              <a:rPr lang="en-US" dirty="0"/>
+              <a:t>  _Item</a:t>
+            </a:r>
+            <a:r>
+              <a:rPr lang="en-US" b="1" dirty="0"/>
+              <a:t>,</a:t>
+            </a:r>
+            <a:endParaRPr lang="en-US" dirty="0"/>
+          </a:p>
+        </p:txBody>
+      </p:sp>
+      <p:sp>
+        <p:nvSpPr>
+          <p:cNvPr id="8" name="Rectangle 7"/>
+          <p:cNvSpPr/>
+          <p:nvPr/>
+        </p:nvSpPr>
+        <p:spPr>
+          <a:xfrm>
+            <a:off x="3970751" y="4972833"/>
+            <a:ext cx="1841326" cy="626301"/>
+          </a:xfrm>
+          <a:prstGeom prst="rect">
+            <a:avLst/>
+          </a:prstGeom>
+        </p:spPr>
+        <p:style>
+          <a:lnRef idx="2">
+            <a:schemeClr val="accent1">
+              <a:shade val="50000"/>
+            </a:schemeClr>
+          </a:lnRef>
+          <a:fillRef idx="1">
+            <a:schemeClr val="accent1"/>
+          </a:fillRef>
+          <a:effectRef idx="0">
+            <a:schemeClr val="accent1"/>
+          </a:effectRef>
+          <a:fontRef idx="minor">
+            <a:schemeClr val="lt1"/>
+          </a:fontRef>
+        </p:style>
+        <p:txBody>
+          <a:bodyPr rtlCol="0" anchor="ctr"/>
+          <a:lstStyle/>
+          <a:p>
+            <a:pPr algn="ctr"/>
+            <a:r>
+              <a:rPr lang="en-US" dirty="0" err="1"/>
+              <a:t>Zsflight_Child</a:t>
+            </a:r>
+            <a:endParaRPr lang="en-US" dirty="0"/>
+          </a:p>
+        </p:txBody>
+      </p:sp>
+      <p:sp>
+        <p:nvSpPr>
+          <p:cNvPr id="9" name="TextBox 8"/>
+          <p:cNvSpPr txBox="1"/>
+          <p:nvPr/>
+        </p:nvSpPr>
+        <p:spPr>
+          <a:xfrm>
+            <a:off x="5987441" y="4972833"/>
+            <a:ext cx="4096011" cy="1200329"/>
+          </a:xfrm>
+          <a:prstGeom prst="rect">
+            <a:avLst/>
+          </a:prstGeom>
+          <a:noFill/>
+        </p:spPr>
+        <p:txBody>
+          <a:bodyPr wrap="square" rtlCol="0">
+            <a:spAutoFit/>
+          </a:bodyPr>
+          <a:lstStyle/>
+          <a:p>
+            <a:r>
+              <a:rPr lang="en-US" b="1" dirty="0"/>
+              <a:t>define view </a:t>
+            </a:r>
+            <a:r>
+              <a:rPr lang="en-US" b="1" dirty="0" err="1"/>
+              <a:t>Zsflight_Child</a:t>
+            </a:r>
+            <a:r>
+              <a:rPr lang="en-US" b="1" dirty="0"/>
+              <a:t> as select from </a:t>
+            </a:r>
+            <a:r>
+              <a:rPr lang="en-US" b="1" dirty="0" err="1"/>
+              <a:t>scounter</a:t>
+            </a:r>
+            <a:r>
+              <a:rPr lang="en-US" b="1" dirty="0"/>
+              <a:t> </a:t>
+            </a:r>
+          </a:p>
+          <a:p>
+            <a:r>
+              <a:rPr lang="en-US" b="1" dirty="0"/>
+              <a:t>association [1..1] to </a:t>
+            </a:r>
+            <a:r>
+              <a:rPr lang="en-US" b="1" dirty="0" err="1"/>
+              <a:t>Zspfli_Root</a:t>
+            </a:r>
+            <a:r>
+              <a:rPr lang="en-US" b="1" dirty="0"/>
+              <a:t> as _root </a:t>
+            </a:r>
+          </a:p>
+          <a:p>
+            <a:r>
+              <a:rPr lang="en-US" b="1" dirty="0"/>
+              <a:t>on $</a:t>
+            </a:r>
+            <a:r>
+              <a:rPr lang="en-US" b="1" dirty="0" err="1"/>
+              <a:t>projection.carrid</a:t>
+            </a:r>
+            <a:r>
+              <a:rPr lang="en-US" b="1" dirty="0"/>
+              <a:t> = _</a:t>
+            </a:r>
+            <a:r>
+              <a:rPr lang="en-US" b="1" dirty="0" err="1"/>
+              <a:t>root.carrid</a:t>
+            </a:r>
+            <a:endParaRPr lang="en-US" dirty="0"/>
+          </a:p>
+        </p:txBody>
+      </p:sp>
+      <p:sp>
+        <p:nvSpPr>
+          <p:cNvPr id="10" name="TextBox 9"/>
+          <p:cNvSpPr txBox="1"/>
+          <p:nvPr/>
+        </p:nvSpPr>
+        <p:spPr>
+          <a:xfrm>
+            <a:off x="3970751" y="5774499"/>
+            <a:ext cx="1841326" cy="646331"/>
+          </a:xfrm>
+          <a:prstGeom prst="rect">
+            <a:avLst/>
+          </a:prstGeom>
+          <a:noFill/>
+        </p:spPr>
+        <p:txBody>
+          <a:bodyPr wrap="square" rtlCol="0">
+            <a:spAutoFit/>
+          </a:bodyPr>
+          <a:lstStyle/>
+          <a:p>
+            <a:r>
+              <a:rPr lang="en-US" dirty="0" smtClean="0"/>
+              <a:t>Annotation defines here</a:t>
+            </a:r>
+            <a:endParaRPr lang="en-US" dirty="0"/>
+          </a:p>
+        </p:txBody>
+      </p:sp>
+    </p:spTree>
+    <p:extLst>
+      <p:ext uri="{BB962C8B-B14F-4D97-AF65-F5344CB8AC3E}">
+        <p14:creationId xmlns:p14="http://schemas.microsoft.com/office/powerpoint/2010/main" val="3179964846"/>
       </p:ext>
     </p:extLst>
   </p:cSld>

</xml_diff>

<commit_message>
add CDS view achitecture
</commit_message>
<xml_diff>
--- a/Jerry.pptx
+++ b/Jerry.pptx
@@ -5,7 +5,7 @@
     <p:sldMasterId id="2147483648" r:id="rId1"/>
   </p:sldMasterIdLst>
   <p:notesMasterIdLst>
-    <p:notesMasterId r:id="rId23"/>
+    <p:notesMasterId r:id="rId25"/>
   </p:notesMasterIdLst>
   <p:sldIdLst>
     <p:sldId id="257" r:id="rId2"/>
@@ -29,6 +29,8 @@
     <p:sldId id="278" r:id="rId20"/>
     <p:sldId id="279" r:id="rId21"/>
     <p:sldId id="280" r:id="rId22"/>
+    <p:sldId id="281" r:id="rId23"/>
+    <p:sldId id="282" r:id="rId24"/>
   </p:sldIdLst>
   <p:sldSz cx="12192000" cy="6858000"/>
   <p:notesSz cx="6858000" cy="9144000"/>
@@ -217,7 +219,7 @@
           <a:p>
             <a:fld id="{C1FFF932-AE32-4CB2-A004-ABC55BBBB993}" type="datetimeFigureOut">
               <a:rPr lang="en-US" smtClean="0"/>
-              <a:t>2016-03-30</a:t>
+              <a:t>2016-03-31</a:t>
             </a:fld>
             <a:endParaRPr lang="en-US"/>
           </a:p>
@@ -2142,7 +2144,7 @@
           <a:p>
             <a:fld id="{32885C6E-53D4-4DF2-B9C6-C242624B2A8A}" type="datetimeFigureOut">
               <a:rPr lang="en-US" smtClean="0"/>
-              <a:t>2016-03-30</a:t>
+              <a:t>2016-03-31</a:t>
             </a:fld>
             <a:endParaRPr lang="en-US"/>
           </a:p>
@@ -2312,7 +2314,7 @@
           <a:p>
             <a:fld id="{32885C6E-53D4-4DF2-B9C6-C242624B2A8A}" type="datetimeFigureOut">
               <a:rPr lang="en-US" smtClean="0"/>
-              <a:t>2016-03-30</a:t>
+              <a:t>2016-03-31</a:t>
             </a:fld>
             <a:endParaRPr lang="en-US"/>
           </a:p>
@@ -2492,7 +2494,7 @@
           <a:p>
             <a:fld id="{32885C6E-53D4-4DF2-B9C6-C242624B2A8A}" type="datetimeFigureOut">
               <a:rPr lang="en-US" smtClean="0"/>
-              <a:t>2016-03-30</a:t>
+              <a:t>2016-03-31</a:t>
             </a:fld>
             <a:endParaRPr lang="en-US"/>
           </a:p>
@@ -2662,7 +2664,7 @@
           <a:p>
             <a:fld id="{32885C6E-53D4-4DF2-B9C6-C242624B2A8A}" type="datetimeFigureOut">
               <a:rPr lang="en-US" smtClean="0"/>
-              <a:t>2016-03-30</a:t>
+              <a:t>2016-03-31</a:t>
             </a:fld>
             <a:endParaRPr lang="en-US"/>
           </a:p>
@@ -2908,7 +2910,7 @@
           <a:p>
             <a:fld id="{32885C6E-53D4-4DF2-B9C6-C242624B2A8A}" type="datetimeFigureOut">
               <a:rPr lang="en-US" smtClean="0"/>
-              <a:t>2016-03-30</a:t>
+              <a:t>2016-03-31</a:t>
             </a:fld>
             <a:endParaRPr lang="en-US"/>
           </a:p>
@@ -3140,7 +3142,7 @@
           <a:p>
             <a:fld id="{32885C6E-53D4-4DF2-B9C6-C242624B2A8A}" type="datetimeFigureOut">
               <a:rPr lang="en-US" smtClean="0"/>
-              <a:t>2016-03-30</a:t>
+              <a:t>2016-03-31</a:t>
             </a:fld>
             <a:endParaRPr lang="en-US"/>
           </a:p>
@@ -3507,7 +3509,7 @@
           <a:p>
             <a:fld id="{32885C6E-53D4-4DF2-B9C6-C242624B2A8A}" type="datetimeFigureOut">
               <a:rPr lang="en-US" smtClean="0"/>
-              <a:t>2016-03-30</a:t>
+              <a:t>2016-03-31</a:t>
             </a:fld>
             <a:endParaRPr lang="en-US"/>
           </a:p>
@@ -3625,7 +3627,7 @@
           <a:p>
             <a:fld id="{32885C6E-53D4-4DF2-B9C6-C242624B2A8A}" type="datetimeFigureOut">
               <a:rPr lang="en-US" smtClean="0"/>
-              <a:t>2016-03-30</a:t>
+              <a:t>2016-03-31</a:t>
             </a:fld>
             <a:endParaRPr lang="en-US"/>
           </a:p>
@@ -3720,7 +3722,7 @@
           <a:p>
             <a:fld id="{32885C6E-53D4-4DF2-B9C6-C242624B2A8A}" type="datetimeFigureOut">
               <a:rPr lang="en-US" smtClean="0"/>
-              <a:t>2016-03-30</a:t>
+              <a:t>2016-03-31</a:t>
             </a:fld>
             <a:endParaRPr lang="en-US"/>
           </a:p>
@@ -3997,7 +3999,7 @@
           <a:p>
             <a:fld id="{32885C6E-53D4-4DF2-B9C6-C242624B2A8A}" type="datetimeFigureOut">
               <a:rPr lang="en-US" smtClean="0"/>
-              <a:t>2016-03-30</a:t>
+              <a:t>2016-03-31</a:t>
             </a:fld>
             <a:endParaRPr lang="en-US"/>
           </a:p>
@@ -4250,7 +4252,7 @@
           <a:p>
             <a:fld id="{32885C6E-53D4-4DF2-B9C6-C242624B2A8A}" type="datetimeFigureOut">
               <a:rPr lang="en-US" smtClean="0"/>
-              <a:t>2016-03-30</a:t>
+              <a:t>2016-03-31</a:t>
             </a:fld>
             <a:endParaRPr lang="en-US"/>
           </a:p>
@@ -4463,7 +4465,7 @@
           <a:p>
             <a:fld id="{32885C6E-53D4-4DF2-B9C6-C242624B2A8A}" type="datetimeFigureOut">
               <a:rPr lang="en-US" smtClean="0"/>
-              <a:t>2016-03-30</a:t>
+              <a:t>2016-03-31</a:t>
             </a:fld>
             <a:endParaRPr lang="en-US"/>
           </a:p>
@@ -10248,6 +10250,2295 @@
     <p:extLst>
       <p:ext uri="{BB962C8B-B14F-4D97-AF65-F5344CB8AC3E}">
         <p14:creationId xmlns:p14="http://schemas.microsoft.com/office/powerpoint/2010/main" val="3179964846"/>
+      </p:ext>
+    </p:extLst>
+  </p:cSld>
+  <p:clrMapOvr>
+    <a:masterClrMapping/>
+  </p:clrMapOvr>
+  <p:timing>
+    <p:tnLst>
+      <p:par>
+        <p:cTn id="1" dur="indefinite" restart="never" nodeType="tmRoot"/>
+      </p:par>
+    </p:tnLst>
+  </p:timing>
+</p:sld>
+</file>
+
+<file path=ppt/slides/slide22.xml><?xml version="1.0" encoding="utf-8"?>
+<p:sld xmlns:a="http://schemas.openxmlformats.org/drawingml/2006/main" xmlns:r="http://schemas.openxmlformats.org/officeDocument/2006/relationships" xmlns:p="http://schemas.openxmlformats.org/presentationml/2006/main">
+  <p:cSld>
+    <p:spTree>
+      <p:nvGrpSpPr>
+        <p:cNvPr id="1" name=""/>
+        <p:cNvGrpSpPr/>
+        <p:nvPr/>
+      </p:nvGrpSpPr>
+      <p:grpSpPr>
+        <a:xfrm>
+          <a:off x="0" y="0"/>
+          <a:ext cx="0" cy="0"/>
+          <a:chOff x="0" y="0"/>
+          <a:chExt cx="0" cy="0"/>
+        </a:xfrm>
+      </p:grpSpPr>
+      <p:sp>
+        <p:nvSpPr>
+          <p:cNvPr id="3" name="Rectangle 2"/>
+          <p:cNvSpPr/>
+          <p:nvPr/>
+        </p:nvSpPr>
+        <p:spPr>
+          <a:xfrm>
+            <a:off x="3439090" y="53932"/>
+            <a:ext cx="2830883" cy="501041"/>
+          </a:xfrm>
+          <a:prstGeom prst="rect">
+            <a:avLst/>
+          </a:prstGeom>
+          <a:solidFill>
+            <a:schemeClr val="accent6"/>
+          </a:solidFill>
+          <a:ln>
+            <a:solidFill>
+              <a:schemeClr val="accent3"/>
+            </a:solidFill>
+          </a:ln>
+        </p:spPr>
+        <p:style>
+          <a:lnRef idx="2">
+            <a:schemeClr val="accent1">
+              <a:shade val="50000"/>
+            </a:schemeClr>
+          </a:lnRef>
+          <a:fillRef idx="1">
+            <a:schemeClr val="accent1"/>
+          </a:fillRef>
+          <a:effectRef idx="0">
+            <a:schemeClr val="accent1"/>
+          </a:effectRef>
+          <a:fontRef idx="minor">
+            <a:schemeClr val="lt1"/>
+          </a:fontRef>
+        </p:style>
+        <p:txBody>
+          <a:bodyPr rtlCol="0" anchor="ctr"/>
+          <a:lstStyle/>
+          <a:p>
+            <a:pPr algn="ctr"/>
+            <a:r>
+              <a:rPr lang="en-US" dirty="0" err="1"/>
+              <a:t>Z_C_Service_Order_View</a:t>
+            </a:r>
+            <a:endParaRPr lang="en-US" dirty="0"/>
+          </a:p>
+        </p:txBody>
+      </p:sp>
+      <p:sp>
+        <p:nvSpPr>
+          <p:cNvPr id="4" name="Rectangle 3"/>
+          <p:cNvSpPr/>
+          <p:nvPr/>
+        </p:nvSpPr>
+        <p:spPr>
+          <a:xfrm>
+            <a:off x="3439090" y="978769"/>
+            <a:ext cx="2830883" cy="501041"/>
+          </a:xfrm>
+          <a:prstGeom prst="rect">
+            <a:avLst/>
+          </a:prstGeom>
+        </p:spPr>
+        <p:style>
+          <a:lnRef idx="2">
+            <a:schemeClr val="accent1">
+              <a:shade val="50000"/>
+            </a:schemeClr>
+          </a:lnRef>
+          <a:fillRef idx="1">
+            <a:schemeClr val="accent1"/>
+          </a:fillRef>
+          <a:effectRef idx="0">
+            <a:schemeClr val="accent1"/>
+          </a:effectRef>
+          <a:fontRef idx="minor">
+            <a:schemeClr val="lt1"/>
+          </a:fontRef>
+        </p:style>
+        <p:txBody>
+          <a:bodyPr rtlCol="0" anchor="ctr"/>
+          <a:lstStyle/>
+          <a:p>
+            <a:pPr algn="ctr"/>
+            <a:r>
+              <a:rPr lang="en-US" dirty="0" err="1"/>
+              <a:t>Z_i_Order_View</a:t>
+            </a:r>
+            <a:endParaRPr lang="en-US" dirty="0"/>
+          </a:p>
+        </p:txBody>
+      </p:sp>
+      <p:sp>
+        <p:nvSpPr>
+          <p:cNvPr id="5" name="Rectangle 4"/>
+          <p:cNvSpPr/>
+          <p:nvPr/>
+        </p:nvSpPr>
+        <p:spPr>
+          <a:xfrm>
+            <a:off x="1173967" y="1801312"/>
+            <a:ext cx="2830883" cy="501041"/>
+          </a:xfrm>
+          <a:prstGeom prst="rect">
+            <a:avLst/>
+          </a:prstGeom>
+        </p:spPr>
+        <p:style>
+          <a:lnRef idx="2">
+            <a:schemeClr val="accent1">
+              <a:shade val="50000"/>
+            </a:schemeClr>
+          </a:lnRef>
+          <a:fillRef idx="1">
+            <a:schemeClr val="accent1"/>
+          </a:fillRef>
+          <a:effectRef idx="0">
+            <a:schemeClr val="accent1"/>
+          </a:effectRef>
+          <a:fontRef idx="minor">
+            <a:schemeClr val="lt1"/>
+          </a:fontRef>
+        </p:style>
+        <p:txBody>
+          <a:bodyPr rtlCol="0" anchor="ctr"/>
+          <a:lstStyle/>
+          <a:p>
+            <a:pPr algn="ctr"/>
+            <a:r>
+              <a:rPr lang="en-US" dirty="0" err="1"/>
+              <a:t>Z_C_Order_Item</a:t>
+            </a:r>
+            <a:endParaRPr lang="en-US" dirty="0"/>
+          </a:p>
+        </p:txBody>
+      </p:sp>
+      <p:sp>
+        <p:nvSpPr>
+          <p:cNvPr id="6" name="Rectangle 5"/>
+          <p:cNvSpPr/>
+          <p:nvPr/>
+        </p:nvSpPr>
+        <p:spPr>
+          <a:xfrm>
+            <a:off x="8209422" y="1801311"/>
+            <a:ext cx="1788352" cy="501041"/>
+          </a:xfrm>
+          <a:prstGeom prst="rect">
+            <a:avLst/>
+          </a:prstGeom>
+        </p:spPr>
+        <p:style>
+          <a:lnRef idx="2">
+            <a:schemeClr val="accent1">
+              <a:shade val="50000"/>
+            </a:schemeClr>
+          </a:lnRef>
+          <a:fillRef idx="1">
+            <a:schemeClr val="accent1"/>
+          </a:fillRef>
+          <a:effectRef idx="0">
+            <a:schemeClr val="accent1"/>
+          </a:effectRef>
+          <a:fontRef idx="minor">
+            <a:schemeClr val="lt1"/>
+          </a:fontRef>
+        </p:style>
+        <p:txBody>
+          <a:bodyPr rtlCol="0" anchor="ctr"/>
+          <a:lstStyle/>
+          <a:p>
+            <a:pPr algn="ctr"/>
+            <a:r>
+              <a:rPr lang="en-US" dirty="0" err="1"/>
+              <a:t>Z_c_partner</a:t>
+            </a:r>
+            <a:endParaRPr lang="en-US" dirty="0"/>
+          </a:p>
+        </p:txBody>
+      </p:sp>
+      <p:sp>
+        <p:nvSpPr>
+          <p:cNvPr id="7" name="Rectangle 6"/>
+          <p:cNvSpPr/>
+          <p:nvPr/>
+        </p:nvSpPr>
+        <p:spPr>
+          <a:xfrm>
+            <a:off x="4691694" y="1801311"/>
+            <a:ext cx="2456493" cy="501041"/>
+          </a:xfrm>
+          <a:prstGeom prst="rect">
+            <a:avLst/>
+          </a:prstGeom>
+        </p:spPr>
+        <p:style>
+          <a:lnRef idx="2">
+            <a:schemeClr val="accent1">
+              <a:shade val="50000"/>
+            </a:schemeClr>
+          </a:lnRef>
+          <a:fillRef idx="1">
+            <a:schemeClr val="accent1"/>
+          </a:fillRef>
+          <a:effectRef idx="0">
+            <a:schemeClr val="accent1"/>
+          </a:effectRef>
+          <a:fontRef idx="minor">
+            <a:schemeClr val="lt1"/>
+          </a:fontRef>
+        </p:style>
+        <p:txBody>
+          <a:bodyPr rtlCol="0" anchor="ctr"/>
+          <a:lstStyle/>
+          <a:p>
+            <a:pPr algn="ctr"/>
+            <a:r>
+              <a:rPr lang="en-US" dirty="0" err="1"/>
+              <a:t>Zorder_Sys_Status</a:t>
+            </a:r>
+            <a:endParaRPr lang="en-US" dirty="0"/>
+          </a:p>
+        </p:txBody>
+      </p:sp>
+      <p:sp>
+        <p:nvSpPr>
+          <p:cNvPr id="8" name="Rectangle 7"/>
+          <p:cNvSpPr/>
+          <p:nvPr/>
+        </p:nvSpPr>
+        <p:spPr>
+          <a:xfrm>
+            <a:off x="4265807" y="2631508"/>
+            <a:ext cx="2004166" cy="501041"/>
+          </a:xfrm>
+          <a:prstGeom prst="rect">
+            <a:avLst/>
+          </a:prstGeom>
+          <a:solidFill>
+            <a:schemeClr val="accent3"/>
+          </a:solidFill>
+        </p:spPr>
+        <p:style>
+          <a:lnRef idx="2">
+            <a:schemeClr val="accent1">
+              <a:shade val="50000"/>
+            </a:schemeClr>
+          </a:lnRef>
+          <a:fillRef idx="1">
+            <a:schemeClr val="accent1"/>
+          </a:fillRef>
+          <a:effectRef idx="0">
+            <a:schemeClr val="accent1"/>
+          </a:effectRef>
+          <a:fontRef idx="minor">
+            <a:schemeClr val="lt1"/>
+          </a:fontRef>
+        </p:style>
+        <p:txBody>
+          <a:bodyPr rtlCol="0" anchor="ctr"/>
+          <a:lstStyle/>
+          <a:p>
+            <a:pPr algn="ctr"/>
+            <a:r>
+              <a:rPr lang="en-US" sz="1400" b="1" dirty="0" smtClean="0"/>
+              <a:t>CRMD_ORDERADM_H</a:t>
+            </a:r>
+            <a:endParaRPr lang="en-US" sz="1400" b="1" dirty="0"/>
+          </a:p>
+        </p:txBody>
+      </p:sp>
+      <p:sp>
+        <p:nvSpPr>
+          <p:cNvPr id="9" name="Rectangle 8"/>
+          <p:cNvSpPr/>
+          <p:nvPr/>
+        </p:nvSpPr>
+        <p:spPr>
+          <a:xfrm>
+            <a:off x="2201708" y="2631509"/>
+            <a:ext cx="1799574" cy="501041"/>
+          </a:xfrm>
+          <a:prstGeom prst="rect">
+            <a:avLst/>
+          </a:prstGeom>
+          <a:solidFill>
+            <a:schemeClr val="accent3"/>
+          </a:solidFill>
+        </p:spPr>
+        <p:style>
+          <a:lnRef idx="2">
+            <a:schemeClr val="accent1">
+              <a:shade val="50000"/>
+            </a:schemeClr>
+          </a:lnRef>
+          <a:fillRef idx="1">
+            <a:schemeClr val="accent1"/>
+          </a:fillRef>
+          <a:effectRef idx="0">
+            <a:schemeClr val="accent1"/>
+          </a:effectRef>
+          <a:fontRef idx="minor">
+            <a:schemeClr val="lt1"/>
+          </a:fontRef>
+        </p:style>
+        <p:txBody>
+          <a:bodyPr rtlCol="0" anchor="ctr"/>
+          <a:lstStyle/>
+          <a:p>
+            <a:pPr algn="ctr"/>
+            <a:r>
+              <a:rPr lang="en-US" sz="1600" dirty="0" smtClean="0"/>
+              <a:t>CRMC_PROC_TYPE</a:t>
+            </a:r>
+            <a:endParaRPr lang="en-US" sz="1600" dirty="0"/>
+          </a:p>
+        </p:txBody>
+      </p:sp>
+      <p:sp>
+        <p:nvSpPr>
+          <p:cNvPr id="10" name="Rectangle 9"/>
+          <p:cNvSpPr/>
+          <p:nvPr/>
+        </p:nvSpPr>
+        <p:spPr>
+          <a:xfrm>
+            <a:off x="111341" y="2640208"/>
+            <a:ext cx="1799574" cy="501041"/>
+          </a:xfrm>
+          <a:prstGeom prst="rect">
+            <a:avLst/>
+          </a:prstGeom>
+        </p:spPr>
+        <p:style>
+          <a:lnRef idx="2">
+            <a:schemeClr val="accent1">
+              <a:shade val="50000"/>
+            </a:schemeClr>
+          </a:lnRef>
+          <a:fillRef idx="1">
+            <a:schemeClr val="accent1"/>
+          </a:fillRef>
+          <a:effectRef idx="0">
+            <a:schemeClr val="accent1"/>
+          </a:effectRef>
+          <a:fontRef idx="minor">
+            <a:schemeClr val="lt1"/>
+          </a:fontRef>
+        </p:style>
+        <p:txBody>
+          <a:bodyPr rtlCol="0" anchor="ctr"/>
+          <a:lstStyle/>
+          <a:p>
+            <a:pPr algn="ctr"/>
+            <a:r>
+              <a:rPr lang="en-US" dirty="0" err="1"/>
+              <a:t>Z_I_Item_Detail</a:t>
+            </a:r>
+            <a:endParaRPr lang="en-US" dirty="0"/>
+          </a:p>
+        </p:txBody>
+      </p:sp>
+      <p:sp>
+        <p:nvSpPr>
+          <p:cNvPr id="11" name="Rectangle 10"/>
+          <p:cNvSpPr/>
+          <p:nvPr/>
+        </p:nvSpPr>
+        <p:spPr>
+          <a:xfrm>
+            <a:off x="111341" y="3665605"/>
+            <a:ext cx="1799574" cy="501041"/>
+          </a:xfrm>
+          <a:prstGeom prst="rect">
+            <a:avLst/>
+          </a:prstGeom>
+          <a:solidFill>
+            <a:schemeClr val="accent3"/>
+          </a:solidFill>
+        </p:spPr>
+        <p:style>
+          <a:lnRef idx="2">
+            <a:schemeClr val="accent1">
+              <a:shade val="50000"/>
+            </a:schemeClr>
+          </a:lnRef>
+          <a:fillRef idx="1">
+            <a:schemeClr val="accent1"/>
+          </a:fillRef>
+          <a:effectRef idx="0">
+            <a:schemeClr val="accent1"/>
+          </a:effectRef>
+          <a:fontRef idx="minor">
+            <a:schemeClr val="lt1"/>
+          </a:fontRef>
+        </p:style>
+        <p:txBody>
+          <a:bodyPr rtlCol="0" anchor="ctr"/>
+          <a:lstStyle/>
+          <a:p>
+            <a:pPr algn="ctr"/>
+            <a:r>
+              <a:rPr lang="en-US" sz="1400" b="1" dirty="0" smtClean="0"/>
+              <a:t>CRMD_ORDERADM_I</a:t>
+            </a:r>
+            <a:endParaRPr lang="en-US" sz="1400" dirty="0"/>
+          </a:p>
+        </p:txBody>
+      </p:sp>
+      <p:sp>
+        <p:nvSpPr>
+          <p:cNvPr id="12" name="Rectangle 11"/>
+          <p:cNvSpPr/>
+          <p:nvPr/>
+        </p:nvSpPr>
+        <p:spPr>
+          <a:xfrm>
+            <a:off x="2201708" y="3676389"/>
+            <a:ext cx="1799574" cy="501041"/>
+          </a:xfrm>
+          <a:prstGeom prst="rect">
+            <a:avLst/>
+          </a:prstGeom>
+          <a:solidFill>
+            <a:schemeClr val="accent3"/>
+          </a:solidFill>
+        </p:spPr>
+        <p:style>
+          <a:lnRef idx="2">
+            <a:schemeClr val="accent1">
+              <a:shade val="50000"/>
+            </a:schemeClr>
+          </a:lnRef>
+          <a:fillRef idx="1">
+            <a:schemeClr val="accent1"/>
+          </a:fillRef>
+          <a:effectRef idx="0">
+            <a:schemeClr val="accent1"/>
+          </a:effectRef>
+          <a:fontRef idx="minor">
+            <a:schemeClr val="lt1"/>
+          </a:fontRef>
+        </p:style>
+        <p:txBody>
+          <a:bodyPr rtlCol="0" anchor="ctr"/>
+          <a:lstStyle/>
+          <a:p>
+            <a:pPr algn="ctr"/>
+            <a:r>
+              <a:rPr lang="en-US" sz="1600" dirty="0" smtClean="0"/>
+              <a:t>CRMD_SCHEDLIN</a:t>
+            </a:r>
+            <a:endParaRPr lang="en-US" sz="1600" dirty="0"/>
+          </a:p>
+        </p:txBody>
+      </p:sp>
+      <p:sp>
+        <p:nvSpPr>
+          <p:cNvPr id="13" name="Rectangle 12"/>
+          <p:cNvSpPr/>
+          <p:nvPr/>
+        </p:nvSpPr>
+        <p:spPr>
+          <a:xfrm>
+            <a:off x="8940103" y="5465524"/>
+            <a:ext cx="1819755" cy="510086"/>
+          </a:xfrm>
+          <a:prstGeom prst="rect">
+            <a:avLst/>
+          </a:prstGeom>
+          <a:solidFill>
+            <a:schemeClr val="accent3"/>
+          </a:solidFill>
+        </p:spPr>
+        <p:style>
+          <a:lnRef idx="2">
+            <a:schemeClr val="accent1">
+              <a:shade val="50000"/>
+            </a:schemeClr>
+          </a:lnRef>
+          <a:fillRef idx="1">
+            <a:schemeClr val="accent1"/>
+          </a:fillRef>
+          <a:effectRef idx="0">
+            <a:schemeClr val="accent1"/>
+          </a:effectRef>
+          <a:fontRef idx="minor">
+            <a:schemeClr val="lt1"/>
+          </a:fontRef>
+        </p:style>
+        <p:txBody>
+          <a:bodyPr rtlCol="0" anchor="ctr"/>
+          <a:lstStyle/>
+          <a:p>
+            <a:pPr algn="ctr"/>
+            <a:r>
+              <a:rPr lang="en-US" sz="1600" dirty="0" smtClean="0"/>
+              <a:t>CRMD_PRODUCT_I</a:t>
+            </a:r>
+            <a:endParaRPr lang="en-US" sz="1600" dirty="0"/>
+          </a:p>
+        </p:txBody>
+      </p:sp>
+      <p:sp>
+        <p:nvSpPr>
+          <p:cNvPr id="14" name="Rectangle 13"/>
+          <p:cNvSpPr/>
+          <p:nvPr/>
+        </p:nvSpPr>
+        <p:spPr>
+          <a:xfrm>
+            <a:off x="4265807" y="3672560"/>
+            <a:ext cx="1799574" cy="501041"/>
+          </a:xfrm>
+          <a:prstGeom prst="rect">
+            <a:avLst/>
+          </a:prstGeom>
+        </p:spPr>
+        <p:style>
+          <a:lnRef idx="2">
+            <a:schemeClr val="accent1">
+              <a:shade val="50000"/>
+            </a:schemeClr>
+          </a:lnRef>
+          <a:fillRef idx="1">
+            <a:schemeClr val="accent1"/>
+          </a:fillRef>
+          <a:effectRef idx="0">
+            <a:schemeClr val="accent1"/>
+          </a:effectRef>
+          <a:fontRef idx="minor">
+            <a:schemeClr val="lt1"/>
+          </a:fontRef>
+        </p:style>
+        <p:txBody>
+          <a:bodyPr rtlCol="0" anchor="ctr"/>
+          <a:lstStyle/>
+          <a:p>
+            <a:pPr algn="ctr"/>
+            <a:r>
+              <a:rPr lang="en-US" dirty="0" err="1"/>
+              <a:t>Z_I_Prod_Status</a:t>
+            </a:r>
+            <a:endParaRPr lang="en-US" dirty="0"/>
+          </a:p>
+        </p:txBody>
+      </p:sp>
+      <p:sp>
+        <p:nvSpPr>
+          <p:cNvPr id="15" name="Rectangle 14"/>
+          <p:cNvSpPr/>
+          <p:nvPr/>
+        </p:nvSpPr>
+        <p:spPr>
+          <a:xfrm>
+            <a:off x="4307561" y="5465524"/>
+            <a:ext cx="1799574" cy="501041"/>
+          </a:xfrm>
+          <a:prstGeom prst="rect">
+            <a:avLst/>
+          </a:prstGeom>
+          <a:solidFill>
+            <a:schemeClr val="accent3"/>
+          </a:solidFill>
+        </p:spPr>
+        <p:style>
+          <a:lnRef idx="2">
+            <a:schemeClr val="accent1">
+              <a:shade val="50000"/>
+            </a:schemeClr>
+          </a:lnRef>
+          <a:fillRef idx="1">
+            <a:schemeClr val="accent1"/>
+          </a:fillRef>
+          <a:effectRef idx="0">
+            <a:schemeClr val="accent1"/>
+          </a:effectRef>
+          <a:fontRef idx="minor">
+            <a:schemeClr val="lt1"/>
+          </a:fontRef>
+        </p:style>
+        <p:txBody>
+          <a:bodyPr rtlCol="0" anchor="ctr"/>
+          <a:lstStyle/>
+          <a:p>
+            <a:pPr algn="ctr"/>
+            <a:r>
+              <a:rPr lang="en-US" dirty="0" smtClean="0"/>
+              <a:t>CRM_JEST</a:t>
+            </a:r>
+            <a:endParaRPr lang="en-US" dirty="0"/>
+          </a:p>
+        </p:txBody>
+      </p:sp>
+      <p:sp>
+        <p:nvSpPr>
+          <p:cNvPr id="16" name="Rectangle 15"/>
+          <p:cNvSpPr/>
+          <p:nvPr/>
+        </p:nvSpPr>
+        <p:spPr>
+          <a:xfrm>
+            <a:off x="6827032" y="5471789"/>
+            <a:ext cx="1799574" cy="501041"/>
+          </a:xfrm>
+          <a:prstGeom prst="rect">
+            <a:avLst/>
+          </a:prstGeom>
+        </p:spPr>
+        <p:style>
+          <a:lnRef idx="2">
+            <a:schemeClr val="accent1">
+              <a:shade val="50000"/>
+            </a:schemeClr>
+          </a:lnRef>
+          <a:fillRef idx="1">
+            <a:schemeClr val="accent1"/>
+          </a:fillRef>
+          <a:effectRef idx="0">
+            <a:schemeClr val="accent1"/>
+          </a:effectRef>
+          <a:fontRef idx="minor">
+            <a:schemeClr val="lt1"/>
+          </a:fontRef>
+        </p:style>
+        <p:txBody>
+          <a:bodyPr rtlCol="0" anchor="ctr"/>
+          <a:lstStyle/>
+          <a:p>
+            <a:pPr algn="ctr"/>
+            <a:r>
+              <a:rPr lang="en-US" dirty="0" err="1"/>
+              <a:t>Z_C_Status_Text</a:t>
+            </a:r>
+            <a:endParaRPr lang="en-US" dirty="0"/>
+          </a:p>
+        </p:txBody>
+      </p:sp>
+      <p:sp>
+        <p:nvSpPr>
+          <p:cNvPr id="17" name="Rectangle 16"/>
+          <p:cNvSpPr/>
+          <p:nvPr/>
+        </p:nvSpPr>
+        <p:spPr>
+          <a:xfrm>
+            <a:off x="6107135" y="6247354"/>
+            <a:ext cx="1041052" cy="501041"/>
+          </a:xfrm>
+          <a:prstGeom prst="rect">
+            <a:avLst/>
+          </a:prstGeom>
+          <a:solidFill>
+            <a:schemeClr val="accent3"/>
+          </a:solidFill>
+        </p:spPr>
+        <p:style>
+          <a:lnRef idx="2">
+            <a:schemeClr val="accent1">
+              <a:shade val="50000"/>
+            </a:schemeClr>
+          </a:lnRef>
+          <a:fillRef idx="1">
+            <a:schemeClr val="accent1"/>
+          </a:fillRef>
+          <a:effectRef idx="0">
+            <a:schemeClr val="accent1"/>
+          </a:effectRef>
+          <a:fontRef idx="minor">
+            <a:schemeClr val="lt1"/>
+          </a:fontRef>
+        </p:style>
+        <p:txBody>
+          <a:bodyPr rtlCol="0" anchor="ctr"/>
+          <a:lstStyle/>
+          <a:p>
+            <a:pPr algn="ctr"/>
+            <a:r>
+              <a:rPr lang="en-US" dirty="0" smtClean="0"/>
+              <a:t>TJ02</a:t>
+            </a:r>
+            <a:endParaRPr lang="en-US" dirty="0"/>
+          </a:p>
+        </p:txBody>
+      </p:sp>
+      <p:sp>
+        <p:nvSpPr>
+          <p:cNvPr id="18" name="Rectangle 17"/>
+          <p:cNvSpPr/>
+          <p:nvPr/>
+        </p:nvSpPr>
+        <p:spPr>
+          <a:xfrm>
+            <a:off x="8209420" y="6247354"/>
+            <a:ext cx="834371" cy="501041"/>
+          </a:xfrm>
+          <a:prstGeom prst="rect">
+            <a:avLst/>
+          </a:prstGeom>
+          <a:solidFill>
+            <a:schemeClr val="accent3"/>
+          </a:solidFill>
+        </p:spPr>
+        <p:style>
+          <a:lnRef idx="2">
+            <a:schemeClr val="accent1">
+              <a:shade val="50000"/>
+            </a:schemeClr>
+          </a:lnRef>
+          <a:fillRef idx="1">
+            <a:schemeClr val="accent1"/>
+          </a:fillRef>
+          <a:effectRef idx="0">
+            <a:schemeClr val="accent1"/>
+          </a:effectRef>
+          <a:fontRef idx="minor">
+            <a:schemeClr val="lt1"/>
+          </a:fontRef>
+        </p:style>
+        <p:txBody>
+          <a:bodyPr rtlCol="0" anchor="ctr"/>
+          <a:lstStyle/>
+          <a:p>
+            <a:pPr algn="ctr"/>
+            <a:r>
+              <a:rPr lang="en-US" dirty="0" smtClean="0"/>
+              <a:t>TJ02T</a:t>
+            </a:r>
+            <a:endParaRPr lang="en-US" dirty="0"/>
+          </a:p>
+        </p:txBody>
+      </p:sp>
+      <p:cxnSp>
+        <p:nvCxnSpPr>
+          <p:cNvPr id="20" name="Elbow Connector 19"/>
+          <p:cNvCxnSpPr>
+            <a:stCxn id="16" idx="2"/>
+            <a:endCxn id="17" idx="0"/>
+          </p:cNvCxnSpPr>
+          <p:nvPr/>
+        </p:nvCxnSpPr>
+        <p:spPr>
+          <a:xfrm rot="5400000">
+            <a:off x="7039978" y="5560513"/>
+            <a:ext cx="274524" cy="1099158"/>
+          </a:xfrm>
+          <a:prstGeom prst="bentConnector3">
+            <a:avLst>
+              <a:gd name="adj1" fmla="val 50000"/>
+            </a:avLst>
+          </a:prstGeom>
+          <a:ln>
+            <a:tailEnd type="triangle"/>
+          </a:ln>
+        </p:spPr>
+        <p:style>
+          <a:lnRef idx="1">
+            <a:schemeClr val="accent1"/>
+          </a:lnRef>
+          <a:fillRef idx="0">
+            <a:schemeClr val="accent1"/>
+          </a:fillRef>
+          <a:effectRef idx="0">
+            <a:schemeClr val="accent1"/>
+          </a:effectRef>
+          <a:fontRef idx="minor">
+            <a:schemeClr val="tx1"/>
+          </a:fontRef>
+        </p:style>
+      </p:cxnSp>
+      <p:cxnSp>
+        <p:nvCxnSpPr>
+          <p:cNvPr id="22" name="Elbow Connector 21"/>
+          <p:cNvCxnSpPr>
+            <a:stCxn id="16" idx="2"/>
+            <a:endCxn id="18" idx="0"/>
+          </p:cNvCxnSpPr>
+          <p:nvPr/>
+        </p:nvCxnSpPr>
+        <p:spPr>
+          <a:xfrm rot="16200000" flipH="1">
+            <a:off x="8039450" y="5660198"/>
+            <a:ext cx="274524" cy="899787"/>
+          </a:xfrm>
+          <a:prstGeom prst="bentConnector3">
+            <a:avLst>
+              <a:gd name="adj1" fmla="val 50000"/>
+            </a:avLst>
+          </a:prstGeom>
+          <a:ln>
+            <a:tailEnd type="triangle"/>
+          </a:ln>
+        </p:spPr>
+        <p:style>
+          <a:lnRef idx="1">
+            <a:schemeClr val="accent1"/>
+          </a:lnRef>
+          <a:fillRef idx="0">
+            <a:schemeClr val="accent1"/>
+          </a:fillRef>
+          <a:effectRef idx="0">
+            <a:schemeClr val="accent1"/>
+          </a:effectRef>
+          <a:fontRef idx="minor">
+            <a:schemeClr val="tx1"/>
+          </a:fontRef>
+        </p:style>
+      </p:cxnSp>
+      <p:cxnSp>
+        <p:nvCxnSpPr>
+          <p:cNvPr id="24" name="Elbow Connector 23"/>
+          <p:cNvCxnSpPr>
+            <a:stCxn id="14" idx="2"/>
+            <a:endCxn id="13" idx="0"/>
+          </p:cNvCxnSpPr>
+          <p:nvPr/>
+        </p:nvCxnSpPr>
+        <p:spPr>
+          <a:xfrm rot="16200000" flipH="1">
+            <a:off x="6861826" y="2477368"/>
+            <a:ext cx="1291923" cy="4684387"/>
+          </a:xfrm>
+          <a:prstGeom prst="bentConnector3">
+            <a:avLst>
+              <a:gd name="adj1" fmla="val 42243"/>
+            </a:avLst>
+          </a:prstGeom>
+          <a:ln>
+            <a:tailEnd type="triangle"/>
+          </a:ln>
+        </p:spPr>
+        <p:style>
+          <a:lnRef idx="1">
+            <a:schemeClr val="accent1"/>
+          </a:lnRef>
+          <a:fillRef idx="0">
+            <a:schemeClr val="accent1"/>
+          </a:fillRef>
+          <a:effectRef idx="0">
+            <a:schemeClr val="accent1"/>
+          </a:effectRef>
+          <a:fontRef idx="minor">
+            <a:schemeClr val="tx1"/>
+          </a:fontRef>
+        </p:style>
+      </p:cxnSp>
+      <p:cxnSp>
+        <p:nvCxnSpPr>
+          <p:cNvPr id="28" name="Elbow Connector 27"/>
+          <p:cNvCxnSpPr>
+            <a:stCxn id="14" idx="2"/>
+          </p:cNvCxnSpPr>
+          <p:nvPr/>
+        </p:nvCxnSpPr>
+        <p:spPr>
+          <a:xfrm rot="5400000">
+            <a:off x="4525721" y="4813474"/>
+            <a:ext cx="1279747" cy="1"/>
+          </a:xfrm>
+          <a:prstGeom prst="bentConnector3">
+            <a:avLst/>
+          </a:prstGeom>
+          <a:ln>
+            <a:tailEnd type="triangle"/>
+          </a:ln>
+        </p:spPr>
+        <p:style>
+          <a:lnRef idx="1">
+            <a:schemeClr val="accent1"/>
+          </a:lnRef>
+          <a:fillRef idx="0">
+            <a:schemeClr val="accent1"/>
+          </a:fillRef>
+          <a:effectRef idx="0">
+            <a:schemeClr val="accent1"/>
+          </a:effectRef>
+          <a:fontRef idx="minor">
+            <a:schemeClr val="tx1"/>
+          </a:fontRef>
+        </p:style>
+      </p:cxnSp>
+      <p:cxnSp>
+        <p:nvCxnSpPr>
+          <p:cNvPr id="30" name="Elbow Connector 29"/>
+          <p:cNvCxnSpPr>
+            <a:stCxn id="14" idx="2"/>
+            <a:endCxn id="16" idx="0"/>
+          </p:cNvCxnSpPr>
+          <p:nvPr/>
+        </p:nvCxnSpPr>
+        <p:spPr>
+          <a:xfrm rot="16200000" flipH="1">
+            <a:off x="5797112" y="3542082"/>
+            <a:ext cx="1298188" cy="2561225"/>
+          </a:xfrm>
+          <a:prstGeom prst="bentConnector3">
+            <a:avLst>
+              <a:gd name="adj1" fmla="val 39386"/>
+            </a:avLst>
+          </a:prstGeom>
+          <a:ln>
+            <a:tailEnd type="triangle"/>
+          </a:ln>
+        </p:spPr>
+        <p:style>
+          <a:lnRef idx="1">
+            <a:schemeClr val="accent1"/>
+          </a:lnRef>
+          <a:fillRef idx="0">
+            <a:schemeClr val="accent1"/>
+          </a:fillRef>
+          <a:effectRef idx="0">
+            <a:schemeClr val="accent1"/>
+          </a:effectRef>
+          <a:fontRef idx="minor">
+            <a:schemeClr val="tx1"/>
+          </a:fontRef>
+        </p:style>
+      </p:cxnSp>
+      <p:cxnSp>
+        <p:nvCxnSpPr>
+          <p:cNvPr id="34" name="Elbow Connector 33"/>
+          <p:cNvCxnSpPr>
+            <a:stCxn id="5" idx="2"/>
+            <a:endCxn id="10" idx="0"/>
+          </p:cNvCxnSpPr>
+          <p:nvPr/>
+        </p:nvCxnSpPr>
+        <p:spPr>
+          <a:xfrm rot="5400000">
+            <a:off x="1631342" y="1682140"/>
+            <a:ext cx="337855" cy="1578281"/>
+          </a:xfrm>
+          <a:prstGeom prst="bentConnector3">
+            <a:avLst/>
+          </a:prstGeom>
+          <a:ln>
+            <a:tailEnd type="triangle"/>
+          </a:ln>
+        </p:spPr>
+        <p:style>
+          <a:lnRef idx="1">
+            <a:schemeClr val="accent1"/>
+          </a:lnRef>
+          <a:fillRef idx="0">
+            <a:schemeClr val="accent1"/>
+          </a:fillRef>
+          <a:effectRef idx="0">
+            <a:schemeClr val="accent1"/>
+          </a:effectRef>
+          <a:fontRef idx="minor">
+            <a:schemeClr val="tx1"/>
+          </a:fontRef>
+        </p:style>
+      </p:cxnSp>
+      <p:cxnSp>
+        <p:nvCxnSpPr>
+          <p:cNvPr id="36" name="Elbow Connector 35"/>
+          <p:cNvCxnSpPr>
+            <a:stCxn id="5" idx="2"/>
+            <a:endCxn id="9" idx="0"/>
+          </p:cNvCxnSpPr>
+          <p:nvPr/>
+        </p:nvCxnSpPr>
+        <p:spPr>
+          <a:xfrm rot="16200000" flipH="1">
+            <a:off x="2680874" y="2210888"/>
+            <a:ext cx="329156" cy="512086"/>
+          </a:xfrm>
+          <a:prstGeom prst="bentConnector3">
+            <a:avLst/>
+          </a:prstGeom>
+          <a:ln>
+            <a:tailEnd type="triangle"/>
+          </a:ln>
+        </p:spPr>
+        <p:style>
+          <a:lnRef idx="1">
+            <a:schemeClr val="accent1"/>
+          </a:lnRef>
+          <a:fillRef idx="0">
+            <a:schemeClr val="accent1"/>
+          </a:fillRef>
+          <a:effectRef idx="0">
+            <a:schemeClr val="accent1"/>
+          </a:effectRef>
+          <a:fontRef idx="minor">
+            <a:schemeClr val="tx1"/>
+          </a:fontRef>
+        </p:style>
+      </p:cxnSp>
+      <p:cxnSp>
+        <p:nvCxnSpPr>
+          <p:cNvPr id="38" name="Elbow Connector 37"/>
+          <p:cNvCxnSpPr>
+            <a:stCxn id="5" idx="2"/>
+            <a:endCxn id="8" idx="0"/>
+          </p:cNvCxnSpPr>
+          <p:nvPr/>
+        </p:nvCxnSpPr>
+        <p:spPr>
+          <a:xfrm rot="16200000" flipH="1">
+            <a:off x="3764072" y="1127689"/>
+            <a:ext cx="329155" cy="2678481"/>
+          </a:xfrm>
+          <a:prstGeom prst="bentConnector3">
+            <a:avLst/>
+          </a:prstGeom>
+          <a:ln>
+            <a:tailEnd type="triangle"/>
+          </a:ln>
+        </p:spPr>
+        <p:style>
+          <a:lnRef idx="1">
+            <a:schemeClr val="accent1"/>
+          </a:lnRef>
+          <a:fillRef idx="0">
+            <a:schemeClr val="accent1"/>
+          </a:fillRef>
+          <a:effectRef idx="0">
+            <a:schemeClr val="accent1"/>
+          </a:effectRef>
+          <a:fontRef idx="minor">
+            <a:schemeClr val="tx1"/>
+          </a:fontRef>
+        </p:style>
+      </p:cxnSp>
+      <p:cxnSp>
+        <p:nvCxnSpPr>
+          <p:cNvPr id="43" name="Straight Arrow Connector 42"/>
+          <p:cNvCxnSpPr>
+            <a:stCxn id="10" idx="2"/>
+            <a:endCxn id="11" idx="0"/>
+          </p:cNvCxnSpPr>
+          <p:nvPr/>
+        </p:nvCxnSpPr>
+        <p:spPr>
+          <a:xfrm>
+            <a:off x="1011128" y="3141249"/>
+            <a:ext cx="0" cy="524356"/>
+          </a:xfrm>
+          <a:prstGeom prst="straightConnector1">
+            <a:avLst/>
+          </a:prstGeom>
+          <a:ln>
+            <a:tailEnd type="triangle"/>
+          </a:ln>
+        </p:spPr>
+        <p:style>
+          <a:lnRef idx="1">
+            <a:schemeClr val="accent1"/>
+          </a:lnRef>
+          <a:fillRef idx="0">
+            <a:schemeClr val="accent1"/>
+          </a:fillRef>
+          <a:effectRef idx="0">
+            <a:schemeClr val="accent1"/>
+          </a:effectRef>
+          <a:fontRef idx="minor">
+            <a:schemeClr val="tx1"/>
+          </a:fontRef>
+        </p:style>
+      </p:cxnSp>
+      <p:cxnSp>
+        <p:nvCxnSpPr>
+          <p:cNvPr id="45" name="Elbow Connector 44"/>
+          <p:cNvCxnSpPr>
+            <a:stCxn id="10" idx="2"/>
+            <a:endCxn id="12" idx="0"/>
+          </p:cNvCxnSpPr>
+          <p:nvPr/>
+        </p:nvCxnSpPr>
+        <p:spPr>
+          <a:xfrm rot="16200000" flipH="1">
+            <a:off x="1788741" y="2363635"/>
+            <a:ext cx="535140" cy="2090367"/>
+          </a:xfrm>
+          <a:prstGeom prst="bentConnector3">
+            <a:avLst/>
+          </a:prstGeom>
+          <a:ln>
+            <a:tailEnd type="triangle"/>
+          </a:ln>
+        </p:spPr>
+        <p:style>
+          <a:lnRef idx="1">
+            <a:schemeClr val="accent1"/>
+          </a:lnRef>
+          <a:fillRef idx="0">
+            <a:schemeClr val="accent1"/>
+          </a:fillRef>
+          <a:effectRef idx="0">
+            <a:schemeClr val="accent1"/>
+          </a:effectRef>
+          <a:fontRef idx="minor">
+            <a:schemeClr val="tx1"/>
+          </a:fontRef>
+        </p:style>
+      </p:cxnSp>
+      <p:cxnSp>
+        <p:nvCxnSpPr>
+          <p:cNvPr id="53" name="Elbow Connector 52"/>
+          <p:cNvCxnSpPr>
+            <a:stCxn id="10" idx="2"/>
+            <a:endCxn id="14" idx="0"/>
+          </p:cNvCxnSpPr>
+          <p:nvPr/>
+        </p:nvCxnSpPr>
+        <p:spPr>
+          <a:xfrm rot="16200000" flipH="1">
+            <a:off x="2822706" y="1329671"/>
+            <a:ext cx="531311" cy="4154466"/>
+          </a:xfrm>
+          <a:prstGeom prst="bentConnector3">
+            <a:avLst/>
+          </a:prstGeom>
+          <a:ln>
+            <a:tailEnd type="triangle"/>
+          </a:ln>
+        </p:spPr>
+        <p:style>
+          <a:lnRef idx="1">
+            <a:schemeClr val="accent1"/>
+          </a:lnRef>
+          <a:fillRef idx="0">
+            <a:schemeClr val="accent1"/>
+          </a:fillRef>
+          <a:effectRef idx="0">
+            <a:schemeClr val="accent1"/>
+          </a:effectRef>
+          <a:fontRef idx="minor">
+            <a:schemeClr val="tx1"/>
+          </a:fontRef>
+        </p:style>
+      </p:cxnSp>
+      <p:cxnSp>
+        <p:nvCxnSpPr>
+          <p:cNvPr id="57" name="Elbow Connector 56"/>
+          <p:cNvCxnSpPr>
+            <a:stCxn id="10" idx="2"/>
+            <a:endCxn id="13" idx="0"/>
+          </p:cNvCxnSpPr>
+          <p:nvPr/>
+        </p:nvCxnSpPr>
+        <p:spPr>
+          <a:xfrm rot="16200000" flipH="1">
+            <a:off x="4268417" y="-116041"/>
+            <a:ext cx="2324275" cy="8838853"/>
+          </a:xfrm>
+          <a:prstGeom prst="bentConnector3">
+            <a:avLst>
+              <a:gd name="adj1" fmla="val 66707"/>
+            </a:avLst>
+          </a:prstGeom>
+          <a:ln>
+            <a:tailEnd type="triangle"/>
+          </a:ln>
+        </p:spPr>
+        <p:style>
+          <a:lnRef idx="1">
+            <a:schemeClr val="accent1"/>
+          </a:lnRef>
+          <a:fillRef idx="0">
+            <a:schemeClr val="accent1"/>
+          </a:fillRef>
+          <a:effectRef idx="0">
+            <a:schemeClr val="accent1"/>
+          </a:effectRef>
+          <a:fontRef idx="minor">
+            <a:schemeClr val="tx1"/>
+          </a:fontRef>
+        </p:style>
+      </p:cxnSp>
+      <p:cxnSp>
+        <p:nvCxnSpPr>
+          <p:cNvPr id="60" name="Elbow Connector 59"/>
+          <p:cNvCxnSpPr>
+            <a:stCxn id="7" idx="2"/>
+            <a:endCxn id="8" idx="0"/>
+          </p:cNvCxnSpPr>
+          <p:nvPr/>
+        </p:nvCxnSpPr>
+        <p:spPr>
+          <a:xfrm rot="5400000">
+            <a:off x="5429338" y="2140905"/>
+            <a:ext cx="329156" cy="652051"/>
+          </a:xfrm>
+          <a:prstGeom prst="bentConnector3">
+            <a:avLst>
+              <a:gd name="adj1" fmla="val 50000"/>
+            </a:avLst>
+          </a:prstGeom>
+          <a:ln>
+            <a:tailEnd type="triangle"/>
+          </a:ln>
+        </p:spPr>
+        <p:style>
+          <a:lnRef idx="1">
+            <a:schemeClr val="accent1"/>
+          </a:lnRef>
+          <a:fillRef idx="0">
+            <a:schemeClr val="accent1"/>
+          </a:fillRef>
+          <a:effectRef idx="0">
+            <a:schemeClr val="accent1"/>
+          </a:effectRef>
+          <a:fontRef idx="minor">
+            <a:schemeClr val="tx1"/>
+          </a:fontRef>
+        </p:style>
+      </p:cxnSp>
+      <p:cxnSp>
+        <p:nvCxnSpPr>
+          <p:cNvPr id="83" name="Elbow Connector 82"/>
+          <p:cNvCxnSpPr>
+            <a:stCxn id="4" idx="2"/>
+            <a:endCxn id="5" idx="0"/>
+          </p:cNvCxnSpPr>
+          <p:nvPr/>
+        </p:nvCxnSpPr>
+        <p:spPr>
+          <a:xfrm rot="5400000">
+            <a:off x="3561220" y="508000"/>
+            <a:ext cx="321502" cy="2265123"/>
+          </a:xfrm>
+          <a:prstGeom prst="bentConnector3">
+            <a:avLst/>
+          </a:prstGeom>
+          <a:ln>
+            <a:tailEnd type="triangle"/>
+          </a:ln>
+        </p:spPr>
+        <p:style>
+          <a:lnRef idx="1">
+            <a:schemeClr val="accent1"/>
+          </a:lnRef>
+          <a:fillRef idx="0">
+            <a:schemeClr val="accent1"/>
+          </a:fillRef>
+          <a:effectRef idx="0">
+            <a:schemeClr val="accent1"/>
+          </a:effectRef>
+          <a:fontRef idx="minor">
+            <a:schemeClr val="tx1"/>
+          </a:fontRef>
+        </p:style>
+      </p:cxnSp>
+      <p:cxnSp>
+        <p:nvCxnSpPr>
+          <p:cNvPr id="85" name="Elbow Connector 84"/>
+          <p:cNvCxnSpPr>
+            <a:stCxn id="4" idx="2"/>
+            <a:endCxn id="7" idx="0"/>
+          </p:cNvCxnSpPr>
+          <p:nvPr/>
+        </p:nvCxnSpPr>
+        <p:spPr>
+          <a:xfrm rot="16200000" flipH="1">
+            <a:off x="5226486" y="1107855"/>
+            <a:ext cx="321501" cy="1065409"/>
+          </a:xfrm>
+          <a:prstGeom prst="bentConnector3">
+            <a:avLst/>
+          </a:prstGeom>
+          <a:ln>
+            <a:tailEnd type="triangle"/>
+          </a:ln>
+        </p:spPr>
+        <p:style>
+          <a:lnRef idx="1">
+            <a:schemeClr val="accent1"/>
+          </a:lnRef>
+          <a:fillRef idx="0">
+            <a:schemeClr val="accent1"/>
+          </a:fillRef>
+          <a:effectRef idx="0">
+            <a:schemeClr val="accent1"/>
+          </a:effectRef>
+          <a:fontRef idx="minor">
+            <a:schemeClr val="tx1"/>
+          </a:fontRef>
+        </p:style>
+      </p:cxnSp>
+      <p:cxnSp>
+        <p:nvCxnSpPr>
+          <p:cNvPr id="87" name="Elbow Connector 86"/>
+          <p:cNvCxnSpPr>
+            <a:stCxn id="4" idx="2"/>
+            <a:endCxn id="6" idx="0"/>
+          </p:cNvCxnSpPr>
+          <p:nvPr/>
+        </p:nvCxnSpPr>
+        <p:spPr>
+          <a:xfrm rot="16200000" flipH="1">
+            <a:off x="6818315" y="-483973"/>
+            <a:ext cx="321501" cy="4249066"/>
+          </a:xfrm>
+          <a:prstGeom prst="bentConnector3">
+            <a:avLst/>
+          </a:prstGeom>
+          <a:ln>
+            <a:tailEnd type="triangle"/>
+          </a:ln>
+        </p:spPr>
+        <p:style>
+          <a:lnRef idx="1">
+            <a:schemeClr val="accent1"/>
+          </a:lnRef>
+          <a:fillRef idx="0">
+            <a:schemeClr val="accent1"/>
+          </a:fillRef>
+          <a:effectRef idx="0">
+            <a:schemeClr val="accent1"/>
+          </a:effectRef>
+          <a:fontRef idx="minor">
+            <a:schemeClr val="tx1"/>
+          </a:fontRef>
+        </p:style>
+      </p:cxnSp>
+      <p:cxnSp>
+        <p:nvCxnSpPr>
+          <p:cNvPr id="89" name="Straight Arrow Connector 88"/>
+          <p:cNvCxnSpPr>
+            <a:stCxn id="3" idx="2"/>
+            <a:endCxn id="4" idx="0"/>
+          </p:cNvCxnSpPr>
+          <p:nvPr/>
+        </p:nvCxnSpPr>
+        <p:spPr>
+          <a:xfrm>
+            <a:off x="4854532" y="554973"/>
+            <a:ext cx="0" cy="423796"/>
+          </a:xfrm>
+          <a:prstGeom prst="straightConnector1">
+            <a:avLst/>
+          </a:prstGeom>
+          <a:ln>
+            <a:tailEnd type="triangle"/>
+          </a:ln>
+        </p:spPr>
+        <p:style>
+          <a:lnRef idx="1">
+            <a:schemeClr val="accent1"/>
+          </a:lnRef>
+          <a:fillRef idx="0">
+            <a:schemeClr val="accent1"/>
+          </a:fillRef>
+          <a:effectRef idx="0">
+            <a:schemeClr val="accent1"/>
+          </a:effectRef>
+          <a:fontRef idx="minor">
+            <a:schemeClr val="tx1"/>
+          </a:fontRef>
+        </p:style>
+      </p:cxnSp>
+      <p:cxnSp>
+        <p:nvCxnSpPr>
+          <p:cNvPr id="91" name="Elbow Connector 90"/>
+          <p:cNvCxnSpPr>
+            <a:endCxn id="16" idx="0"/>
+          </p:cNvCxnSpPr>
+          <p:nvPr/>
+        </p:nvCxnSpPr>
+        <p:spPr>
+          <a:xfrm rot="16200000" flipH="1">
+            <a:off x="5494794" y="3239763"/>
+            <a:ext cx="3169437" cy="1294614"/>
+          </a:xfrm>
+          <a:prstGeom prst="bentConnector3">
+            <a:avLst>
+              <a:gd name="adj1" fmla="val 75689"/>
+            </a:avLst>
+          </a:prstGeom>
+          <a:ln w="38100">
+            <a:solidFill>
+              <a:srgbClr val="FF0000"/>
+            </a:solidFill>
+            <a:tailEnd type="triangle"/>
+          </a:ln>
+        </p:spPr>
+        <p:style>
+          <a:lnRef idx="1">
+            <a:schemeClr val="accent1"/>
+          </a:lnRef>
+          <a:fillRef idx="0">
+            <a:schemeClr val="accent1"/>
+          </a:fillRef>
+          <a:effectRef idx="0">
+            <a:schemeClr val="accent1"/>
+          </a:effectRef>
+          <a:fontRef idx="minor">
+            <a:schemeClr val="tx1"/>
+          </a:fontRef>
+        </p:style>
+      </p:cxnSp>
+      <p:cxnSp>
+        <p:nvCxnSpPr>
+          <p:cNvPr id="97" name="Elbow Connector 96"/>
+          <p:cNvCxnSpPr/>
+          <p:nvPr/>
+        </p:nvCxnSpPr>
+        <p:spPr>
+          <a:xfrm rot="5400000">
+            <a:off x="4226098" y="3226061"/>
+            <a:ext cx="3150997" cy="1303576"/>
+          </a:xfrm>
+          <a:prstGeom prst="bentConnector3">
+            <a:avLst>
+              <a:gd name="adj1" fmla="val 75839"/>
+            </a:avLst>
+          </a:prstGeom>
+          <a:ln w="38100">
+            <a:solidFill>
+              <a:srgbClr val="FF0000"/>
+            </a:solidFill>
+            <a:tailEnd type="triangle"/>
+          </a:ln>
+        </p:spPr>
+        <p:style>
+          <a:lnRef idx="1">
+            <a:schemeClr val="accent1"/>
+          </a:lnRef>
+          <a:fillRef idx="0">
+            <a:schemeClr val="accent1"/>
+          </a:fillRef>
+          <a:effectRef idx="0">
+            <a:schemeClr val="accent1"/>
+          </a:effectRef>
+          <a:fontRef idx="minor">
+            <a:schemeClr val="tx1"/>
+          </a:fontRef>
+        </p:style>
+      </p:cxnSp>
+      <p:sp>
+        <p:nvSpPr>
+          <p:cNvPr id="99" name="Rectangle 98"/>
+          <p:cNvSpPr/>
+          <p:nvPr/>
+        </p:nvSpPr>
+        <p:spPr>
+          <a:xfrm>
+            <a:off x="7200117" y="2865846"/>
+            <a:ext cx="1437059" cy="501041"/>
+          </a:xfrm>
+          <a:prstGeom prst="rect">
+            <a:avLst/>
+          </a:prstGeom>
+          <a:solidFill>
+            <a:schemeClr val="accent3"/>
+          </a:solidFill>
+        </p:spPr>
+        <p:style>
+          <a:lnRef idx="2">
+            <a:schemeClr val="accent1">
+              <a:shade val="50000"/>
+            </a:schemeClr>
+          </a:lnRef>
+          <a:fillRef idx="1">
+            <a:schemeClr val="accent1"/>
+          </a:fillRef>
+          <a:effectRef idx="0">
+            <a:schemeClr val="accent1"/>
+          </a:effectRef>
+          <a:fontRef idx="minor">
+            <a:schemeClr val="lt1"/>
+          </a:fontRef>
+        </p:style>
+        <p:txBody>
+          <a:bodyPr rtlCol="0" anchor="ctr"/>
+          <a:lstStyle/>
+          <a:p>
+            <a:pPr algn="ctr"/>
+            <a:r>
+              <a:rPr lang="en-US" dirty="0" smtClean="0"/>
+              <a:t>CRMD_LINK</a:t>
+            </a:r>
+            <a:endParaRPr lang="en-US" dirty="0"/>
+          </a:p>
+        </p:txBody>
+      </p:sp>
+      <p:sp>
+        <p:nvSpPr>
+          <p:cNvPr id="100" name="Rectangle 99"/>
+          <p:cNvSpPr/>
+          <p:nvPr/>
+        </p:nvSpPr>
+        <p:spPr>
+          <a:xfrm>
+            <a:off x="9819975" y="2858543"/>
+            <a:ext cx="1437059" cy="501041"/>
+          </a:xfrm>
+          <a:prstGeom prst="rect">
+            <a:avLst/>
+          </a:prstGeom>
+          <a:solidFill>
+            <a:srgbClr val="FF0000"/>
+          </a:solidFill>
+        </p:spPr>
+        <p:style>
+          <a:lnRef idx="2">
+            <a:schemeClr val="accent1">
+              <a:shade val="50000"/>
+            </a:schemeClr>
+          </a:lnRef>
+          <a:fillRef idx="1">
+            <a:schemeClr val="accent1"/>
+          </a:fillRef>
+          <a:effectRef idx="0">
+            <a:schemeClr val="accent1"/>
+          </a:effectRef>
+          <a:fontRef idx="minor">
+            <a:schemeClr val="lt1"/>
+          </a:fontRef>
+        </p:style>
+        <p:txBody>
+          <a:bodyPr rtlCol="0" anchor="ctr"/>
+          <a:lstStyle/>
+          <a:p>
+            <a:pPr algn="ctr"/>
+            <a:r>
+              <a:rPr lang="en-US" dirty="0" err="1"/>
+              <a:t>ztf_bp_detail</a:t>
+            </a:r>
+            <a:endParaRPr lang="en-US" dirty="0"/>
+          </a:p>
+        </p:txBody>
+      </p:sp>
+      <p:cxnSp>
+        <p:nvCxnSpPr>
+          <p:cNvPr id="102" name="Elbow Connector 101"/>
+          <p:cNvCxnSpPr>
+            <a:stCxn id="6" idx="2"/>
+            <a:endCxn id="99" idx="0"/>
+          </p:cNvCxnSpPr>
+          <p:nvPr/>
+        </p:nvCxnSpPr>
+        <p:spPr>
+          <a:xfrm rot="5400000">
+            <a:off x="8229376" y="1991624"/>
+            <a:ext cx="563494" cy="1184951"/>
+          </a:xfrm>
+          <a:prstGeom prst="bentConnector3">
+            <a:avLst>
+              <a:gd name="adj1" fmla="val 29993"/>
+            </a:avLst>
+          </a:prstGeom>
+          <a:ln>
+            <a:tailEnd type="triangle"/>
+          </a:ln>
+        </p:spPr>
+        <p:style>
+          <a:lnRef idx="1">
+            <a:schemeClr val="accent1"/>
+          </a:lnRef>
+          <a:fillRef idx="0">
+            <a:schemeClr val="accent1"/>
+          </a:fillRef>
+          <a:effectRef idx="0">
+            <a:schemeClr val="accent1"/>
+          </a:effectRef>
+          <a:fontRef idx="minor">
+            <a:schemeClr val="tx1"/>
+          </a:fontRef>
+        </p:style>
+      </p:cxnSp>
+      <p:cxnSp>
+        <p:nvCxnSpPr>
+          <p:cNvPr id="104" name="Elbow Connector 103"/>
+          <p:cNvCxnSpPr>
+            <a:stCxn id="6" idx="2"/>
+            <a:endCxn id="100" idx="0"/>
+          </p:cNvCxnSpPr>
+          <p:nvPr/>
+        </p:nvCxnSpPr>
+        <p:spPr>
+          <a:xfrm rot="16200000" flipH="1">
+            <a:off x="9542956" y="1862993"/>
+            <a:ext cx="556191" cy="1434907"/>
+          </a:xfrm>
+          <a:prstGeom prst="bentConnector3">
+            <a:avLst>
+              <a:gd name="adj1" fmla="val 29731"/>
+            </a:avLst>
+          </a:prstGeom>
+          <a:ln>
+            <a:tailEnd type="triangle"/>
+          </a:ln>
+        </p:spPr>
+        <p:style>
+          <a:lnRef idx="1">
+            <a:schemeClr val="accent1"/>
+          </a:lnRef>
+          <a:fillRef idx="0">
+            <a:schemeClr val="accent1"/>
+          </a:fillRef>
+          <a:effectRef idx="0">
+            <a:schemeClr val="accent1"/>
+          </a:effectRef>
+          <a:fontRef idx="minor">
+            <a:schemeClr val="tx1"/>
+          </a:fontRef>
+        </p:style>
+      </p:cxnSp>
+      <p:cxnSp>
+        <p:nvCxnSpPr>
+          <p:cNvPr id="106" name="Elbow Connector 105"/>
+          <p:cNvCxnSpPr>
+            <a:stCxn id="6" idx="2"/>
+            <a:endCxn id="8" idx="0"/>
+          </p:cNvCxnSpPr>
+          <p:nvPr/>
+        </p:nvCxnSpPr>
+        <p:spPr>
+          <a:xfrm rot="5400000">
+            <a:off x="7021166" y="549076"/>
+            <a:ext cx="329156" cy="3835708"/>
+          </a:xfrm>
+          <a:prstGeom prst="bentConnector3">
+            <a:avLst>
+              <a:gd name="adj1" fmla="val 50000"/>
+            </a:avLst>
+          </a:prstGeom>
+          <a:ln>
+            <a:tailEnd type="triangle"/>
+          </a:ln>
+        </p:spPr>
+        <p:style>
+          <a:lnRef idx="1">
+            <a:schemeClr val="accent1"/>
+          </a:lnRef>
+          <a:fillRef idx="0">
+            <a:schemeClr val="accent1"/>
+          </a:fillRef>
+          <a:effectRef idx="0">
+            <a:schemeClr val="accent1"/>
+          </a:effectRef>
+          <a:fontRef idx="minor">
+            <a:schemeClr val="tx1"/>
+          </a:fontRef>
+        </p:style>
+      </p:cxnSp>
+      <p:sp>
+        <p:nvSpPr>
+          <p:cNvPr id="122" name="Rectangle 121"/>
+          <p:cNvSpPr/>
+          <p:nvPr/>
+        </p:nvSpPr>
+        <p:spPr>
+          <a:xfrm>
+            <a:off x="9318868" y="3813738"/>
+            <a:ext cx="2442575" cy="598815"/>
+          </a:xfrm>
+          <a:prstGeom prst="rect">
+            <a:avLst/>
+          </a:prstGeom>
+          <a:solidFill>
+            <a:srgbClr val="7030A0"/>
+          </a:solidFill>
+        </p:spPr>
+        <p:style>
+          <a:lnRef idx="2">
+            <a:schemeClr val="accent1">
+              <a:shade val="50000"/>
+            </a:schemeClr>
+          </a:lnRef>
+          <a:fillRef idx="1">
+            <a:schemeClr val="accent1"/>
+          </a:fillRef>
+          <a:effectRef idx="0">
+            <a:schemeClr val="accent1"/>
+          </a:effectRef>
+          <a:fontRef idx="minor">
+            <a:schemeClr val="lt1"/>
+          </a:fontRef>
+        </p:style>
+        <p:txBody>
+          <a:bodyPr rtlCol="0" anchor="ctr"/>
+          <a:lstStyle/>
+          <a:p>
+            <a:pPr algn="ctr"/>
+            <a:r>
+              <a:rPr lang="en-US" sz="2000" b="1" dirty="0" err="1"/>
+              <a:t>zcl_amdp_bp_detail</a:t>
+            </a:r>
+            <a:endParaRPr lang="en-US" sz="2000" b="1" dirty="0"/>
+          </a:p>
+        </p:txBody>
+      </p:sp>
+      <p:cxnSp>
+        <p:nvCxnSpPr>
+          <p:cNvPr id="124" name="Straight Arrow Connector 123"/>
+          <p:cNvCxnSpPr>
+            <a:stCxn id="100" idx="2"/>
+            <a:endCxn id="122" idx="0"/>
+          </p:cNvCxnSpPr>
+          <p:nvPr/>
+        </p:nvCxnSpPr>
+        <p:spPr>
+          <a:xfrm>
+            <a:off x="10538505" y="3359584"/>
+            <a:ext cx="1651" cy="454154"/>
+          </a:xfrm>
+          <a:prstGeom prst="straightConnector1">
+            <a:avLst/>
+          </a:prstGeom>
+          <a:ln>
+            <a:tailEnd type="triangle"/>
+          </a:ln>
+        </p:spPr>
+        <p:style>
+          <a:lnRef idx="1">
+            <a:schemeClr val="accent1"/>
+          </a:lnRef>
+          <a:fillRef idx="0">
+            <a:schemeClr val="accent1"/>
+          </a:fillRef>
+          <a:effectRef idx="0">
+            <a:schemeClr val="accent1"/>
+          </a:effectRef>
+          <a:fontRef idx="minor">
+            <a:schemeClr val="tx1"/>
+          </a:fontRef>
+        </p:style>
+      </p:cxnSp>
+      <p:sp>
+        <p:nvSpPr>
+          <p:cNvPr id="134" name="Rectangle 133"/>
+          <p:cNvSpPr/>
+          <p:nvPr/>
+        </p:nvSpPr>
+        <p:spPr>
+          <a:xfrm>
+            <a:off x="191370" y="4992689"/>
+            <a:ext cx="2347934" cy="336440"/>
+          </a:xfrm>
+          <a:prstGeom prst="rect">
+            <a:avLst/>
+          </a:prstGeom>
+        </p:spPr>
+        <p:style>
+          <a:lnRef idx="2">
+            <a:schemeClr val="accent1">
+              <a:shade val="50000"/>
+            </a:schemeClr>
+          </a:lnRef>
+          <a:fillRef idx="1">
+            <a:schemeClr val="accent1"/>
+          </a:fillRef>
+          <a:effectRef idx="0">
+            <a:schemeClr val="accent1"/>
+          </a:effectRef>
+          <a:fontRef idx="minor">
+            <a:schemeClr val="lt1"/>
+          </a:fontRef>
+        </p:style>
+        <p:txBody>
+          <a:bodyPr rtlCol="0" anchor="ctr"/>
+          <a:lstStyle/>
+          <a:p>
+            <a:pPr algn="ctr"/>
+            <a:r>
+              <a:rPr lang="en-US" dirty="0" smtClean="0"/>
+              <a:t>CDS view</a:t>
+            </a:r>
+            <a:endParaRPr lang="en-US" dirty="0"/>
+          </a:p>
+        </p:txBody>
+      </p:sp>
+      <p:sp>
+        <p:nvSpPr>
+          <p:cNvPr id="135" name="Rectangle 134"/>
+          <p:cNvSpPr/>
+          <p:nvPr/>
+        </p:nvSpPr>
+        <p:spPr>
+          <a:xfrm>
+            <a:off x="191370" y="5356291"/>
+            <a:ext cx="2347935" cy="336441"/>
+          </a:xfrm>
+          <a:prstGeom prst="rect">
+            <a:avLst/>
+          </a:prstGeom>
+          <a:solidFill>
+            <a:schemeClr val="accent6"/>
+          </a:solidFill>
+        </p:spPr>
+        <p:style>
+          <a:lnRef idx="2">
+            <a:schemeClr val="accent1">
+              <a:shade val="50000"/>
+            </a:schemeClr>
+          </a:lnRef>
+          <a:fillRef idx="1">
+            <a:schemeClr val="accent1"/>
+          </a:fillRef>
+          <a:effectRef idx="0">
+            <a:schemeClr val="accent1"/>
+          </a:effectRef>
+          <a:fontRef idx="minor">
+            <a:schemeClr val="lt1"/>
+          </a:fontRef>
+        </p:style>
+        <p:txBody>
+          <a:bodyPr rtlCol="0" anchor="ctr"/>
+          <a:lstStyle/>
+          <a:p>
+            <a:pPr algn="ctr"/>
+            <a:r>
+              <a:rPr lang="en-US" dirty="0" smtClean="0"/>
+              <a:t>CDS consumption view</a:t>
+            </a:r>
+            <a:endParaRPr lang="en-US" dirty="0"/>
+          </a:p>
+        </p:txBody>
+      </p:sp>
+      <p:sp>
+        <p:nvSpPr>
+          <p:cNvPr id="136" name="Rectangle 135"/>
+          <p:cNvSpPr/>
+          <p:nvPr/>
+        </p:nvSpPr>
+        <p:spPr>
+          <a:xfrm>
+            <a:off x="191369" y="5719894"/>
+            <a:ext cx="2347935" cy="336441"/>
+          </a:xfrm>
+          <a:prstGeom prst="rect">
+            <a:avLst/>
+          </a:prstGeom>
+          <a:solidFill>
+            <a:schemeClr val="accent3"/>
+          </a:solidFill>
+        </p:spPr>
+        <p:style>
+          <a:lnRef idx="2">
+            <a:schemeClr val="accent1">
+              <a:shade val="50000"/>
+            </a:schemeClr>
+          </a:lnRef>
+          <a:fillRef idx="1">
+            <a:schemeClr val="accent1"/>
+          </a:fillRef>
+          <a:effectRef idx="0">
+            <a:schemeClr val="accent1"/>
+          </a:effectRef>
+          <a:fontRef idx="minor">
+            <a:schemeClr val="lt1"/>
+          </a:fontRef>
+        </p:style>
+        <p:txBody>
+          <a:bodyPr rtlCol="0" anchor="ctr"/>
+          <a:lstStyle/>
+          <a:p>
+            <a:pPr algn="ctr"/>
+            <a:r>
+              <a:rPr lang="en-US" altLang="zh-CN" dirty="0" smtClean="0"/>
+              <a:t>ABAP Database table</a:t>
+            </a:r>
+            <a:endParaRPr lang="en-US" dirty="0"/>
+          </a:p>
+        </p:txBody>
+      </p:sp>
+      <p:sp>
+        <p:nvSpPr>
+          <p:cNvPr id="137" name="Rectangle 136"/>
+          <p:cNvSpPr/>
+          <p:nvPr/>
+        </p:nvSpPr>
+        <p:spPr>
+          <a:xfrm>
+            <a:off x="191368" y="6083497"/>
+            <a:ext cx="2347935" cy="336441"/>
+          </a:xfrm>
+          <a:prstGeom prst="rect">
+            <a:avLst/>
+          </a:prstGeom>
+          <a:solidFill>
+            <a:srgbClr val="FF0000"/>
+          </a:solidFill>
+        </p:spPr>
+        <p:style>
+          <a:lnRef idx="2">
+            <a:schemeClr val="accent1">
+              <a:shade val="50000"/>
+            </a:schemeClr>
+          </a:lnRef>
+          <a:fillRef idx="1">
+            <a:schemeClr val="accent1"/>
+          </a:fillRef>
+          <a:effectRef idx="0">
+            <a:schemeClr val="accent1"/>
+          </a:effectRef>
+          <a:fontRef idx="minor">
+            <a:schemeClr val="lt1"/>
+          </a:fontRef>
+        </p:style>
+        <p:txBody>
+          <a:bodyPr rtlCol="0" anchor="ctr"/>
+          <a:lstStyle/>
+          <a:p>
+            <a:pPr algn="ctr"/>
+            <a:r>
+              <a:rPr lang="en-US" altLang="zh-CN" dirty="0" smtClean="0"/>
+              <a:t>CDS Table function</a:t>
+            </a:r>
+            <a:endParaRPr lang="en-US" dirty="0"/>
+          </a:p>
+        </p:txBody>
+      </p:sp>
+      <p:sp>
+        <p:nvSpPr>
+          <p:cNvPr id="138" name="Rectangle 137"/>
+          <p:cNvSpPr/>
+          <p:nvPr/>
+        </p:nvSpPr>
+        <p:spPr>
+          <a:xfrm>
+            <a:off x="191367" y="6447100"/>
+            <a:ext cx="2347935" cy="336441"/>
+          </a:xfrm>
+          <a:prstGeom prst="rect">
+            <a:avLst/>
+          </a:prstGeom>
+          <a:solidFill>
+            <a:srgbClr val="7030A0"/>
+          </a:solidFill>
+        </p:spPr>
+        <p:style>
+          <a:lnRef idx="2">
+            <a:schemeClr val="accent1">
+              <a:shade val="50000"/>
+            </a:schemeClr>
+          </a:lnRef>
+          <a:fillRef idx="1">
+            <a:schemeClr val="accent1"/>
+          </a:fillRef>
+          <a:effectRef idx="0">
+            <a:schemeClr val="accent1"/>
+          </a:effectRef>
+          <a:fontRef idx="minor">
+            <a:schemeClr val="lt1"/>
+          </a:fontRef>
+        </p:style>
+        <p:txBody>
+          <a:bodyPr rtlCol="0" anchor="ctr"/>
+          <a:lstStyle/>
+          <a:p>
+            <a:pPr algn="ctr"/>
+            <a:r>
+              <a:rPr lang="en-US" dirty="0" smtClean="0"/>
+              <a:t>AMDP implementation</a:t>
+            </a:r>
+            <a:endParaRPr lang="en-US" dirty="0"/>
+          </a:p>
+        </p:txBody>
+      </p:sp>
+    </p:spTree>
+    <p:extLst>
+      <p:ext uri="{BB962C8B-B14F-4D97-AF65-F5344CB8AC3E}">
+        <p14:creationId xmlns:p14="http://schemas.microsoft.com/office/powerpoint/2010/main" val="4155059232"/>
+      </p:ext>
+    </p:extLst>
+  </p:cSld>
+  <p:clrMapOvr>
+    <a:masterClrMapping/>
+  </p:clrMapOvr>
+  <p:timing>
+    <p:tnLst>
+      <p:par>
+        <p:cTn id="1" dur="indefinite" restart="never" nodeType="tmRoot"/>
+      </p:par>
+    </p:tnLst>
+  </p:timing>
+</p:sld>
+</file>
+
+<file path=ppt/slides/slide23.xml><?xml version="1.0" encoding="utf-8"?>
+<p:sld xmlns:a="http://schemas.openxmlformats.org/drawingml/2006/main" xmlns:r="http://schemas.openxmlformats.org/officeDocument/2006/relationships" xmlns:p="http://schemas.openxmlformats.org/presentationml/2006/main">
+  <p:cSld>
+    <p:spTree>
+      <p:nvGrpSpPr>
+        <p:cNvPr id="1" name=""/>
+        <p:cNvGrpSpPr/>
+        <p:nvPr/>
+      </p:nvGrpSpPr>
+      <p:grpSpPr>
+        <a:xfrm>
+          <a:off x="0" y="0"/>
+          <a:ext cx="0" cy="0"/>
+          <a:chOff x="0" y="0"/>
+          <a:chExt cx="0" cy="0"/>
+        </a:xfrm>
+      </p:grpSpPr>
+      <p:sp>
+        <p:nvSpPr>
+          <p:cNvPr id="2" name="Title 1"/>
+          <p:cNvSpPr>
+            <a:spLocks noGrp="1"/>
+          </p:cNvSpPr>
+          <p:nvPr>
+            <p:ph type="title"/>
+          </p:nvPr>
+        </p:nvSpPr>
+        <p:spPr/>
+        <p:txBody>
+          <a:bodyPr/>
+          <a:lstStyle/>
+          <a:p>
+            <a:r>
+              <a:rPr lang="en-US" dirty="0" smtClean="0"/>
+              <a:t>Legend</a:t>
+            </a:r>
+            <a:endParaRPr lang="en-US" dirty="0"/>
+          </a:p>
+        </p:txBody>
+      </p:sp>
+      <p:sp>
+        <p:nvSpPr>
+          <p:cNvPr id="3" name="Rectangle 2"/>
+          <p:cNvSpPr/>
+          <p:nvPr/>
+        </p:nvSpPr>
+        <p:spPr>
+          <a:xfrm>
+            <a:off x="445370" y="1690689"/>
+            <a:ext cx="2347934" cy="336440"/>
+          </a:xfrm>
+          <a:prstGeom prst="rect">
+            <a:avLst/>
+          </a:prstGeom>
+        </p:spPr>
+        <p:style>
+          <a:lnRef idx="2">
+            <a:schemeClr val="accent1">
+              <a:shade val="50000"/>
+            </a:schemeClr>
+          </a:lnRef>
+          <a:fillRef idx="1">
+            <a:schemeClr val="accent1"/>
+          </a:fillRef>
+          <a:effectRef idx="0">
+            <a:schemeClr val="accent1"/>
+          </a:effectRef>
+          <a:fontRef idx="minor">
+            <a:schemeClr val="lt1"/>
+          </a:fontRef>
+        </p:style>
+        <p:txBody>
+          <a:bodyPr rtlCol="0" anchor="ctr"/>
+          <a:lstStyle/>
+          <a:p>
+            <a:pPr algn="ctr"/>
+            <a:r>
+              <a:rPr lang="en-US" dirty="0" smtClean="0"/>
+              <a:t>CDS view</a:t>
+            </a:r>
+            <a:endParaRPr lang="en-US" dirty="0"/>
+          </a:p>
+        </p:txBody>
+      </p:sp>
+      <p:sp>
+        <p:nvSpPr>
+          <p:cNvPr id="4" name="Rectangle 3"/>
+          <p:cNvSpPr/>
+          <p:nvPr/>
+        </p:nvSpPr>
+        <p:spPr>
+          <a:xfrm>
+            <a:off x="445370" y="2054291"/>
+            <a:ext cx="2347935" cy="336441"/>
+          </a:xfrm>
+          <a:prstGeom prst="rect">
+            <a:avLst/>
+          </a:prstGeom>
+          <a:solidFill>
+            <a:schemeClr val="accent6"/>
+          </a:solidFill>
+        </p:spPr>
+        <p:style>
+          <a:lnRef idx="2">
+            <a:schemeClr val="accent1">
+              <a:shade val="50000"/>
+            </a:schemeClr>
+          </a:lnRef>
+          <a:fillRef idx="1">
+            <a:schemeClr val="accent1"/>
+          </a:fillRef>
+          <a:effectRef idx="0">
+            <a:schemeClr val="accent1"/>
+          </a:effectRef>
+          <a:fontRef idx="minor">
+            <a:schemeClr val="lt1"/>
+          </a:fontRef>
+        </p:style>
+        <p:txBody>
+          <a:bodyPr rtlCol="0" anchor="ctr"/>
+          <a:lstStyle/>
+          <a:p>
+            <a:pPr algn="ctr"/>
+            <a:r>
+              <a:rPr lang="en-US" dirty="0" smtClean="0"/>
+              <a:t>CDS consumption view</a:t>
+            </a:r>
+            <a:endParaRPr lang="en-US" dirty="0"/>
+          </a:p>
+        </p:txBody>
+      </p:sp>
+      <p:sp>
+        <p:nvSpPr>
+          <p:cNvPr id="5" name="Rectangle 4"/>
+          <p:cNvSpPr/>
+          <p:nvPr/>
+        </p:nvSpPr>
+        <p:spPr>
+          <a:xfrm>
+            <a:off x="445369" y="2417894"/>
+            <a:ext cx="2347935" cy="336441"/>
+          </a:xfrm>
+          <a:prstGeom prst="rect">
+            <a:avLst/>
+          </a:prstGeom>
+          <a:solidFill>
+            <a:schemeClr val="accent3"/>
+          </a:solidFill>
+        </p:spPr>
+        <p:style>
+          <a:lnRef idx="2">
+            <a:schemeClr val="accent1">
+              <a:shade val="50000"/>
+            </a:schemeClr>
+          </a:lnRef>
+          <a:fillRef idx="1">
+            <a:schemeClr val="accent1"/>
+          </a:fillRef>
+          <a:effectRef idx="0">
+            <a:schemeClr val="accent1"/>
+          </a:effectRef>
+          <a:fontRef idx="minor">
+            <a:schemeClr val="lt1"/>
+          </a:fontRef>
+        </p:style>
+        <p:txBody>
+          <a:bodyPr rtlCol="0" anchor="ctr"/>
+          <a:lstStyle/>
+          <a:p>
+            <a:pPr algn="ctr"/>
+            <a:r>
+              <a:rPr lang="en-US" altLang="zh-CN" dirty="0" smtClean="0"/>
+              <a:t>ABAP Database table</a:t>
+            </a:r>
+            <a:endParaRPr lang="en-US" dirty="0"/>
+          </a:p>
+        </p:txBody>
+      </p:sp>
+      <p:sp>
+        <p:nvSpPr>
+          <p:cNvPr id="6" name="Rectangle 5"/>
+          <p:cNvSpPr/>
+          <p:nvPr/>
+        </p:nvSpPr>
+        <p:spPr>
+          <a:xfrm>
+            <a:off x="445368" y="2781497"/>
+            <a:ext cx="2347935" cy="336441"/>
+          </a:xfrm>
+          <a:prstGeom prst="rect">
+            <a:avLst/>
+          </a:prstGeom>
+          <a:solidFill>
+            <a:srgbClr val="FF0000"/>
+          </a:solidFill>
+        </p:spPr>
+        <p:style>
+          <a:lnRef idx="2">
+            <a:schemeClr val="accent1">
+              <a:shade val="50000"/>
+            </a:schemeClr>
+          </a:lnRef>
+          <a:fillRef idx="1">
+            <a:schemeClr val="accent1"/>
+          </a:fillRef>
+          <a:effectRef idx="0">
+            <a:schemeClr val="accent1"/>
+          </a:effectRef>
+          <a:fontRef idx="minor">
+            <a:schemeClr val="lt1"/>
+          </a:fontRef>
+        </p:style>
+        <p:txBody>
+          <a:bodyPr rtlCol="0" anchor="ctr"/>
+          <a:lstStyle/>
+          <a:p>
+            <a:pPr algn="ctr"/>
+            <a:r>
+              <a:rPr lang="en-US" altLang="zh-CN" dirty="0" smtClean="0"/>
+              <a:t>CDS Table function</a:t>
+            </a:r>
+            <a:endParaRPr lang="en-US" dirty="0"/>
+          </a:p>
+        </p:txBody>
+      </p:sp>
+      <p:sp>
+        <p:nvSpPr>
+          <p:cNvPr id="7" name="Rectangle 6"/>
+          <p:cNvSpPr/>
+          <p:nvPr/>
+        </p:nvSpPr>
+        <p:spPr>
+          <a:xfrm>
+            <a:off x="445367" y="3145100"/>
+            <a:ext cx="2347935" cy="336441"/>
+          </a:xfrm>
+          <a:prstGeom prst="rect">
+            <a:avLst/>
+          </a:prstGeom>
+          <a:solidFill>
+            <a:srgbClr val="7030A0"/>
+          </a:solidFill>
+        </p:spPr>
+        <p:style>
+          <a:lnRef idx="2">
+            <a:schemeClr val="accent1">
+              <a:shade val="50000"/>
+            </a:schemeClr>
+          </a:lnRef>
+          <a:fillRef idx="1">
+            <a:schemeClr val="accent1"/>
+          </a:fillRef>
+          <a:effectRef idx="0">
+            <a:schemeClr val="accent1"/>
+          </a:effectRef>
+          <a:fontRef idx="minor">
+            <a:schemeClr val="lt1"/>
+          </a:fontRef>
+        </p:style>
+        <p:txBody>
+          <a:bodyPr rtlCol="0" anchor="ctr"/>
+          <a:lstStyle/>
+          <a:p>
+            <a:pPr algn="ctr"/>
+            <a:r>
+              <a:rPr lang="en-US" dirty="0" smtClean="0"/>
+              <a:t>AMDP implementation</a:t>
+            </a:r>
+            <a:endParaRPr lang="en-US" dirty="0"/>
+          </a:p>
+        </p:txBody>
+      </p:sp>
+    </p:spTree>
+    <p:extLst>
+      <p:ext uri="{BB962C8B-B14F-4D97-AF65-F5344CB8AC3E}">
+        <p14:creationId xmlns:p14="http://schemas.microsoft.com/office/powerpoint/2010/main" val="2355975045"/>
       </p:ext>
     </p:extLst>
   </p:cSld>

</xml_diff>